<commit_message>
Playing around with css
</commit_message>
<xml_diff>
--- a/project2proposal.pptx
+++ b/project2proposal.pptx
@@ -106,6 +106,11 @@
       </a:defRPr>
     </a:lvl9pPr>
   </p:defaultTextStyle>
+  <p:extLst>
+    <p:ext uri="{EFAFB233-063F-42B5-8137-9DF3F51BA10A}">
+      <p15:sldGuideLst xmlns:p15="http://schemas.microsoft.com/office/powerpoint/2012/main"/>
+    </p:ext>
+  </p:extLst>
 </p:presentation>
 </file>
 
@@ -3469,10 +3474,9 @@
           </a:lstStyle>
           <a:p>
             <a:r>
-              <a:rPr lang="en-SG"/>
+              <a:rPr lang="en-SG" dirty="0"/>
               <a:t>URL</a:t>
             </a:r>
-            <a:endParaRPr lang="en-SG" dirty="0"/>
           </a:p>
         </p:txBody>
       </p:sp>

</xml_diff>

<commit_message>
Created Results component (unfinished), SearchSection component (unfinished), default data array
</commit_message>
<xml_diff>
--- a/project2proposal.pptx
+++ b/project2proposal.pptx
@@ -8,6 +8,7 @@
     <p:sldId id="257" r:id="rId2"/>
     <p:sldId id="258" r:id="rId3"/>
     <p:sldId id="259" r:id="rId4"/>
+    <p:sldId id="260" r:id="rId5"/>
   </p:sldIdLst>
   <p:sldSz cx="12192000" cy="6858000"/>
   <p:notesSz cx="6858000" cy="9144000"/>
@@ -263,7 +264,7 @@
           <a:p>
             <a:fld id="{FFFD4AE9-6F59-4A6F-BD55-A1C8D3144265}" type="datetimeFigureOut">
               <a:rPr lang="en-SG" smtClean="0"/>
-              <a:t>18/1/2023</a:t>
+              <a:t>22/1/2023</a:t>
             </a:fld>
             <a:endParaRPr lang="en-SG"/>
           </a:p>
@@ -463,7 +464,7 @@
           <a:p>
             <a:fld id="{FFFD4AE9-6F59-4A6F-BD55-A1C8D3144265}" type="datetimeFigureOut">
               <a:rPr lang="en-SG" smtClean="0"/>
-              <a:t>18/1/2023</a:t>
+              <a:t>22/1/2023</a:t>
             </a:fld>
             <a:endParaRPr lang="en-SG"/>
           </a:p>
@@ -673,7 +674,7 @@
           <a:p>
             <a:fld id="{FFFD4AE9-6F59-4A6F-BD55-A1C8D3144265}" type="datetimeFigureOut">
               <a:rPr lang="en-SG" smtClean="0"/>
-              <a:t>18/1/2023</a:t>
+              <a:t>22/1/2023</a:t>
             </a:fld>
             <a:endParaRPr lang="en-SG"/>
           </a:p>
@@ -873,7 +874,7 @@
           <a:p>
             <a:fld id="{FFFD4AE9-6F59-4A6F-BD55-A1C8D3144265}" type="datetimeFigureOut">
               <a:rPr lang="en-SG" smtClean="0"/>
-              <a:t>18/1/2023</a:t>
+              <a:t>22/1/2023</a:t>
             </a:fld>
             <a:endParaRPr lang="en-SG"/>
           </a:p>
@@ -1149,7 +1150,7 @@
           <a:p>
             <a:fld id="{FFFD4AE9-6F59-4A6F-BD55-A1C8D3144265}" type="datetimeFigureOut">
               <a:rPr lang="en-SG" smtClean="0"/>
-              <a:t>18/1/2023</a:t>
+              <a:t>22/1/2023</a:t>
             </a:fld>
             <a:endParaRPr lang="en-SG"/>
           </a:p>
@@ -1417,7 +1418,7 @@
           <a:p>
             <a:fld id="{FFFD4AE9-6F59-4A6F-BD55-A1C8D3144265}" type="datetimeFigureOut">
               <a:rPr lang="en-SG" smtClean="0"/>
-              <a:t>18/1/2023</a:t>
+              <a:t>22/1/2023</a:t>
             </a:fld>
             <a:endParaRPr lang="en-SG"/>
           </a:p>
@@ -1832,7 +1833,7 @@
           <a:p>
             <a:fld id="{FFFD4AE9-6F59-4A6F-BD55-A1C8D3144265}" type="datetimeFigureOut">
               <a:rPr lang="en-SG" smtClean="0"/>
-              <a:t>18/1/2023</a:t>
+              <a:t>22/1/2023</a:t>
             </a:fld>
             <a:endParaRPr lang="en-SG"/>
           </a:p>
@@ -1974,7 +1975,7 @@
           <a:p>
             <a:fld id="{FFFD4AE9-6F59-4A6F-BD55-A1C8D3144265}" type="datetimeFigureOut">
               <a:rPr lang="en-SG" smtClean="0"/>
-              <a:t>18/1/2023</a:t>
+              <a:t>22/1/2023</a:t>
             </a:fld>
             <a:endParaRPr lang="en-SG"/>
           </a:p>
@@ -2087,7 +2088,7 @@
           <a:p>
             <a:fld id="{FFFD4AE9-6F59-4A6F-BD55-A1C8D3144265}" type="datetimeFigureOut">
               <a:rPr lang="en-SG" smtClean="0"/>
-              <a:t>18/1/2023</a:t>
+              <a:t>22/1/2023</a:t>
             </a:fld>
             <a:endParaRPr lang="en-SG"/>
           </a:p>
@@ -2400,7 +2401,7 @@
           <a:p>
             <a:fld id="{FFFD4AE9-6F59-4A6F-BD55-A1C8D3144265}" type="datetimeFigureOut">
               <a:rPr lang="en-SG" smtClean="0"/>
-              <a:t>18/1/2023</a:t>
+              <a:t>22/1/2023</a:t>
             </a:fld>
             <a:endParaRPr lang="en-SG"/>
           </a:p>
@@ -2689,7 +2690,7 @@
           <a:p>
             <a:fld id="{FFFD4AE9-6F59-4A6F-BD55-A1C8D3144265}" type="datetimeFigureOut">
               <a:rPr lang="en-SG" smtClean="0"/>
-              <a:t>18/1/2023</a:t>
+              <a:t>22/1/2023</a:t>
             </a:fld>
             <a:endParaRPr lang="en-SG"/>
           </a:p>
@@ -2932,7 +2933,7 @@
           <a:p>
             <a:fld id="{FFFD4AE9-6F59-4A6F-BD55-A1C8D3144265}" type="datetimeFigureOut">
               <a:rPr lang="en-SG" smtClean="0"/>
-              <a:t>18/1/2023</a:t>
+              <a:t>22/1/2023</a:t>
             </a:fld>
             <a:endParaRPr lang="en-SG"/>
           </a:p>
@@ -11351,6 +11352,207 @@
 </p:sld>
 </file>
 
+<file path=ppt/slides/slide4.xml><?xml version="1.0" encoding="utf-8"?>
+<p:sld xmlns:a="http://schemas.openxmlformats.org/drawingml/2006/main" xmlns:r="http://schemas.openxmlformats.org/officeDocument/2006/relationships" xmlns:p="http://schemas.openxmlformats.org/presentationml/2006/main">
+  <p:cSld>
+    <p:spTree>
+      <p:nvGrpSpPr>
+        <p:cNvPr id="1" name=""/>
+        <p:cNvGrpSpPr/>
+        <p:nvPr/>
+      </p:nvGrpSpPr>
+      <p:grpSpPr>
+        <a:xfrm>
+          <a:off x="0" y="0"/>
+          <a:ext cx="0" cy="0"/>
+          <a:chOff x="0" y="0"/>
+          <a:chExt cx="0" cy="0"/>
+        </a:xfrm>
+      </p:grpSpPr>
+      <p:sp>
+        <p:nvSpPr>
+          <p:cNvPr id="2" name="Title 1">
+            <a:extLst>
+              <a:ext uri="{FF2B5EF4-FFF2-40B4-BE49-F238E27FC236}">
+                <a16:creationId xmlns:a16="http://schemas.microsoft.com/office/drawing/2014/main" id="{B4ED040A-5886-C8F5-B718-8BCEA062401B}"/>
+              </a:ext>
+            </a:extLst>
+          </p:cNvPr>
+          <p:cNvSpPr>
+            <a:spLocks noGrp="1"/>
+          </p:cNvSpPr>
+          <p:nvPr>
+            <p:ph type="title"/>
+          </p:nvPr>
+        </p:nvSpPr>
+        <p:spPr/>
+        <p:txBody>
+          <a:bodyPr/>
+          <a:lstStyle/>
+          <a:p>
+            <a:r>
+              <a:rPr lang="en-SG" dirty="0" err="1"/>
+              <a:t>Proj</a:t>
+            </a:r>
+            <a:r>
+              <a:rPr lang="en-SG"/>
+              <a:t> requirements</a:t>
+            </a:r>
+            <a:endParaRPr lang="en-SG" dirty="0"/>
+          </a:p>
+        </p:txBody>
+      </p:sp>
+      <p:sp>
+        <p:nvSpPr>
+          <p:cNvPr id="3" name="Content Placeholder 2">
+            <a:extLst>
+              <a:ext uri="{FF2B5EF4-FFF2-40B4-BE49-F238E27FC236}">
+                <a16:creationId xmlns:a16="http://schemas.microsoft.com/office/drawing/2014/main" id="{EFC04099-7A51-2203-CAE7-47D270BF48CF}"/>
+              </a:ext>
+            </a:extLst>
+          </p:cNvPr>
+          <p:cNvSpPr>
+            <a:spLocks noGrp="1"/>
+          </p:cNvSpPr>
+          <p:nvPr>
+            <p:ph idx="1"/>
+          </p:nvPr>
+        </p:nvSpPr>
+        <p:spPr/>
+        <p:txBody>
+          <a:bodyPr/>
+          <a:lstStyle/>
+          <a:p>
+            <a:pPr algn="l">
+              <a:buFont typeface="Arial" panose="020B0604020202020204" pitchFamily="34" charset="0"/>
+              <a:buChar char="•"/>
+            </a:pPr>
+            <a:r>
+              <a:rPr lang="en-US" b="0" i="0" dirty="0">
+                <a:solidFill>
+                  <a:srgbClr val="24292F"/>
+                </a:solidFill>
+                <a:effectLst/>
+                <a:latin typeface="-apple-system"/>
+              </a:rPr>
+              <a:t>3 components</a:t>
+            </a:r>
+          </a:p>
+          <a:p>
+            <a:pPr algn="l">
+              <a:buFont typeface="Arial" panose="020B0604020202020204" pitchFamily="34" charset="0"/>
+              <a:buChar char="•"/>
+            </a:pPr>
+            <a:r>
+              <a:rPr lang="en-US" b="0" i="0" dirty="0">
+                <a:solidFill>
+                  <a:srgbClr val="24292F"/>
+                </a:solidFill>
+                <a:effectLst/>
+                <a:latin typeface="-apple-system"/>
+              </a:rPr>
+              <a:t>4 props</a:t>
+            </a:r>
+          </a:p>
+          <a:p>
+            <a:pPr algn="l">
+              <a:buFont typeface="Arial" panose="020B0604020202020204" pitchFamily="34" charset="0"/>
+              <a:buChar char="•"/>
+            </a:pPr>
+            <a:r>
+              <a:rPr lang="en-US" b="0" i="0" dirty="0">
+                <a:solidFill>
+                  <a:srgbClr val="24292F"/>
+                </a:solidFill>
+                <a:effectLst/>
+                <a:latin typeface="-apple-system"/>
+              </a:rPr>
+              <a:t>1 lifting state</a:t>
+            </a:r>
+          </a:p>
+          <a:p>
+            <a:pPr algn="l">
+              <a:buFont typeface="Arial" panose="020B0604020202020204" pitchFamily="34" charset="0"/>
+              <a:buChar char="•"/>
+            </a:pPr>
+            <a:r>
+              <a:rPr lang="en-US" b="0" i="0" dirty="0">
+                <a:solidFill>
+                  <a:srgbClr val="24292F"/>
+                </a:solidFill>
+                <a:effectLst/>
+                <a:latin typeface="-apple-system"/>
+              </a:rPr>
+              <a:t>2 states</a:t>
+            </a:r>
+          </a:p>
+          <a:p>
+            <a:pPr algn="l">
+              <a:buFont typeface="Arial" panose="020B0604020202020204" pitchFamily="34" charset="0"/>
+              <a:buChar char="•"/>
+            </a:pPr>
+            <a:r>
+              <a:rPr lang="en-US" b="0" i="0" dirty="0">
+                <a:solidFill>
+                  <a:srgbClr val="24292F"/>
+                </a:solidFill>
+                <a:effectLst/>
+                <a:latin typeface="-apple-system"/>
+              </a:rPr>
+              <a:t>2 </a:t>
+            </a:r>
+            <a:r>
+              <a:rPr lang="en-US" b="0" i="0" dirty="0" err="1">
+                <a:solidFill>
+                  <a:srgbClr val="24292F"/>
+                </a:solidFill>
+                <a:effectLst/>
+                <a:latin typeface="-apple-system"/>
+              </a:rPr>
+              <a:t>setState</a:t>
+            </a:r>
+            <a:endParaRPr lang="en-US" b="0" i="0" dirty="0">
+              <a:solidFill>
+                <a:srgbClr val="24292F"/>
+              </a:solidFill>
+              <a:effectLst/>
+              <a:latin typeface="-apple-system"/>
+            </a:endParaRPr>
+          </a:p>
+          <a:p>
+            <a:pPr algn="l">
+              <a:buFont typeface="Arial" panose="020B0604020202020204" pitchFamily="34" charset="0"/>
+              <a:buChar char="•"/>
+            </a:pPr>
+            <a:r>
+              <a:rPr lang="en-US" b="0" i="0" dirty="0">
+                <a:solidFill>
+                  <a:srgbClr val="24292F"/>
+                </a:solidFill>
+                <a:effectLst/>
+                <a:latin typeface="-apple-system"/>
+              </a:rPr>
+              <a:t>2 routes</a:t>
+            </a:r>
+          </a:p>
+          <a:p>
+            <a:endParaRPr lang="en-SG" dirty="0"/>
+          </a:p>
+        </p:txBody>
+      </p:sp>
+    </p:spTree>
+    <p:extLst>
+      <p:ext uri="{BB962C8B-B14F-4D97-AF65-F5344CB8AC3E}">
+        <p14:creationId xmlns:p14="http://schemas.microsoft.com/office/powerpoint/2010/main" val="1261622927"/>
+      </p:ext>
+    </p:extLst>
+  </p:cSld>
+  <p:clrMapOvr>
+    <a:masterClrMapping/>
+  </p:clrMapOvr>
+</p:sld>
+</file>
+
 <file path=ppt/theme/theme1.xml><?xml version="1.0" encoding="utf-8"?>
 <a:theme xmlns:a="http://schemas.openxmlformats.org/drawingml/2006/main" name="Office Theme">
   <a:themeElements>

</xml_diff>

<commit_message>
CSS edits, and RWD media queries
</commit_message>
<xml_diff>
--- a/project2proposal.pptx
+++ b/project2proposal.pptx
@@ -9,6 +9,8 @@
     <p:sldId id="258" r:id="rId3"/>
     <p:sldId id="259" r:id="rId4"/>
     <p:sldId id="260" r:id="rId5"/>
+    <p:sldId id="261" r:id="rId6"/>
+    <p:sldId id="262" r:id="rId7"/>
   </p:sldIdLst>
   <p:sldSz cx="12192000" cy="6858000"/>
   <p:notesSz cx="6858000" cy="9144000"/>
@@ -264,7 +266,7 @@
           <a:p>
             <a:fld id="{FFFD4AE9-6F59-4A6F-BD55-A1C8D3144265}" type="datetimeFigureOut">
               <a:rPr lang="en-SG" smtClean="0"/>
-              <a:t>22/1/2023</a:t>
+              <a:t>26/1/2023</a:t>
             </a:fld>
             <a:endParaRPr lang="en-SG"/>
           </a:p>
@@ -464,7 +466,7 @@
           <a:p>
             <a:fld id="{FFFD4AE9-6F59-4A6F-BD55-A1C8D3144265}" type="datetimeFigureOut">
               <a:rPr lang="en-SG" smtClean="0"/>
-              <a:t>22/1/2023</a:t>
+              <a:t>26/1/2023</a:t>
             </a:fld>
             <a:endParaRPr lang="en-SG"/>
           </a:p>
@@ -674,7 +676,7 @@
           <a:p>
             <a:fld id="{FFFD4AE9-6F59-4A6F-BD55-A1C8D3144265}" type="datetimeFigureOut">
               <a:rPr lang="en-SG" smtClean="0"/>
-              <a:t>22/1/2023</a:t>
+              <a:t>26/1/2023</a:t>
             </a:fld>
             <a:endParaRPr lang="en-SG"/>
           </a:p>
@@ -874,7 +876,7 @@
           <a:p>
             <a:fld id="{FFFD4AE9-6F59-4A6F-BD55-A1C8D3144265}" type="datetimeFigureOut">
               <a:rPr lang="en-SG" smtClean="0"/>
-              <a:t>22/1/2023</a:t>
+              <a:t>26/1/2023</a:t>
             </a:fld>
             <a:endParaRPr lang="en-SG"/>
           </a:p>
@@ -1150,7 +1152,7 @@
           <a:p>
             <a:fld id="{FFFD4AE9-6F59-4A6F-BD55-A1C8D3144265}" type="datetimeFigureOut">
               <a:rPr lang="en-SG" smtClean="0"/>
-              <a:t>22/1/2023</a:t>
+              <a:t>26/1/2023</a:t>
             </a:fld>
             <a:endParaRPr lang="en-SG"/>
           </a:p>
@@ -1418,7 +1420,7 @@
           <a:p>
             <a:fld id="{FFFD4AE9-6F59-4A6F-BD55-A1C8D3144265}" type="datetimeFigureOut">
               <a:rPr lang="en-SG" smtClean="0"/>
-              <a:t>22/1/2023</a:t>
+              <a:t>26/1/2023</a:t>
             </a:fld>
             <a:endParaRPr lang="en-SG"/>
           </a:p>
@@ -1833,7 +1835,7 @@
           <a:p>
             <a:fld id="{FFFD4AE9-6F59-4A6F-BD55-A1C8D3144265}" type="datetimeFigureOut">
               <a:rPr lang="en-SG" smtClean="0"/>
-              <a:t>22/1/2023</a:t>
+              <a:t>26/1/2023</a:t>
             </a:fld>
             <a:endParaRPr lang="en-SG"/>
           </a:p>
@@ -1975,7 +1977,7 @@
           <a:p>
             <a:fld id="{FFFD4AE9-6F59-4A6F-BD55-A1C8D3144265}" type="datetimeFigureOut">
               <a:rPr lang="en-SG" smtClean="0"/>
-              <a:t>22/1/2023</a:t>
+              <a:t>26/1/2023</a:t>
             </a:fld>
             <a:endParaRPr lang="en-SG"/>
           </a:p>
@@ -2088,7 +2090,7 @@
           <a:p>
             <a:fld id="{FFFD4AE9-6F59-4A6F-BD55-A1C8D3144265}" type="datetimeFigureOut">
               <a:rPr lang="en-SG" smtClean="0"/>
-              <a:t>22/1/2023</a:t>
+              <a:t>26/1/2023</a:t>
             </a:fld>
             <a:endParaRPr lang="en-SG"/>
           </a:p>
@@ -2401,7 +2403,7 @@
           <a:p>
             <a:fld id="{FFFD4AE9-6F59-4A6F-BD55-A1C8D3144265}" type="datetimeFigureOut">
               <a:rPr lang="en-SG" smtClean="0"/>
-              <a:t>22/1/2023</a:t>
+              <a:t>26/1/2023</a:t>
             </a:fld>
             <a:endParaRPr lang="en-SG"/>
           </a:p>
@@ -2690,7 +2692,7 @@
           <a:p>
             <a:fld id="{FFFD4AE9-6F59-4A6F-BD55-A1C8D3144265}" type="datetimeFigureOut">
               <a:rPr lang="en-SG" smtClean="0"/>
-              <a:t>22/1/2023</a:t>
+              <a:t>26/1/2023</a:t>
             </a:fld>
             <a:endParaRPr lang="en-SG"/>
           </a:p>
@@ -2933,7 +2935,7 @@
           <a:p>
             <a:fld id="{FFFD4AE9-6F59-4A6F-BD55-A1C8D3144265}" type="datetimeFigureOut">
               <a:rPr lang="en-SG" smtClean="0"/>
-              <a:t>22/1/2023</a:t>
+              <a:t>26/1/2023</a:t>
             </a:fld>
             <a:endParaRPr lang="en-SG"/>
           </a:p>
@@ -11553,6 +11555,4489 @@
 </p:sld>
 </file>
 
+<file path=ppt/slides/slide5.xml><?xml version="1.0" encoding="utf-8"?>
+<p:sld xmlns:a="http://schemas.openxmlformats.org/drawingml/2006/main" xmlns:r="http://schemas.openxmlformats.org/officeDocument/2006/relationships" xmlns:p="http://schemas.openxmlformats.org/presentationml/2006/main">
+  <p:cSld>
+    <p:spTree>
+      <p:nvGrpSpPr>
+        <p:cNvPr id="1" name=""/>
+        <p:cNvGrpSpPr/>
+        <p:nvPr/>
+      </p:nvGrpSpPr>
+      <p:grpSpPr>
+        <a:xfrm>
+          <a:off x="0" y="0"/>
+          <a:ext cx="0" cy="0"/>
+          <a:chOff x="0" y="0"/>
+          <a:chExt cx="0" cy="0"/>
+        </a:xfrm>
+      </p:grpSpPr>
+      <p:sp>
+        <p:nvSpPr>
+          <p:cNvPr id="4" name="Content Placeholder 2">
+            <a:extLst>
+              <a:ext uri="{FF2B5EF4-FFF2-40B4-BE49-F238E27FC236}">
+                <a16:creationId xmlns:a16="http://schemas.microsoft.com/office/drawing/2014/main" id="{93AB6B98-F17B-6C5A-3EB4-E4F9C651A44B}"/>
+              </a:ext>
+            </a:extLst>
+          </p:cNvPr>
+          <p:cNvSpPr>
+            <a:spLocks noGrp="1"/>
+          </p:cNvSpPr>
+          <p:nvPr>
+            <p:ph idx="1"/>
+          </p:nvPr>
+        </p:nvSpPr>
+        <p:spPr>
+          <a:xfrm>
+            <a:off x="4373357" y="2101077"/>
+            <a:ext cx="2142323" cy="263755"/>
+          </a:xfrm>
+          <a:ln>
+            <a:solidFill>
+              <a:schemeClr val="tx1"/>
+            </a:solidFill>
+          </a:ln>
+        </p:spPr>
+        <p:txBody>
+          <a:bodyPr>
+            <a:normAutofit fontScale="92500" lnSpcReduction="20000"/>
+          </a:bodyPr>
+          <a:lstStyle/>
+          <a:p>
+            <a:pPr marL="0" indent="0">
+              <a:buNone/>
+            </a:pPr>
+            <a:r>
+              <a:rPr lang="en-SG" sz="1600" dirty="0">
+                <a:latin typeface="Arial" panose="020B0604020202020204" pitchFamily="34" charset="0"/>
+                <a:cs typeface="Arial" panose="020B0604020202020204" pitchFamily="34" charset="0"/>
+              </a:rPr>
+              <a:t>Search Input: </a:t>
+            </a:r>
+          </a:p>
+        </p:txBody>
+      </p:sp>
+      <p:sp>
+        <p:nvSpPr>
+          <p:cNvPr id="5" name="Content Placeholder 2">
+            <a:extLst>
+              <a:ext uri="{FF2B5EF4-FFF2-40B4-BE49-F238E27FC236}">
+                <a16:creationId xmlns:a16="http://schemas.microsoft.com/office/drawing/2014/main" id="{0FB93B2D-AF8C-BDD7-129A-BCCD43DA8850}"/>
+              </a:ext>
+            </a:extLst>
+          </p:cNvPr>
+          <p:cNvSpPr txBox="1">
+            <a:spLocks/>
+          </p:cNvSpPr>
+          <p:nvPr/>
+        </p:nvSpPr>
+        <p:spPr>
+          <a:xfrm>
+            <a:off x="4902687" y="2459300"/>
+            <a:ext cx="1374508" cy="263755"/>
+          </a:xfrm>
+          <a:prstGeom prst="rect">
+            <a:avLst/>
+          </a:prstGeom>
+          <a:ln>
+            <a:solidFill>
+              <a:schemeClr val="tx1"/>
+            </a:solidFill>
+          </a:ln>
+        </p:spPr>
+        <p:txBody>
+          <a:bodyPr vert="horz" lIns="91440" tIns="45720" rIns="91440" bIns="45720" rtlCol="0">
+            <a:normAutofit fontScale="92500" lnSpcReduction="20000"/>
+          </a:bodyPr>
+          <a:lstStyle>
+            <a:lvl1pPr marL="228600" indent="-228600" algn="l" defTabSz="914400" rtl="0" eaLnBrk="1" latinLnBrk="0" hangingPunct="1">
+              <a:lnSpc>
+                <a:spcPct val="90000"/>
+              </a:lnSpc>
+              <a:spcBef>
+                <a:spcPts val="1000"/>
+              </a:spcBef>
+              <a:buFont typeface="Arial" panose="020B0604020202020204" pitchFamily="34" charset="0"/>
+              <a:buChar char="•"/>
+              <a:defRPr sz="2800" kern="1200">
+                <a:solidFill>
+                  <a:schemeClr val="tx1"/>
+                </a:solidFill>
+                <a:latin typeface="+mn-lt"/>
+                <a:ea typeface="+mn-ea"/>
+                <a:cs typeface="+mn-cs"/>
+              </a:defRPr>
+            </a:lvl1pPr>
+            <a:lvl2pPr marL="685800" indent="-228600" algn="l" defTabSz="914400" rtl="0" eaLnBrk="1" latinLnBrk="0" hangingPunct="1">
+              <a:lnSpc>
+                <a:spcPct val="90000"/>
+              </a:lnSpc>
+              <a:spcBef>
+                <a:spcPts val="500"/>
+              </a:spcBef>
+              <a:buFont typeface="Arial" panose="020B0604020202020204" pitchFamily="34" charset="0"/>
+              <a:buChar char="•"/>
+              <a:defRPr sz="2400" kern="1200">
+                <a:solidFill>
+                  <a:schemeClr val="tx1"/>
+                </a:solidFill>
+                <a:latin typeface="+mn-lt"/>
+                <a:ea typeface="+mn-ea"/>
+                <a:cs typeface="+mn-cs"/>
+              </a:defRPr>
+            </a:lvl2pPr>
+            <a:lvl3pPr marL="1143000" indent="-228600" algn="l" defTabSz="914400" rtl="0" eaLnBrk="1" latinLnBrk="0" hangingPunct="1">
+              <a:lnSpc>
+                <a:spcPct val="90000"/>
+              </a:lnSpc>
+              <a:spcBef>
+                <a:spcPts val="500"/>
+              </a:spcBef>
+              <a:buFont typeface="Arial" panose="020B0604020202020204" pitchFamily="34" charset="0"/>
+              <a:buChar char="•"/>
+              <a:defRPr sz="2000" kern="1200">
+                <a:solidFill>
+                  <a:schemeClr val="tx1"/>
+                </a:solidFill>
+                <a:latin typeface="+mn-lt"/>
+                <a:ea typeface="+mn-ea"/>
+                <a:cs typeface="+mn-cs"/>
+              </a:defRPr>
+            </a:lvl3pPr>
+            <a:lvl4pPr marL="1600200" indent="-228600" algn="l" defTabSz="914400" rtl="0" eaLnBrk="1" latinLnBrk="0" hangingPunct="1">
+              <a:lnSpc>
+                <a:spcPct val="90000"/>
+              </a:lnSpc>
+              <a:spcBef>
+                <a:spcPts val="500"/>
+              </a:spcBef>
+              <a:buFont typeface="Arial" panose="020B0604020202020204" pitchFamily="34" charset="0"/>
+              <a:buChar char="•"/>
+              <a:defRPr sz="1800" kern="1200">
+                <a:solidFill>
+                  <a:schemeClr val="tx1"/>
+                </a:solidFill>
+                <a:latin typeface="+mn-lt"/>
+                <a:ea typeface="+mn-ea"/>
+                <a:cs typeface="+mn-cs"/>
+              </a:defRPr>
+            </a:lvl4pPr>
+            <a:lvl5pPr marL="2057400" indent="-228600" algn="l" defTabSz="914400" rtl="0" eaLnBrk="1" latinLnBrk="0" hangingPunct="1">
+              <a:lnSpc>
+                <a:spcPct val="90000"/>
+              </a:lnSpc>
+              <a:spcBef>
+                <a:spcPts val="500"/>
+              </a:spcBef>
+              <a:buFont typeface="Arial" panose="020B0604020202020204" pitchFamily="34" charset="0"/>
+              <a:buChar char="•"/>
+              <a:defRPr sz="1800" kern="1200">
+                <a:solidFill>
+                  <a:schemeClr val="tx1"/>
+                </a:solidFill>
+                <a:latin typeface="+mn-lt"/>
+                <a:ea typeface="+mn-ea"/>
+                <a:cs typeface="+mn-cs"/>
+              </a:defRPr>
+            </a:lvl5pPr>
+            <a:lvl6pPr marL="2514600" indent="-228600" algn="l" defTabSz="914400" rtl="0" eaLnBrk="1" latinLnBrk="0" hangingPunct="1">
+              <a:lnSpc>
+                <a:spcPct val="90000"/>
+              </a:lnSpc>
+              <a:spcBef>
+                <a:spcPts val="500"/>
+              </a:spcBef>
+              <a:buFont typeface="Arial" panose="020B0604020202020204" pitchFamily="34" charset="0"/>
+              <a:buChar char="•"/>
+              <a:defRPr sz="1800" kern="1200">
+                <a:solidFill>
+                  <a:schemeClr val="tx1"/>
+                </a:solidFill>
+                <a:latin typeface="+mn-lt"/>
+                <a:ea typeface="+mn-ea"/>
+                <a:cs typeface="+mn-cs"/>
+              </a:defRPr>
+            </a:lvl6pPr>
+            <a:lvl7pPr marL="2971800" indent="-228600" algn="l" defTabSz="914400" rtl="0" eaLnBrk="1" latinLnBrk="0" hangingPunct="1">
+              <a:lnSpc>
+                <a:spcPct val="90000"/>
+              </a:lnSpc>
+              <a:spcBef>
+                <a:spcPts val="500"/>
+              </a:spcBef>
+              <a:buFont typeface="Arial" panose="020B0604020202020204" pitchFamily="34" charset="0"/>
+              <a:buChar char="•"/>
+              <a:defRPr sz="1800" kern="1200">
+                <a:solidFill>
+                  <a:schemeClr val="tx1"/>
+                </a:solidFill>
+                <a:latin typeface="+mn-lt"/>
+                <a:ea typeface="+mn-ea"/>
+                <a:cs typeface="+mn-cs"/>
+              </a:defRPr>
+            </a:lvl7pPr>
+            <a:lvl8pPr marL="3429000" indent="-228600" algn="l" defTabSz="914400" rtl="0" eaLnBrk="1" latinLnBrk="0" hangingPunct="1">
+              <a:lnSpc>
+                <a:spcPct val="90000"/>
+              </a:lnSpc>
+              <a:spcBef>
+                <a:spcPts val="500"/>
+              </a:spcBef>
+              <a:buFont typeface="Arial" panose="020B0604020202020204" pitchFamily="34" charset="0"/>
+              <a:buChar char="•"/>
+              <a:defRPr sz="1800" kern="1200">
+                <a:solidFill>
+                  <a:schemeClr val="tx1"/>
+                </a:solidFill>
+                <a:latin typeface="+mn-lt"/>
+                <a:ea typeface="+mn-ea"/>
+                <a:cs typeface="+mn-cs"/>
+              </a:defRPr>
+            </a:lvl8pPr>
+            <a:lvl9pPr marL="3886200" indent="-228600" algn="l" defTabSz="914400" rtl="0" eaLnBrk="1" latinLnBrk="0" hangingPunct="1">
+              <a:lnSpc>
+                <a:spcPct val="90000"/>
+              </a:lnSpc>
+              <a:spcBef>
+                <a:spcPts val="500"/>
+              </a:spcBef>
+              <a:buFont typeface="Arial" panose="020B0604020202020204" pitchFamily="34" charset="0"/>
+              <a:buChar char="•"/>
+              <a:defRPr sz="1800" kern="1200">
+                <a:solidFill>
+                  <a:schemeClr val="tx1"/>
+                </a:solidFill>
+                <a:latin typeface="+mn-lt"/>
+                <a:ea typeface="+mn-ea"/>
+                <a:cs typeface="+mn-cs"/>
+              </a:defRPr>
+            </a:lvl9pPr>
+          </a:lstStyle>
+          <a:p>
+            <a:pPr marL="0" indent="0" algn="ctr">
+              <a:buFont typeface="Arial" panose="020B0604020202020204" pitchFamily="34" charset="0"/>
+              <a:buNone/>
+            </a:pPr>
+            <a:r>
+              <a:rPr lang="en-SG" sz="1600" dirty="0">
+                <a:latin typeface="Arial" panose="020B0604020202020204" pitchFamily="34" charset="0"/>
+                <a:cs typeface="Arial" panose="020B0604020202020204" pitchFamily="34" charset="0"/>
+              </a:rPr>
+              <a:t>Search </a:t>
+            </a:r>
+            <a:r>
+              <a:rPr lang="en-SG" sz="1600" dirty="0" err="1">
+                <a:latin typeface="Arial" panose="020B0604020202020204" pitchFamily="34" charset="0"/>
+                <a:cs typeface="Arial" panose="020B0604020202020204" pitchFamily="34" charset="0"/>
+              </a:rPr>
+              <a:t>Btn</a:t>
+            </a:r>
+            <a:endParaRPr lang="en-SG" sz="1600" dirty="0">
+              <a:latin typeface="Arial" panose="020B0604020202020204" pitchFamily="34" charset="0"/>
+              <a:cs typeface="Arial" panose="020B0604020202020204" pitchFamily="34" charset="0"/>
+            </a:endParaRPr>
+          </a:p>
+        </p:txBody>
+      </p:sp>
+      <p:sp>
+        <p:nvSpPr>
+          <p:cNvPr id="6" name="Content Placeholder 2">
+            <a:extLst>
+              <a:ext uri="{FF2B5EF4-FFF2-40B4-BE49-F238E27FC236}">
+                <a16:creationId xmlns:a16="http://schemas.microsoft.com/office/drawing/2014/main" id="{81F5FC74-726B-10AA-9C81-65E92B4223DE}"/>
+              </a:ext>
+            </a:extLst>
+          </p:cNvPr>
+          <p:cNvSpPr txBox="1">
+            <a:spLocks/>
+          </p:cNvSpPr>
+          <p:nvPr/>
+        </p:nvSpPr>
+        <p:spPr>
+          <a:xfrm>
+            <a:off x="2629775" y="3059869"/>
+            <a:ext cx="1374508" cy="1588912"/>
+          </a:xfrm>
+          <a:prstGeom prst="rect">
+            <a:avLst/>
+          </a:prstGeom>
+          <a:ln>
+            <a:solidFill>
+              <a:schemeClr val="tx1"/>
+            </a:solidFill>
+          </a:ln>
+        </p:spPr>
+        <p:txBody>
+          <a:bodyPr vert="horz" lIns="91440" tIns="45720" rIns="91440" bIns="45720" rtlCol="0">
+            <a:normAutofit/>
+          </a:bodyPr>
+          <a:lstStyle>
+            <a:lvl1pPr marL="228600" indent="-228600" algn="l" defTabSz="914400" rtl="0" eaLnBrk="1" latinLnBrk="0" hangingPunct="1">
+              <a:lnSpc>
+                <a:spcPct val="90000"/>
+              </a:lnSpc>
+              <a:spcBef>
+                <a:spcPts val="1000"/>
+              </a:spcBef>
+              <a:buFont typeface="Arial" panose="020B0604020202020204" pitchFamily="34" charset="0"/>
+              <a:buChar char="•"/>
+              <a:defRPr sz="2800" kern="1200">
+                <a:solidFill>
+                  <a:schemeClr val="tx1"/>
+                </a:solidFill>
+                <a:latin typeface="+mn-lt"/>
+                <a:ea typeface="+mn-ea"/>
+                <a:cs typeface="+mn-cs"/>
+              </a:defRPr>
+            </a:lvl1pPr>
+            <a:lvl2pPr marL="685800" indent="-228600" algn="l" defTabSz="914400" rtl="0" eaLnBrk="1" latinLnBrk="0" hangingPunct="1">
+              <a:lnSpc>
+                <a:spcPct val="90000"/>
+              </a:lnSpc>
+              <a:spcBef>
+                <a:spcPts val="500"/>
+              </a:spcBef>
+              <a:buFont typeface="Arial" panose="020B0604020202020204" pitchFamily="34" charset="0"/>
+              <a:buChar char="•"/>
+              <a:defRPr sz="2400" kern="1200">
+                <a:solidFill>
+                  <a:schemeClr val="tx1"/>
+                </a:solidFill>
+                <a:latin typeface="+mn-lt"/>
+                <a:ea typeface="+mn-ea"/>
+                <a:cs typeface="+mn-cs"/>
+              </a:defRPr>
+            </a:lvl2pPr>
+            <a:lvl3pPr marL="1143000" indent="-228600" algn="l" defTabSz="914400" rtl="0" eaLnBrk="1" latinLnBrk="0" hangingPunct="1">
+              <a:lnSpc>
+                <a:spcPct val="90000"/>
+              </a:lnSpc>
+              <a:spcBef>
+                <a:spcPts val="500"/>
+              </a:spcBef>
+              <a:buFont typeface="Arial" panose="020B0604020202020204" pitchFamily="34" charset="0"/>
+              <a:buChar char="•"/>
+              <a:defRPr sz="2000" kern="1200">
+                <a:solidFill>
+                  <a:schemeClr val="tx1"/>
+                </a:solidFill>
+                <a:latin typeface="+mn-lt"/>
+                <a:ea typeface="+mn-ea"/>
+                <a:cs typeface="+mn-cs"/>
+              </a:defRPr>
+            </a:lvl3pPr>
+            <a:lvl4pPr marL="1600200" indent="-228600" algn="l" defTabSz="914400" rtl="0" eaLnBrk="1" latinLnBrk="0" hangingPunct="1">
+              <a:lnSpc>
+                <a:spcPct val="90000"/>
+              </a:lnSpc>
+              <a:spcBef>
+                <a:spcPts val="500"/>
+              </a:spcBef>
+              <a:buFont typeface="Arial" panose="020B0604020202020204" pitchFamily="34" charset="0"/>
+              <a:buChar char="•"/>
+              <a:defRPr sz="1800" kern="1200">
+                <a:solidFill>
+                  <a:schemeClr val="tx1"/>
+                </a:solidFill>
+                <a:latin typeface="+mn-lt"/>
+                <a:ea typeface="+mn-ea"/>
+                <a:cs typeface="+mn-cs"/>
+              </a:defRPr>
+            </a:lvl4pPr>
+            <a:lvl5pPr marL="2057400" indent="-228600" algn="l" defTabSz="914400" rtl="0" eaLnBrk="1" latinLnBrk="0" hangingPunct="1">
+              <a:lnSpc>
+                <a:spcPct val="90000"/>
+              </a:lnSpc>
+              <a:spcBef>
+                <a:spcPts val="500"/>
+              </a:spcBef>
+              <a:buFont typeface="Arial" panose="020B0604020202020204" pitchFamily="34" charset="0"/>
+              <a:buChar char="•"/>
+              <a:defRPr sz="1800" kern="1200">
+                <a:solidFill>
+                  <a:schemeClr val="tx1"/>
+                </a:solidFill>
+                <a:latin typeface="+mn-lt"/>
+                <a:ea typeface="+mn-ea"/>
+                <a:cs typeface="+mn-cs"/>
+              </a:defRPr>
+            </a:lvl5pPr>
+            <a:lvl6pPr marL="2514600" indent="-228600" algn="l" defTabSz="914400" rtl="0" eaLnBrk="1" latinLnBrk="0" hangingPunct="1">
+              <a:lnSpc>
+                <a:spcPct val="90000"/>
+              </a:lnSpc>
+              <a:spcBef>
+                <a:spcPts val="500"/>
+              </a:spcBef>
+              <a:buFont typeface="Arial" panose="020B0604020202020204" pitchFamily="34" charset="0"/>
+              <a:buChar char="•"/>
+              <a:defRPr sz="1800" kern="1200">
+                <a:solidFill>
+                  <a:schemeClr val="tx1"/>
+                </a:solidFill>
+                <a:latin typeface="+mn-lt"/>
+                <a:ea typeface="+mn-ea"/>
+                <a:cs typeface="+mn-cs"/>
+              </a:defRPr>
+            </a:lvl6pPr>
+            <a:lvl7pPr marL="2971800" indent="-228600" algn="l" defTabSz="914400" rtl="0" eaLnBrk="1" latinLnBrk="0" hangingPunct="1">
+              <a:lnSpc>
+                <a:spcPct val="90000"/>
+              </a:lnSpc>
+              <a:spcBef>
+                <a:spcPts val="500"/>
+              </a:spcBef>
+              <a:buFont typeface="Arial" panose="020B0604020202020204" pitchFamily="34" charset="0"/>
+              <a:buChar char="•"/>
+              <a:defRPr sz="1800" kern="1200">
+                <a:solidFill>
+                  <a:schemeClr val="tx1"/>
+                </a:solidFill>
+                <a:latin typeface="+mn-lt"/>
+                <a:ea typeface="+mn-ea"/>
+                <a:cs typeface="+mn-cs"/>
+              </a:defRPr>
+            </a:lvl7pPr>
+            <a:lvl8pPr marL="3429000" indent="-228600" algn="l" defTabSz="914400" rtl="0" eaLnBrk="1" latinLnBrk="0" hangingPunct="1">
+              <a:lnSpc>
+                <a:spcPct val="90000"/>
+              </a:lnSpc>
+              <a:spcBef>
+                <a:spcPts val="500"/>
+              </a:spcBef>
+              <a:buFont typeface="Arial" panose="020B0604020202020204" pitchFamily="34" charset="0"/>
+              <a:buChar char="•"/>
+              <a:defRPr sz="1800" kern="1200">
+                <a:solidFill>
+                  <a:schemeClr val="tx1"/>
+                </a:solidFill>
+                <a:latin typeface="+mn-lt"/>
+                <a:ea typeface="+mn-ea"/>
+                <a:cs typeface="+mn-cs"/>
+              </a:defRPr>
+            </a:lvl8pPr>
+            <a:lvl9pPr marL="3886200" indent="-228600" algn="l" defTabSz="914400" rtl="0" eaLnBrk="1" latinLnBrk="0" hangingPunct="1">
+              <a:lnSpc>
+                <a:spcPct val="90000"/>
+              </a:lnSpc>
+              <a:spcBef>
+                <a:spcPts val="500"/>
+              </a:spcBef>
+              <a:buFont typeface="Arial" panose="020B0604020202020204" pitchFamily="34" charset="0"/>
+              <a:buChar char="•"/>
+              <a:defRPr sz="1800" kern="1200">
+                <a:solidFill>
+                  <a:schemeClr val="tx1"/>
+                </a:solidFill>
+                <a:latin typeface="+mn-lt"/>
+                <a:ea typeface="+mn-ea"/>
+                <a:cs typeface="+mn-cs"/>
+              </a:defRPr>
+            </a:lvl9pPr>
+          </a:lstStyle>
+          <a:p>
+            <a:pPr marL="0" indent="0" algn="ctr">
+              <a:buFont typeface="Arial" panose="020B0604020202020204" pitchFamily="34" charset="0"/>
+              <a:buNone/>
+            </a:pPr>
+            <a:r>
+              <a:rPr lang="en-SG" sz="1600" dirty="0">
+                <a:latin typeface="Arial" panose="020B0604020202020204" pitchFamily="34" charset="0"/>
+                <a:cs typeface="Arial" panose="020B0604020202020204" pitchFamily="34" charset="0"/>
+              </a:rPr>
+              <a:t>Image of cocktail</a:t>
+            </a:r>
+          </a:p>
+          <a:p>
+            <a:pPr marL="0" indent="0" algn="ctr">
+              <a:buFont typeface="Arial" panose="020B0604020202020204" pitchFamily="34" charset="0"/>
+              <a:buNone/>
+            </a:pPr>
+            <a:endParaRPr lang="en-SG" sz="1600" dirty="0">
+              <a:latin typeface="Arial" panose="020B0604020202020204" pitchFamily="34" charset="0"/>
+              <a:cs typeface="Arial" panose="020B0604020202020204" pitchFamily="34" charset="0"/>
+            </a:endParaRPr>
+          </a:p>
+          <a:p>
+            <a:pPr marL="0" indent="0" algn="ctr">
+              <a:buFont typeface="Arial" panose="020B0604020202020204" pitchFamily="34" charset="0"/>
+              <a:buNone/>
+            </a:pPr>
+            <a:r>
+              <a:rPr lang="en-SG" sz="1600" dirty="0">
+                <a:latin typeface="Arial" panose="020B0604020202020204" pitchFamily="34" charset="0"/>
+                <a:cs typeface="Arial" panose="020B0604020202020204" pitchFamily="34" charset="0"/>
+              </a:rPr>
+              <a:t>Name of cocktail</a:t>
+            </a:r>
+          </a:p>
+        </p:txBody>
+      </p:sp>
+      <p:sp>
+        <p:nvSpPr>
+          <p:cNvPr id="7" name="Content Placeholder 2">
+            <a:extLst>
+              <a:ext uri="{FF2B5EF4-FFF2-40B4-BE49-F238E27FC236}">
+                <a16:creationId xmlns:a16="http://schemas.microsoft.com/office/drawing/2014/main" id="{0561CEB2-E92E-DD6D-7A50-05AC683F891F}"/>
+              </a:ext>
+            </a:extLst>
+          </p:cNvPr>
+          <p:cNvSpPr txBox="1">
+            <a:spLocks/>
+          </p:cNvSpPr>
+          <p:nvPr/>
+        </p:nvSpPr>
+        <p:spPr>
+          <a:xfrm>
+            <a:off x="4215433" y="3059869"/>
+            <a:ext cx="1374508" cy="1588912"/>
+          </a:xfrm>
+          <a:prstGeom prst="rect">
+            <a:avLst/>
+          </a:prstGeom>
+          <a:ln>
+            <a:solidFill>
+              <a:schemeClr val="tx1"/>
+            </a:solidFill>
+          </a:ln>
+        </p:spPr>
+        <p:txBody>
+          <a:bodyPr vert="horz" lIns="91440" tIns="45720" rIns="91440" bIns="45720" rtlCol="0">
+            <a:normAutofit/>
+          </a:bodyPr>
+          <a:lstStyle>
+            <a:lvl1pPr marL="228600" indent="-228600" algn="l" defTabSz="914400" rtl="0" eaLnBrk="1" latinLnBrk="0" hangingPunct="1">
+              <a:lnSpc>
+                <a:spcPct val="90000"/>
+              </a:lnSpc>
+              <a:spcBef>
+                <a:spcPts val="1000"/>
+              </a:spcBef>
+              <a:buFont typeface="Arial" panose="020B0604020202020204" pitchFamily="34" charset="0"/>
+              <a:buChar char="•"/>
+              <a:defRPr sz="2800" kern="1200">
+                <a:solidFill>
+                  <a:schemeClr val="tx1"/>
+                </a:solidFill>
+                <a:latin typeface="+mn-lt"/>
+                <a:ea typeface="+mn-ea"/>
+                <a:cs typeface="+mn-cs"/>
+              </a:defRPr>
+            </a:lvl1pPr>
+            <a:lvl2pPr marL="685800" indent="-228600" algn="l" defTabSz="914400" rtl="0" eaLnBrk="1" latinLnBrk="0" hangingPunct="1">
+              <a:lnSpc>
+                <a:spcPct val="90000"/>
+              </a:lnSpc>
+              <a:spcBef>
+                <a:spcPts val="500"/>
+              </a:spcBef>
+              <a:buFont typeface="Arial" panose="020B0604020202020204" pitchFamily="34" charset="0"/>
+              <a:buChar char="•"/>
+              <a:defRPr sz="2400" kern="1200">
+                <a:solidFill>
+                  <a:schemeClr val="tx1"/>
+                </a:solidFill>
+                <a:latin typeface="+mn-lt"/>
+                <a:ea typeface="+mn-ea"/>
+                <a:cs typeface="+mn-cs"/>
+              </a:defRPr>
+            </a:lvl2pPr>
+            <a:lvl3pPr marL="1143000" indent="-228600" algn="l" defTabSz="914400" rtl="0" eaLnBrk="1" latinLnBrk="0" hangingPunct="1">
+              <a:lnSpc>
+                <a:spcPct val="90000"/>
+              </a:lnSpc>
+              <a:spcBef>
+                <a:spcPts val="500"/>
+              </a:spcBef>
+              <a:buFont typeface="Arial" panose="020B0604020202020204" pitchFamily="34" charset="0"/>
+              <a:buChar char="•"/>
+              <a:defRPr sz="2000" kern="1200">
+                <a:solidFill>
+                  <a:schemeClr val="tx1"/>
+                </a:solidFill>
+                <a:latin typeface="+mn-lt"/>
+                <a:ea typeface="+mn-ea"/>
+                <a:cs typeface="+mn-cs"/>
+              </a:defRPr>
+            </a:lvl3pPr>
+            <a:lvl4pPr marL="1600200" indent="-228600" algn="l" defTabSz="914400" rtl="0" eaLnBrk="1" latinLnBrk="0" hangingPunct="1">
+              <a:lnSpc>
+                <a:spcPct val="90000"/>
+              </a:lnSpc>
+              <a:spcBef>
+                <a:spcPts val="500"/>
+              </a:spcBef>
+              <a:buFont typeface="Arial" panose="020B0604020202020204" pitchFamily="34" charset="0"/>
+              <a:buChar char="•"/>
+              <a:defRPr sz="1800" kern="1200">
+                <a:solidFill>
+                  <a:schemeClr val="tx1"/>
+                </a:solidFill>
+                <a:latin typeface="+mn-lt"/>
+                <a:ea typeface="+mn-ea"/>
+                <a:cs typeface="+mn-cs"/>
+              </a:defRPr>
+            </a:lvl4pPr>
+            <a:lvl5pPr marL="2057400" indent="-228600" algn="l" defTabSz="914400" rtl="0" eaLnBrk="1" latinLnBrk="0" hangingPunct="1">
+              <a:lnSpc>
+                <a:spcPct val="90000"/>
+              </a:lnSpc>
+              <a:spcBef>
+                <a:spcPts val="500"/>
+              </a:spcBef>
+              <a:buFont typeface="Arial" panose="020B0604020202020204" pitchFamily="34" charset="0"/>
+              <a:buChar char="•"/>
+              <a:defRPr sz="1800" kern="1200">
+                <a:solidFill>
+                  <a:schemeClr val="tx1"/>
+                </a:solidFill>
+                <a:latin typeface="+mn-lt"/>
+                <a:ea typeface="+mn-ea"/>
+                <a:cs typeface="+mn-cs"/>
+              </a:defRPr>
+            </a:lvl5pPr>
+            <a:lvl6pPr marL="2514600" indent="-228600" algn="l" defTabSz="914400" rtl="0" eaLnBrk="1" latinLnBrk="0" hangingPunct="1">
+              <a:lnSpc>
+                <a:spcPct val="90000"/>
+              </a:lnSpc>
+              <a:spcBef>
+                <a:spcPts val="500"/>
+              </a:spcBef>
+              <a:buFont typeface="Arial" panose="020B0604020202020204" pitchFamily="34" charset="0"/>
+              <a:buChar char="•"/>
+              <a:defRPr sz="1800" kern="1200">
+                <a:solidFill>
+                  <a:schemeClr val="tx1"/>
+                </a:solidFill>
+                <a:latin typeface="+mn-lt"/>
+                <a:ea typeface="+mn-ea"/>
+                <a:cs typeface="+mn-cs"/>
+              </a:defRPr>
+            </a:lvl6pPr>
+            <a:lvl7pPr marL="2971800" indent="-228600" algn="l" defTabSz="914400" rtl="0" eaLnBrk="1" latinLnBrk="0" hangingPunct="1">
+              <a:lnSpc>
+                <a:spcPct val="90000"/>
+              </a:lnSpc>
+              <a:spcBef>
+                <a:spcPts val="500"/>
+              </a:spcBef>
+              <a:buFont typeface="Arial" panose="020B0604020202020204" pitchFamily="34" charset="0"/>
+              <a:buChar char="•"/>
+              <a:defRPr sz="1800" kern="1200">
+                <a:solidFill>
+                  <a:schemeClr val="tx1"/>
+                </a:solidFill>
+                <a:latin typeface="+mn-lt"/>
+                <a:ea typeface="+mn-ea"/>
+                <a:cs typeface="+mn-cs"/>
+              </a:defRPr>
+            </a:lvl7pPr>
+            <a:lvl8pPr marL="3429000" indent="-228600" algn="l" defTabSz="914400" rtl="0" eaLnBrk="1" latinLnBrk="0" hangingPunct="1">
+              <a:lnSpc>
+                <a:spcPct val="90000"/>
+              </a:lnSpc>
+              <a:spcBef>
+                <a:spcPts val="500"/>
+              </a:spcBef>
+              <a:buFont typeface="Arial" panose="020B0604020202020204" pitchFamily="34" charset="0"/>
+              <a:buChar char="•"/>
+              <a:defRPr sz="1800" kern="1200">
+                <a:solidFill>
+                  <a:schemeClr val="tx1"/>
+                </a:solidFill>
+                <a:latin typeface="+mn-lt"/>
+                <a:ea typeface="+mn-ea"/>
+                <a:cs typeface="+mn-cs"/>
+              </a:defRPr>
+            </a:lvl8pPr>
+            <a:lvl9pPr marL="3886200" indent="-228600" algn="l" defTabSz="914400" rtl="0" eaLnBrk="1" latinLnBrk="0" hangingPunct="1">
+              <a:lnSpc>
+                <a:spcPct val="90000"/>
+              </a:lnSpc>
+              <a:spcBef>
+                <a:spcPts val="500"/>
+              </a:spcBef>
+              <a:buFont typeface="Arial" panose="020B0604020202020204" pitchFamily="34" charset="0"/>
+              <a:buChar char="•"/>
+              <a:defRPr sz="1800" kern="1200">
+                <a:solidFill>
+                  <a:schemeClr val="tx1"/>
+                </a:solidFill>
+                <a:latin typeface="+mn-lt"/>
+                <a:ea typeface="+mn-ea"/>
+                <a:cs typeface="+mn-cs"/>
+              </a:defRPr>
+            </a:lvl9pPr>
+          </a:lstStyle>
+          <a:p>
+            <a:pPr marL="0" indent="0" algn="ctr">
+              <a:buFont typeface="Arial" panose="020B0604020202020204" pitchFamily="34" charset="0"/>
+              <a:buNone/>
+            </a:pPr>
+            <a:r>
+              <a:rPr lang="en-SG" sz="1600" dirty="0">
+                <a:latin typeface="Arial" panose="020B0604020202020204" pitchFamily="34" charset="0"/>
+                <a:cs typeface="Arial" panose="020B0604020202020204" pitchFamily="34" charset="0"/>
+              </a:rPr>
+              <a:t>Image of cocktail</a:t>
+            </a:r>
+          </a:p>
+          <a:p>
+            <a:pPr marL="0" indent="0" algn="ctr">
+              <a:buFont typeface="Arial" panose="020B0604020202020204" pitchFamily="34" charset="0"/>
+              <a:buNone/>
+            </a:pPr>
+            <a:endParaRPr lang="en-SG" sz="1600" dirty="0">
+              <a:latin typeface="Arial" panose="020B0604020202020204" pitchFamily="34" charset="0"/>
+              <a:cs typeface="Arial" panose="020B0604020202020204" pitchFamily="34" charset="0"/>
+            </a:endParaRPr>
+          </a:p>
+          <a:p>
+            <a:pPr marL="0" indent="0" algn="ctr">
+              <a:buFont typeface="Arial" panose="020B0604020202020204" pitchFamily="34" charset="0"/>
+              <a:buNone/>
+            </a:pPr>
+            <a:r>
+              <a:rPr lang="en-SG" sz="1600" dirty="0">
+                <a:latin typeface="Arial" panose="020B0604020202020204" pitchFamily="34" charset="0"/>
+                <a:cs typeface="Arial" panose="020B0604020202020204" pitchFamily="34" charset="0"/>
+              </a:rPr>
+              <a:t>Name of cocktail</a:t>
+            </a:r>
+          </a:p>
+        </p:txBody>
+      </p:sp>
+      <p:sp>
+        <p:nvSpPr>
+          <p:cNvPr id="8" name="Content Placeholder 2">
+            <a:extLst>
+              <a:ext uri="{FF2B5EF4-FFF2-40B4-BE49-F238E27FC236}">
+                <a16:creationId xmlns:a16="http://schemas.microsoft.com/office/drawing/2014/main" id="{BABA6A18-042B-1198-2352-CAADAFABEE07}"/>
+              </a:ext>
+            </a:extLst>
+          </p:cNvPr>
+          <p:cNvSpPr txBox="1">
+            <a:spLocks/>
+          </p:cNvSpPr>
+          <p:nvPr/>
+        </p:nvSpPr>
+        <p:spPr>
+          <a:xfrm>
+            <a:off x="5828426" y="3059869"/>
+            <a:ext cx="1374508" cy="1588912"/>
+          </a:xfrm>
+          <a:prstGeom prst="rect">
+            <a:avLst/>
+          </a:prstGeom>
+          <a:ln>
+            <a:solidFill>
+              <a:schemeClr val="tx1"/>
+            </a:solidFill>
+          </a:ln>
+        </p:spPr>
+        <p:txBody>
+          <a:bodyPr vert="horz" lIns="91440" tIns="45720" rIns="91440" bIns="45720" rtlCol="0">
+            <a:normAutofit/>
+          </a:bodyPr>
+          <a:lstStyle>
+            <a:lvl1pPr marL="228600" indent="-228600" algn="l" defTabSz="914400" rtl="0" eaLnBrk="1" latinLnBrk="0" hangingPunct="1">
+              <a:lnSpc>
+                <a:spcPct val="90000"/>
+              </a:lnSpc>
+              <a:spcBef>
+                <a:spcPts val="1000"/>
+              </a:spcBef>
+              <a:buFont typeface="Arial" panose="020B0604020202020204" pitchFamily="34" charset="0"/>
+              <a:buChar char="•"/>
+              <a:defRPr sz="2800" kern="1200">
+                <a:solidFill>
+                  <a:schemeClr val="tx1"/>
+                </a:solidFill>
+                <a:latin typeface="+mn-lt"/>
+                <a:ea typeface="+mn-ea"/>
+                <a:cs typeface="+mn-cs"/>
+              </a:defRPr>
+            </a:lvl1pPr>
+            <a:lvl2pPr marL="685800" indent="-228600" algn="l" defTabSz="914400" rtl="0" eaLnBrk="1" latinLnBrk="0" hangingPunct="1">
+              <a:lnSpc>
+                <a:spcPct val="90000"/>
+              </a:lnSpc>
+              <a:spcBef>
+                <a:spcPts val="500"/>
+              </a:spcBef>
+              <a:buFont typeface="Arial" panose="020B0604020202020204" pitchFamily="34" charset="0"/>
+              <a:buChar char="•"/>
+              <a:defRPr sz="2400" kern="1200">
+                <a:solidFill>
+                  <a:schemeClr val="tx1"/>
+                </a:solidFill>
+                <a:latin typeface="+mn-lt"/>
+                <a:ea typeface="+mn-ea"/>
+                <a:cs typeface="+mn-cs"/>
+              </a:defRPr>
+            </a:lvl2pPr>
+            <a:lvl3pPr marL="1143000" indent="-228600" algn="l" defTabSz="914400" rtl="0" eaLnBrk="1" latinLnBrk="0" hangingPunct="1">
+              <a:lnSpc>
+                <a:spcPct val="90000"/>
+              </a:lnSpc>
+              <a:spcBef>
+                <a:spcPts val="500"/>
+              </a:spcBef>
+              <a:buFont typeface="Arial" panose="020B0604020202020204" pitchFamily="34" charset="0"/>
+              <a:buChar char="•"/>
+              <a:defRPr sz="2000" kern="1200">
+                <a:solidFill>
+                  <a:schemeClr val="tx1"/>
+                </a:solidFill>
+                <a:latin typeface="+mn-lt"/>
+                <a:ea typeface="+mn-ea"/>
+                <a:cs typeface="+mn-cs"/>
+              </a:defRPr>
+            </a:lvl3pPr>
+            <a:lvl4pPr marL="1600200" indent="-228600" algn="l" defTabSz="914400" rtl="0" eaLnBrk="1" latinLnBrk="0" hangingPunct="1">
+              <a:lnSpc>
+                <a:spcPct val="90000"/>
+              </a:lnSpc>
+              <a:spcBef>
+                <a:spcPts val="500"/>
+              </a:spcBef>
+              <a:buFont typeface="Arial" panose="020B0604020202020204" pitchFamily="34" charset="0"/>
+              <a:buChar char="•"/>
+              <a:defRPr sz="1800" kern="1200">
+                <a:solidFill>
+                  <a:schemeClr val="tx1"/>
+                </a:solidFill>
+                <a:latin typeface="+mn-lt"/>
+                <a:ea typeface="+mn-ea"/>
+                <a:cs typeface="+mn-cs"/>
+              </a:defRPr>
+            </a:lvl4pPr>
+            <a:lvl5pPr marL="2057400" indent="-228600" algn="l" defTabSz="914400" rtl="0" eaLnBrk="1" latinLnBrk="0" hangingPunct="1">
+              <a:lnSpc>
+                <a:spcPct val="90000"/>
+              </a:lnSpc>
+              <a:spcBef>
+                <a:spcPts val="500"/>
+              </a:spcBef>
+              <a:buFont typeface="Arial" panose="020B0604020202020204" pitchFamily="34" charset="0"/>
+              <a:buChar char="•"/>
+              <a:defRPr sz="1800" kern="1200">
+                <a:solidFill>
+                  <a:schemeClr val="tx1"/>
+                </a:solidFill>
+                <a:latin typeface="+mn-lt"/>
+                <a:ea typeface="+mn-ea"/>
+                <a:cs typeface="+mn-cs"/>
+              </a:defRPr>
+            </a:lvl5pPr>
+            <a:lvl6pPr marL="2514600" indent="-228600" algn="l" defTabSz="914400" rtl="0" eaLnBrk="1" latinLnBrk="0" hangingPunct="1">
+              <a:lnSpc>
+                <a:spcPct val="90000"/>
+              </a:lnSpc>
+              <a:spcBef>
+                <a:spcPts val="500"/>
+              </a:spcBef>
+              <a:buFont typeface="Arial" panose="020B0604020202020204" pitchFamily="34" charset="0"/>
+              <a:buChar char="•"/>
+              <a:defRPr sz="1800" kern="1200">
+                <a:solidFill>
+                  <a:schemeClr val="tx1"/>
+                </a:solidFill>
+                <a:latin typeface="+mn-lt"/>
+                <a:ea typeface="+mn-ea"/>
+                <a:cs typeface="+mn-cs"/>
+              </a:defRPr>
+            </a:lvl6pPr>
+            <a:lvl7pPr marL="2971800" indent="-228600" algn="l" defTabSz="914400" rtl="0" eaLnBrk="1" latinLnBrk="0" hangingPunct="1">
+              <a:lnSpc>
+                <a:spcPct val="90000"/>
+              </a:lnSpc>
+              <a:spcBef>
+                <a:spcPts val="500"/>
+              </a:spcBef>
+              <a:buFont typeface="Arial" panose="020B0604020202020204" pitchFamily="34" charset="0"/>
+              <a:buChar char="•"/>
+              <a:defRPr sz="1800" kern="1200">
+                <a:solidFill>
+                  <a:schemeClr val="tx1"/>
+                </a:solidFill>
+                <a:latin typeface="+mn-lt"/>
+                <a:ea typeface="+mn-ea"/>
+                <a:cs typeface="+mn-cs"/>
+              </a:defRPr>
+            </a:lvl7pPr>
+            <a:lvl8pPr marL="3429000" indent="-228600" algn="l" defTabSz="914400" rtl="0" eaLnBrk="1" latinLnBrk="0" hangingPunct="1">
+              <a:lnSpc>
+                <a:spcPct val="90000"/>
+              </a:lnSpc>
+              <a:spcBef>
+                <a:spcPts val="500"/>
+              </a:spcBef>
+              <a:buFont typeface="Arial" panose="020B0604020202020204" pitchFamily="34" charset="0"/>
+              <a:buChar char="•"/>
+              <a:defRPr sz="1800" kern="1200">
+                <a:solidFill>
+                  <a:schemeClr val="tx1"/>
+                </a:solidFill>
+                <a:latin typeface="+mn-lt"/>
+                <a:ea typeface="+mn-ea"/>
+                <a:cs typeface="+mn-cs"/>
+              </a:defRPr>
+            </a:lvl8pPr>
+            <a:lvl9pPr marL="3886200" indent="-228600" algn="l" defTabSz="914400" rtl="0" eaLnBrk="1" latinLnBrk="0" hangingPunct="1">
+              <a:lnSpc>
+                <a:spcPct val="90000"/>
+              </a:lnSpc>
+              <a:spcBef>
+                <a:spcPts val="500"/>
+              </a:spcBef>
+              <a:buFont typeface="Arial" panose="020B0604020202020204" pitchFamily="34" charset="0"/>
+              <a:buChar char="•"/>
+              <a:defRPr sz="1800" kern="1200">
+                <a:solidFill>
+                  <a:schemeClr val="tx1"/>
+                </a:solidFill>
+                <a:latin typeface="+mn-lt"/>
+                <a:ea typeface="+mn-ea"/>
+                <a:cs typeface="+mn-cs"/>
+              </a:defRPr>
+            </a:lvl9pPr>
+          </a:lstStyle>
+          <a:p>
+            <a:pPr marL="0" indent="0" algn="ctr">
+              <a:buFont typeface="Arial" panose="020B0604020202020204" pitchFamily="34" charset="0"/>
+              <a:buNone/>
+            </a:pPr>
+            <a:r>
+              <a:rPr lang="en-SG" sz="1600" dirty="0">
+                <a:latin typeface="Arial" panose="020B0604020202020204" pitchFamily="34" charset="0"/>
+                <a:cs typeface="Arial" panose="020B0604020202020204" pitchFamily="34" charset="0"/>
+              </a:rPr>
+              <a:t>Image of cocktail</a:t>
+            </a:r>
+          </a:p>
+          <a:p>
+            <a:pPr marL="0" indent="0" algn="ctr">
+              <a:buFont typeface="Arial" panose="020B0604020202020204" pitchFamily="34" charset="0"/>
+              <a:buNone/>
+            </a:pPr>
+            <a:endParaRPr lang="en-SG" sz="1600" dirty="0">
+              <a:latin typeface="Arial" panose="020B0604020202020204" pitchFamily="34" charset="0"/>
+              <a:cs typeface="Arial" panose="020B0604020202020204" pitchFamily="34" charset="0"/>
+            </a:endParaRPr>
+          </a:p>
+          <a:p>
+            <a:pPr marL="0" indent="0" algn="ctr">
+              <a:buFont typeface="Arial" panose="020B0604020202020204" pitchFamily="34" charset="0"/>
+              <a:buNone/>
+            </a:pPr>
+            <a:r>
+              <a:rPr lang="en-SG" sz="1600" dirty="0">
+                <a:latin typeface="Arial" panose="020B0604020202020204" pitchFamily="34" charset="0"/>
+                <a:cs typeface="Arial" panose="020B0604020202020204" pitchFamily="34" charset="0"/>
+              </a:rPr>
+              <a:t>Name of cocktail</a:t>
+            </a:r>
+          </a:p>
+        </p:txBody>
+      </p:sp>
+      <p:sp>
+        <p:nvSpPr>
+          <p:cNvPr id="9" name="Content Placeholder 2">
+            <a:extLst>
+              <a:ext uri="{FF2B5EF4-FFF2-40B4-BE49-F238E27FC236}">
+                <a16:creationId xmlns:a16="http://schemas.microsoft.com/office/drawing/2014/main" id="{C1A83330-F1B8-CE6A-F982-F0A670D7E173}"/>
+              </a:ext>
+            </a:extLst>
+          </p:cNvPr>
+          <p:cNvSpPr txBox="1">
+            <a:spLocks/>
+          </p:cNvSpPr>
+          <p:nvPr/>
+        </p:nvSpPr>
+        <p:spPr>
+          <a:xfrm>
+            <a:off x="7441419" y="3059869"/>
+            <a:ext cx="1374508" cy="1588912"/>
+          </a:xfrm>
+          <a:prstGeom prst="rect">
+            <a:avLst/>
+          </a:prstGeom>
+          <a:ln>
+            <a:solidFill>
+              <a:schemeClr val="tx1"/>
+            </a:solidFill>
+          </a:ln>
+        </p:spPr>
+        <p:txBody>
+          <a:bodyPr vert="horz" lIns="91440" tIns="45720" rIns="91440" bIns="45720" rtlCol="0">
+            <a:normAutofit/>
+          </a:bodyPr>
+          <a:lstStyle>
+            <a:lvl1pPr marL="228600" indent="-228600" algn="l" defTabSz="914400" rtl="0" eaLnBrk="1" latinLnBrk="0" hangingPunct="1">
+              <a:lnSpc>
+                <a:spcPct val="90000"/>
+              </a:lnSpc>
+              <a:spcBef>
+                <a:spcPts val="1000"/>
+              </a:spcBef>
+              <a:buFont typeface="Arial" panose="020B0604020202020204" pitchFamily="34" charset="0"/>
+              <a:buChar char="•"/>
+              <a:defRPr sz="2800" kern="1200">
+                <a:solidFill>
+                  <a:schemeClr val="tx1"/>
+                </a:solidFill>
+                <a:latin typeface="+mn-lt"/>
+                <a:ea typeface="+mn-ea"/>
+                <a:cs typeface="+mn-cs"/>
+              </a:defRPr>
+            </a:lvl1pPr>
+            <a:lvl2pPr marL="685800" indent="-228600" algn="l" defTabSz="914400" rtl="0" eaLnBrk="1" latinLnBrk="0" hangingPunct="1">
+              <a:lnSpc>
+                <a:spcPct val="90000"/>
+              </a:lnSpc>
+              <a:spcBef>
+                <a:spcPts val="500"/>
+              </a:spcBef>
+              <a:buFont typeface="Arial" panose="020B0604020202020204" pitchFamily="34" charset="0"/>
+              <a:buChar char="•"/>
+              <a:defRPr sz="2400" kern="1200">
+                <a:solidFill>
+                  <a:schemeClr val="tx1"/>
+                </a:solidFill>
+                <a:latin typeface="+mn-lt"/>
+                <a:ea typeface="+mn-ea"/>
+                <a:cs typeface="+mn-cs"/>
+              </a:defRPr>
+            </a:lvl2pPr>
+            <a:lvl3pPr marL="1143000" indent="-228600" algn="l" defTabSz="914400" rtl="0" eaLnBrk="1" latinLnBrk="0" hangingPunct="1">
+              <a:lnSpc>
+                <a:spcPct val="90000"/>
+              </a:lnSpc>
+              <a:spcBef>
+                <a:spcPts val="500"/>
+              </a:spcBef>
+              <a:buFont typeface="Arial" panose="020B0604020202020204" pitchFamily="34" charset="0"/>
+              <a:buChar char="•"/>
+              <a:defRPr sz="2000" kern="1200">
+                <a:solidFill>
+                  <a:schemeClr val="tx1"/>
+                </a:solidFill>
+                <a:latin typeface="+mn-lt"/>
+                <a:ea typeface="+mn-ea"/>
+                <a:cs typeface="+mn-cs"/>
+              </a:defRPr>
+            </a:lvl3pPr>
+            <a:lvl4pPr marL="1600200" indent="-228600" algn="l" defTabSz="914400" rtl="0" eaLnBrk="1" latinLnBrk="0" hangingPunct="1">
+              <a:lnSpc>
+                <a:spcPct val="90000"/>
+              </a:lnSpc>
+              <a:spcBef>
+                <a:spcPts val="500"/>
+              </a:spcBef>
+              <a:buFont typeface="Arial" panose="020B0604020202020204" pitchFamily="34" charset="0"/>
+              <a:buChar char="•"/>
+              <a:defRPr sz="1800" kern="1200">
+                <a:solidFill>
+                  <a:schemeClr val="tx1"/>
+                </a:solidFill>
+                <a:latin typeface="+mn-lt"/>
+                <a:ea typeface="+mn-ea"/>
+                <a:cs typeface="+mn-cs"/>
+              </a:defRPr>
+            </a:lvl4pPr>
+            <a:lvl5pPr marL="2057400" indent="-228600" algn="l" defTabSz="914400" rtl="0" eaLnBrk="1" latinLnBrk="0" hangingPunct="1">
+              <a:lnSpc>
+                <a:spcPct val="90000"/>
+              </a:lnSpc>
+              <a:spcBef>
+                <a:spcPts val="500"/>
+              </a:spcBef>
+              <a:buFont typeface="Arial" panose="020B0604020202020204" pitchFamily="34" charset="0"/>
+              <a:buChar char="•"/>
+              <a:defRPr sz="1800" kern="1200">
+                <a:solidFill>
+                  <a:schemeClr val="tx1"/>
+                </a:solidFill>
+                <a:latin typeface="+mn-lt"/>
+                <a:ea typeface="+mn-ea"/>
+                <a:cs typeface="+mn-cs"/>
+              </a:defRPr>
+            </a:lvl5pPr>
+            <a:lvl6pPr marL="2514600" indent="-228600" algn="l" defTabSz="914400" rtl="0" eaLnBrk="1" latinLnBrk="0" hangingPunct="1">
+              <a:lnSpc>
+                <a:spcPct val="90000"/>
+              </a:lnSpc>
+              <a:spcBef>
+                <a:spcPts val="500"/>
+              </a:spcBef>
+              <a:buFont typeface="Arial" panose="020B0604020202020204" pitchFamily="34" charset="0"/>
+              <a:buChar char="•"/>
+              <a:defRPr sz="1800" kern="1200">
+                <a:solidFill>
+                  <a:schemeClr val="tx1"/>
+                </a:solidFill>
+                <a:latin typeface="+mn-lt"/>
+                <a:ea typeface="+mn-ea"/>
+                <a:cs typeface="+mn-cs"/>
+              </a:defRPr>
+            </a:lvl6pPr>
+            <a:lvl7pPr marL="2971800" indent="-228600" algn="l" defTabSz="914400" rtl="0" eaLnBrk="1" latinLnBrk="0" hangingPunct="1">
+              <a:lnSpc>
+                <a:spcPct val="90000"/>
+              </a:lnSpc>
+              <a:spcBef>
+                <a:spcPts val="500"/>
+              </a:spcBef>
+              <a:buFont typeface="Arial" panose="020B0604020202020204" pitchFamily="34" charset="0"/>
+              <a:buChar char="•"/>
+              <a:defRPr sz="1800" kern="1200">
+                <a:solidFill>
+                  <a:schemeClr val="tx1"/>
+                </a:solidFill>
+                <a:latin typeface="+mn-lt"/>
+                <a:ea typeface="+mn-ea"/>
+                <a:cs typeface="+mn-cs"/>
+              </a:defRPr>
+            </a:lvl7pPr>
+            <a:lvl8pPr marL="3429000" indent="-228600" algn="l" defTabSz="914400" rtl="0" eaLnBrk="1" latinLnBrk="0" hangingPunct="1">
+              <a:lnSpc>
+                <a:spcPct val="90000"/>
+              </a:lnSpc>
+              <a:spcBef>
+                <a:spcPts val="500"/>
+              </a:spcBef>
+              <a:buFont typeface="Arial" panose="020B0604020202020204" pitchFamily="34" charset="0"/>
+              <a:buChar char="•"/>
+              <a:defRPr sz="1800" kern="1200">
+                <a:solidFill>
+                  <a:schemeClr val="tx1"/>
+                </a:solidFill>
+                <a:latin typeface="+mn-lt"/>
+                <a:ea typeface="+mn-ea"/>
+                <a:cs typeface="+mn-cs"/>
+              </a:defRPr>
+            </a:lvl8pPr>
+            <a:lvl9pPr marL="3886200" indent="-228600" algn="l" defTabSz="914400" rtl="0" eaLnBrk="1" latinLnBrk="0" hangingPunct="1">
+              <a:lnSpc>
+                <a:spcPct val="90000"/>
+              </a:lnSpc>
+              <a:spcBef>
+                <a:spcPts val="500"/>
+              </a:spcBef>
+              <a:buFont typeface="Arial" panose="020B0604020202020204" pitchFamily="34" charset="0"/>
+              <a:buChar char="•"/>
+              <a:defRPr sz="1800" kern="1200">
+                <a:solidFill>
+                  <a:schemeClr val="tx1"/>
+                </a:solidFill>
+                <a:latin typeface="+mn-lt"/>
+                <a:ea typeface="+mn-ea"/>
+                <a:cs typeface="+mn-cs"/>
+              </a:defRPr>
+            </a:lvl9pPr>
+          </a:lstStyle>
+          <a:p>
+            <a:pPr marL="0" indent="0" algn="ctr">
+              <a:buFont typeface="Arial" panose="020B0604020202020204" pitchFamily="34" charset="0"/>
+              <a:buNone/>
+            </a:pPr>
+            <a:r>
+              <a:rPr lang="en-SG" sz="1600" dirty="0">
+                <a:latin typeface="Arial" panose="020B0604020202020204" pitchFamily="34" charset="0"/>
+                <a:cs typeface="Arial" panose="020B0604020202020204" pitchFamily="34" charset="0"/>
+              </a:rPr>
+              <a:t>Image of cocktail</a:t>
+            </a:r>
+          </a:p>
+          <a:p>
+            <a:pPr marL="0" indent="0" algn="ctr">
+              <a:buFont typeface="Arial" panose="020B0604020202020204" pitchFamily="34" charset="0"/>
+              <a:buNone/>
+            </a:pPr>
+            <a:endParaRPr lang="en-SG" sz="1600" dirty="0">
+              <a:latin typeface="Arial" panose="020B0604020202020204" pitchFamily="34" charset="0"/>
+              <a:cs typeface="Arial" panose="020B0604020202020204" pitchFamily="34" charset="0"/>
+            </a:endParaRPr>
+          </a:p>
+          <a:p>
+            <a:pPr marL="0" indent="0" algn="ctr">
+              <a:buFont typeface="Arial" panose="020B0604020202020204" pitchFamily="34" charset="0"/>
+              <a:buNone/>
+            </a:pPr>
+            <a:r>
+              <a:rPr lang="en-SG" sz="1600" dirty="0">
+                <a:latin typeface="Arial" panose="020B0604020202020204" pitchFamily="34" charset="0"/>
+                <a:cs typeface="Arial" panose="020B0604020202020204" pitchFamily="34" charset="0"/>
+              </a:rPr>
+              <a:t>Name of cocktail</a:t>
+            </a:r>
+          </a:p>
+        </p:txBody>
+      </p:sp>
+      <p:sp>
+        <p:nvSpPr>
+          <p:cNvPr id="25" name="Title 1">
+            <a:extLst>
+              <a:ext uri="{FF2B5EF4-FFF2-40B4-BE49-F238E27FC236}">
+                <a16:creationId xmlns:a16="http://schemas.microsoft.com/office/drawing/2014/main" id="{81B8C4FC-4FBF-E871-86B9-91E8031DD335}"/>
+              </a:ext>
+            </a:extLst>
+          </p:cNvPr>
+          <p:cNvSpPr>
+            <a:spLocks noGrp="1"/>
+          </p:cNvSpPr>
+          <p:nvPr>
+            <p:ph type="title"/>
+          </p:nvPr>
+        </p:nvSpPr>
+        <p:spPr>
+          <a:xfrm>
+            <a:off x="697808" y="18125"/>
+            <a:ext cx="5935226" cy="906909"/>
+          </a:xfrm>
+        </p:spPr>
+        <p:txBody>
+          <a:bodyPr/>
+          <a:lstStyle/>
+          <a:p>
+            <a:r>
+              <a:rPr lang="en-SG" dirty="0"/>
+              <a:t>Wireframe</a:t>
+            </a:r>
+          </a:p>
+        </p:txBody>
+      </p:sp>
+      <p:sp>
+        <p:nvSpPr>
+          <p:cNvPr id="30" name="Content Placeholder 2">
+            <a:extLst>
+              <a:ext uri="{FF2B5EF4-FFF2-40B4-BE49-F238E27FC236}">
+                <a16:creationId xmlns:a16="http://schemas.microsoft.com/office/drawing/2014/main" id="{E3A2166F-C55D-4ABA-84AC-74BBE666BE6D}"/>
+              </a:ext>
+            </a:extLst>
+          </p:cNvPr>
+          <p:cNvSpPr txBox="1">
+            <a:spLocks/>
+          </p:cNvSpPr>
+          <p:nvPr/>
+        </p:nvSpPr>
+        <p:spPr>
+          <a:xfrm>
+            <a:off x="5983149" y="1352365"/>
+            <a:ext cx="1374508" cy="263755"/>
+          </a:xfrm>
+          <a:prstGeom prst="rect">
+            <a:avLst/>
+          </a:prstGeom>
+          <a:ln>
+            <a:solidFill>
+              <a:schemeClr val="tx1"/>
+            </a:solidFill>
+          </a:ln>
+        </p:spPr>
+        <p:txBody>
+          <a:bodyPr vert="horz" lIns="91440" tIns="45720" rIns="91440" bIns="45720" rtlCol="0">
+            <a:normAutofit fontScale="92500" lnSpcReduction="20000"/>
+          </a:bodyPr>
+          <a:lstStyle>
+            <a:lvl1pPr marL="228600" indent="-228600" algn="l" defTabSz="914400" rtl="0" eaLnBrk="1" latinLnBrk="0" hangingPunct="1">
+              <a:lnSpc>
+                <a:spcPct val="90000"/>
+              </a:lnSpc>
+              <a:spcBef>
+                <a:spcPts val="1000"/>
+              </a:spcBef>
+              <a:buFont typeface="Arial" panose="020B0604020202020204" pitchFamily="34" charset="0"/>
+              <a:buChar char="•"/>
+              <a:defRPr sz="2800" kern="1200">
+                <a:solidFill>
+                  <a:schemeClr val="tx1"/>
+                </a:solidFill>
+                <a:latin typeface="+mn-lt"/>
+                <a:ea typeface="+mn-ea"/>
+                <a:cs typeface="+mn-cs"/>
+              </a:defRPr>
+            </a:lvl1pPr>
+            <a:lvl2pPr marL="685800" indent="-228600" algn="l" defTabSz="914400" rtl="0" eaLnBrk="1" latinLnBrk="0" hangingPunct="1">
+              <a:lnSpc>
+                <a:spcPct val="90000"/>
+              </a:lnSpc>
+              <a:spcBef>
+                <a:spcPts val="500"/>
+              </a:spcBef>
+              <a:buFont typeface="Arial" panose="020B0604020202020204" pitchFamily="34" charset="0"/>
+              <a:buChar char="•"/>
+              <a:defRPr sz="2400" kern="1200">
+                <a:solidFill>
+                  <a:schemeClr val="tx1"/>
+                </a:solidFill>
+                <a:latin typeface="+mn-lt"/>
+                <a:ea typeface="+mn-ea"/>
+                <a:cs typeface="+mn-cs"/>
+              </a:defRPr>
+            </a:lvl2pPr>
+            <a:lvl3pPr marL="1143000" indent="-228600" algn="l" defTabSz="914400" rtl="0" eaLnBrk="1" latinLnBrk="0" hangingPunct="1">
+              <a:lnSpc>
+                <a:spcPct val="90000"/>
+              </a:lnSpc>
+              <a:spcBef>
+                <a:spcPts val="500"/>
+              </a:spcBef>
+              <a:buFont typeface="Arial" panose="020B0604020202020204" pitchFamily="34" charset="0"/>
+              <a:buChar char="•"/>
+              <a:defRPr sz="2000" kern="1200">
+                <a:solidFill>
+                  <a:schemeClr val="tx1"/>
+                </a:solidFill>
+                <a:latin typeface="+mn-lt"/>
+                <a:ea typeface="+mn-ea"/>
+                <a:cs typeface="+mn-cs"/>
+              </a:defRPr>
+            </a:lvl3pPr>
+            <a:lvl4pPr marL="1600200" indent="-228600" algn="l" defTabSz="914400" rtl="0" eaLnBrk="1" latinLnBrk="0" hangingPunct="1">
+              <a:lnSpc>
+                <a:spcPct val="90000"/>
+              </a:lnSpc>
+              <a:spcBef>
+                <a:spcPts val="500"/>
+              </a:spcBef>
+              <a:buFont typeface="Arial" panose="020B0604020202020204" pitchFamily="34" charset="0"/>
+              <a:buChar char="•"/>
+              <a:defRPr sz="1800" kern="1200">
+                <a:solidFill>
+                  <a:schemeClr val="tx1"/>
+                </a:solidFill>
+                <a:latin typeface="+mn-lt"/>
+                <a:ea typeface="+mn-ea"/>
+                <a:cs typeface="+mn-cs"/>
+              </a:defRPr>
+            </a:lvl4pPr>
+            <a:lvl5pPr marL="2057400" indent="-228600" algn="l" defTabSz="914400" rtl="0" eaLnBrk="1" latinLnBrk="0" hangingPunct="1">
+              <a:lnSpc>
+                <a:spcPct val="90000"/>
+              </a:lnSpc>
+              <a:spcBef>
+                <a:spcPts val="500"/>
+              </a:spcBef>
+              <a:buFont typeface="Arial" panose="020B0604020202020204" pitchFamily="34" charset="0"/>
+              <a:buChar char="•"/>
+              <a:defRPr sz="1800" kern="1200">
+                <a:solidFill>
+                  <a:schemeClr val="tx1"/>
+                </a:solidFill>
+                <a:latin typeface="+mn-lt"/>
+                <a:ea typeface="+mn-ea"/>
+                <a:cs typeface="+mn-cs"/>
+              </a:defRPr>
+            </a:lvl5pPr>
+            <a:lvl6pPr marL="2514600" indent="-228600" algn="l" defTabSz="914400" rtl="0" eaLnBrk="1" latinLnBrk="0" hangingPunct="1">
+              <a:lnSpc>
+                <a:spcPct val="90000"/>
+              </a:lnSpc>
+              <a:spcBef>
+                <a:spcPts val="500"/>
+              </a:spcBef>
+              <a:buFont typeface="Arial" panose="020B0604020202020204" pitchFamily="34" charset="0"/>
+              <a:buChar char="•"/>
+              <a:defRPr sz="1800" kern="1200">
+                <a:solidFill>
+                  <a:schemeClr val="tx1"/>
+                </a:solidFill>
+                <a:latin typeface="+mn-lt"/>
+                <a:ea typeface="+mn-ea"/>
+                <a:cs typeface="+mn-cs"/>
+              </a:defRPr>
+            </a:lvl6pPr>
+            <a:lvl7pPr marL="2971800" indent="-228600" algn="l" defTabSz="914400" rtl="0" eaLnBrk="1" latinLnBrk="0" hangingPunct="1">
+              <a:lnSpc>
+                <a:spcPct val="90000"/>
+              </a:lnSpc>
+              <a:spcBef>
+                <a:spcPts val="500"/>
+              </a:spcBef>
+              <a:buFont typeface="Arial" panose="020B0604020202020204" pitchFamily="34" charset="0"/>
+              <a:buChar char="•"/>
+              <a:defRPr sz="1800" kern="1200">
+                <a:solidFill>
+                  <a:schemeClr val="tx1"/>
+                </a:solidFill>
+                <a:latin typeface="+mn-lt"/>
+                <a:ea typeface="+mn-ea"/>
+                <a:cs typeface="+mn-cs"/>
+              </a:defRPr>
+            </a:lvl7pPr>
+            <a:lvl8pPr marL="3429000" indent="-228600" algn="l" defTabSz="914400" rtl="0" eaLnBrk="1" latinLnBrk="0" hangingPunct="1">
+              <a:lnSpc>
+                <a:spcPct val="90000"/>
+              </a:lnSpc>
+              <a:spcBef>
+                <a:spcPts val="500"/>
+              </a:spcBef>
+              <a:buFont typeface="Arial" panose="020B0604020202020204" pitchFamily="34" charset="0"/>
+              <a:buChar char="•"/>
+              <a:defRPr sz="1800" kern="1200">
+                <a:solidFill>
+                  <a:schemeClr val="tx1"/>
+                </a:solidFill>
+                <a:latin typeface="+mn-lt"/>
+                <a:ea typeface="+mn-ea"/>
+                <a:cs typeface="+mn-cs"/>
+              </a:defRPr>
+            </a:lvl8pPr>
+            <a:lvl9pPr marL="3886200" indent="-228600" algn="l" defTabSz="914400" rtl="0" eaLnBrk="1" latinLnBrk="0" hangingPunct="1">
+              <a:lnSpc>
+                <a:spcPct val="90000"/>
+              </a:lnSpc>
+              <a:spcBef>
+                <a:spcPts val="500"/>
+              </a:spcBef>
+              <a:buFont typeface="Arial" panose="020B0604020202020204" pitchFamily="34" charset="0"/>
+              <a:buChar char="•"/>
+              <a:defRPr sz="1800" kern="1200">
+                <a:solidFill>
+                  <a:schemeClr val="tx1"/>
+                </a:solidFill>
+                <a:latin typeface="+mn-lt"/>
+                <a:ea typeface="+mn-ea"/>
+                <a:cs typeface="+mn-cs"/>
+              </a:defRPr>
+            </a:lvl9pPr>
+          </a:lstStyle>
+          <a:p>
+            <a:pPr marL="0" indent="0" algn="ctr">
+              <a:buFont typeface="Arial" panose="020B0604020202020204" pitchFamily="34" charset="0"/>
+              <a:buNone/>
+            </a:pPr>
+            <a:r>
+              <a:rPr lang="en-SG" sz="1600" dirty="0">
+                <a:latin typeface="Arial" panose="020B0604020202020204" pitchFamily="34" charset="0"/>
+                <a:cs typeface="Arial" panose="020B0604020202020204" pitchFamily="34" charset="0"/>
+              </a:rPr>
+              <a:t>By Name</a:t>
+            </a:r>
+          </a:p>
+        </p:txBody>
+      </p:sp>
+      <p:sp>
+        <p:nvSpPr>
+          <p:cNvPr id="31" name="Content Placeholder 2">
+            <a:extLst>
+              <a:ext uri="{FF2B5EF4-FFF2-40B4-BE49-F238E27FC236}">
+                <a16:creationId xmlns:a16="http://schemas.microsoft.com/office/drawing/2014/main" id="{59CD06C1-1A58-8E7F-1778-1A044548AC2F}"/>
+              </a:ext>
+            </a:extLst>
+          </p:cNvPr>
+          <p:cNvSpPr txBox="1">
+            <a:spLocks/>
+          </p:cNvSpPr>
+          <p:nvPr/>
+        </p:nvSpPr>
+        <p:spPr>
+          <a:xfrm>
+            <a:off x="7441419" y="1352365"/>
+            <a:ext cx="1374508" cy="263755"/>
+          </a:xfrm>
+          <a:prstGeom prst="rect">
+            <a:avLst/>
+          </a:prstGeom>
+          <a:ln>
+            <a:solidFill>
+              <a:schemeClr val="tx1"/>
+            </a:solidFill>
+          </a:ln>
+        </p:spPr>
+        <p:txBody>
+          <a:bodyPr vert="horz" lIns="91440" tIns="45720" rIns="91440" bIns="45720" rtlCol="0">
+            <a:normAutofit fontScale="92500" lnSpcReduction="20000"/>
+          </a:bodyPr>
+          <a:lstStyle>
+            <a:lvl1pPr marL="228600" indent="-228600" algn="l" defTabSz="914400" rtl="0" eaLnBrk="1" latinLnBrk="0" hangingPunct="1">
+              <a:lnSpc>
+                <a:spcPct val="90000"/>
+              </a:lnSpc>
+              <a:spcBef>
+                <a:spcPts val="1000"/>
+              </a:spcBef>
+              <a:buFont typeface="Arial" panose="020B0604020202020204" pitchFamily="34" charset="0"/>
+              <a:buChar char="•"/>
+              <a:defRPr sz="2800" kern="1200">
+                <a:solidFill>
+                  <a:schemeClr val="tx1"/>
+                </a:solidFill>
+                <a:latin typeface="+mn-lt"/>
+                <a:ea typeface="+mn-ea"/>
+                <a:cs typeface="+mn-cs"/>
+              </a:defRPr>
+            </a:lvl1pPr>
+            <a:lvl2pPr marL="685800" indent="-228600" algn="l" defTabSz="914400" rtl="0" eaLnBrk="1" latinLnBrk="0" hangingPunct="1">
+              <a:lnSpc>
+                <a:spcPct val="90000"/>
+              </a:lnSpc>
+              <a:spcBef>
+                <a:spcPts val="500"/>
+              </a:spcBef>
+              <a:buFont typeface="Arial" panose="020B0604020202020204" pitchFamily="34" charset="0"/>
+              <a:buChar char="•"/>
+              <a:defRPr sz="2400" kern="1200">
+                <a:solidFill>
+                  <a:schemeClr val="tx1"/>
+                </a:solidFill>
+                <a:latin typeface="+mn-lt"/>
+                <a:ea typeface="+mn-ea"/>
+                <a:cs typeface="+mn-cs"/>
+              </a:defRPr>
+            </a:lvl2pPr>
+            <a:lvl3pPr marL="1143000" indent="-228600" algn="l" defTabSz="914400" rtl="0" eaLnBrk="1" latinLnBrk="0" hangingPunct="1">
+              <a:lnSpc>
+                <a:spcPct val="90000"/>
+              </a:lnSpc>
+              <a:spcBef>
+                <a:spcPts val="500"/>
+              </a:spcBef>
+              <a:buFont typeface="Arial" panose="020B0604020202020204" pitchFamily="34" charset="0"/>
+              <a:buChar char="•"/>
+              <a:defRPr sz="2000" kern="1200">
+                <a:solidFill>
+                  <a:schemeClr val="tx1"/>
+                </a:solidFill>
+                <a:latin typeface="+mn-lt"/>
+                <a:ea typeface="+mn-ea"/>
+                <a:cs typeface="+mn-cs"/>
+              </a:defRPr>
+            </a:lvl3pPr>
+            <a:lvl4pPr marL="1600200" indent="-228600" algn="l" defTabSz="914400" rtl="0" eaLnBrk="1" latinLnBrk="0" hangingPunct="1">
+              <a:lnSpc>
+                <a:spcPct val="90000"/>
+              </a:lnSpc>
+              <a:spcBef>
+                <a:spcPts val="500"/>
+              </a:spcBef>
+              <a:buFont typeface="Arial" panose="020B0604020202020204" pitchFamily="34" charset="0"/>
+              <a:buChar char="•"/>
+              <a:defRPr sz="1800" kern="1200">
+                <a:solidFill>
+                  <a:schemeClr val="tx1"/>
+                </a:solidFill>
+                <a:latin typeface="+mn-lt"/>
+                <a:ea typeface="+mn-ea"/>
+                <a:cs typeface="+mn-cs"/>
+              </a:defRPr>
+            </a:lvl4pPr>
+            <a:lvl5pPr marL="2057400" indent="-228600" algn="l" defTabSz="914400" rtl="0" eaLnBrk="1" latinLnBrk="0" hangingPunct="1">
+              <a:lnSpc>
+                <a:spcPct val="90000"/>
+              </a:lnSpc>
+              <a:spcBef>
+                <a:spcPts val="500"/>
+              </a:spcBef>
+              <a:buFont typeface="Arial" panose="020B0604020202020204" pitchFamily="34" charset="0"/>
+              <a:buChar char="•"/>
+              <a:defRPr sz="1800" kern="1200">
+                <a:solidFill>
+                  <a:schemeClr val="tx1"/>
+                </a:solidFill>
+                <a:latin typeface="+mn-lt"/>
+                <a:ea typeface="+mn-ea"/>
+                <a:cs typeface="+mn-cs"/>
+              </a:defRPr>
+            </a:lvl5pPr>
+            <a:lvl6pPr marL="2514600" indent="-228600" algn="l" defTabSz="914400" rtl="0" eaLnBrk="1" latinLnBrk="0" hangingPunct="1">
+              <a:lnSpc>
+                <a:spcPct val="90000"/>
+              </a:lnSpc>
+              <a:spcBef>
+                <a:spcPts val="500"/>
+              </a:spcBef>
+              <a:buFont typeface="Arial" panose="020B0604020202020204" pitchFamily="34" charset="0"/>
+              <a:buChar char="•"/>
+              <a:defRPr sz="1800" kern="1200">
+                <a:solidFill>
+                  <a:schemeClr val="tx1"/>
+                </a:solidFill>
+                <a:latin typeface="+mn-lt"/>
+                <a:ea typeface="+mn-ea"/>
+                <a:cs typeface="+mn-cs"/>
+              </a:defRPr>
+            </a:lvl6pPr>
+            <a:lvl7pPr marL="2971800" indent="-228600" algn="l" defTabSz="914400" rtl="0" eaLnBrk="1" latinLnBrk="0" hangingPunct="1">
+              <a:lnSpc>
+                <a:spcPct val="90000"/>
+              </a:lnSpc>
+              <a:spcBef>
+                <a:spcPts val="500"/>
+              </a:spcBef>
+              <a:buFont typeface="Arial" panose="020B0604020202020204" pitchFamily="34" charset="0"/>
+              <a:buChar char="•"/>
+              <a:defRPr sz="1800" kern="1200">
+                <a:solidFill>
+                  <a:schemeClr val="tx1"/>
+                </a:solidFill>
+                <a:latin typeface="+mn-lt"/>
+                <a:ea typeface="+mn-ea"/>
+                <a:cs typeface="+mn-cs"/>
+              </a:defRPr>
+            </a:lvl7pPr>
+            <a:lvl8pPr marL="3429000" indent="-228600" algn="l" defTabSz="914400" rtl="0" eaLnBrk="1" latinLnBrk="0" hangingPunct="1">
+              <a:lnSpc>
+                <a:spcPct val="90000"/>
+              </a:lnSpc>
+              <a:spcBef>
+                <a:spcPts val="500"/>
+              </a:spcBef>
+              <a:buFont typeface="Arial" panose="020B0604020202020204" pitchFamily="34" charset="0"/>
+              <a:buChar char="•"/>
+              <a:defRPr sz="1800" kern="1200">
+                <a:solidFill>
+                  <a:schemeClr val="tx1"/>
+                </a:solidFill>
+                <a:latin typeface="+mn-lt"/>
+                <a:ea typeface="+mn-ea"/>
+                <a:cs typeface="+mn-cs"/>
+              </a:defRPr>
+            </a:lvl8pPr>
+            <a:lvl9pPr marL="3886200" indent="-228600" algn="l" defTabSz="914400" rtl="0" eaLnBrk="1" latinLnBrk="0" hangingPunct="1">
+              <a:lnSpc>
+                <a:spcPct val="90000"/>
+              </a:lnSpc>
+              <a:spcBef>
+                <a:spcPts val="500"/>
+              </a:spcBef>
+              <a:buFont typeface="Arial" panose="020B0604020202020204" pitchFamily="34" charset="0"/>
+              <a:buChar char="•"/>
+              <a:defRPr sz="1800" kern="1200">
+                <a:solidFill>
+                  <a:schemeClr val="tx1"/>
+                </a:solidFill>
+                <a:latin typeface="+mn-lt"/>
+                <a:ea typeface="+mn-ea"/>
+                <a:cs typeface="+mn-cs"/>
+              </a:defRPr>
+            </a:lvl9pPr>
+          </a:lstStyle>
+          <a:p>
+            <a:pPr marL="0" indent="0" algn="ctr">
+              <a:buFont typeface="Arial" panose="020B0604020202020204" pitchFamily="34" charset="0"/>
+              <a:buNone/>
+            </a:pPr>
+            <a:r>
+              <a:rPr lang="en-SG" sz="1600" dirty="0">
+                <a:latin typeface="Arial" panose="020B0604020202020204" pitchFamily="34" charset="0"/>
+                <a:cs typeface="Arial" panose="020B0604020202020204" pitchFamily="34" charset="0"/>
+              </a:rPr>
+              <a:t>By Ingredient</a:t>
+            </a:r>
+          </a:p>
+        </p:txBody>
+      </p:sp>
+    </p:spTree>
+    <p:extLst>
+      <p:ext uri="{BB962C8B-B14F-4D97-AF65-F5344CB8AC3E}">
+        <p14:creationId xmlns:p14="http://schemas.microsoft.com/office/powerpoint/2010/main" val="2726738250"/>
+      </p:ext>
+    </p:extLst>
+  </p:cSld>
+  <p:clrMapOvr>
+    <a:masterClrMapping/>
+  </p:clrMapOvr>
+</p:sld>
+</file>
+
+<file path=ppt/slides/slide6.xml><?xml version="1.0" encoding="utf-8"?>
+<p:sld xmlns:a="http://schemas.openxmlformats.org/drawingml/2006/main" xmlns:r="http://schemas.openxmlformats.org/officeDocument/2006/relationships" xmlns:p="http://schemas.openxmlformats.org/presentationml/2006/main">
+  <p:cSld>
+    <p:spTree>
+      <p:nvGrpSpPr>
+        <p:cNvPr id="1" name=""/>
+        <p:cNvGrpSpPr/>
+        <p:nvPr/>
+      </p:nvGrpSpPr>
+      <p:grpSpPr>
+        <a:xfrm>
+          <a:off x="0" y="0"/>
+          <a:ext cx="0" cy="0"/>
+          <a:chOff x="0" y="0"/>
+          <a:chExt cx="0" cy="0"/>
+        </a:xfrm>
+      </p:grpSpPr>
+      <p:sp>
+        <p:nvSpPr>
+          <p:cNvPr id="2" name="Title 1">
+            <a:extLst>
+              <a:ext uri="{FF2B5EF4-FFF2-40B4-BE49-F238E27FC236}">
+                <a16:creationId xmlns:a16="http://schemas.microsoft.com/office/drawing/2014/main" id="{2AA94C26-13C3-D332-C240-0C74651C01A6}"/>
+              </a:ext>
+            </a:extLst>
+          </p:cNvPr>
+          <p:cNvSpPr>
+            <a:spLocks noGrp="1"/>
+          </p:cNvSpPr>
+          <p:nvPr>
+            <p:ph type="title"/>
+          </p:nvPr>
+        </p:nvSpPr>
+        <p:spPr/>
+        <p:txBody>
+          <a:bodyPr/>
+          <a:lstStyle/>
+          <a:p>
+            <a:r>
+              <a:rPr lang="en-SG" dirty="0"/>
+              <a:t>Hierarchy</a:t>
+            </a:r>
+          </a:p>
+        </p:txBody>
+      </p:sp>
+      <p:sp>
+        <p:nvSpPr>
+          <p:cNvPr id="3" name="Content Placeholder 2">
+            <a:extLst>
+              <a:ext uri="{FF2B5EF4-FFF2-40B4-BE49-F238E27FC236}">
+                <a16:creationId xmlns:a16="http://schemas.microsoft.com/office/drawing/2014/main" id="{74C6E044-9E10-8787-1D0D-49C73C59A274}"/>
+              </a:ext>
+            </a:extLst>
+          </p:cNvPr>
+          <p:cNvSpPr>
+            <a:spLocks noGrp="1"/>
+          </p:cNvSpPr>
+          <p:nvPr>
+            <p:ph idx="1"/>
+          </p:nvPr>
+        </p:nvSpPr>
+        <p:spPr>
+          <a:xfrm>
+            <a:off x="4488819" y="1532299"/>
+            <a:ext cx="1786337" cy="484805"/>
+          </a:xfrm>
+          <a:ln>
+            <a:solidFill>
+              <a:schemeClr val="tx1"/>
+            </a:solidFill>
+          </a:ln>
+        </p:spPr>
+        <p:txBody>
+          <a:bodyPr anchor="ctr">
+            <a:normAutofit/>
+          </a:bodyPr>
+          <a:lstStyle/>
+          <a:p>
+            <a:pPr marL="0" indent="0" algn="ctr">
+              <a:buNone/>
+            </a:pPr>
+            <a:r>
+              <a:rPr lang="en-SG" sz="1200" dirty="0">
+                <a:latin typeface="Arial" panose="020B0604020202020204" pitchFamily="34" charset="0"/>
+                <a:cs typeface="Arial" panose="020B0604020202020204" pitchFamily="34" charset="0"/>
+              </a:rPr>
+              <a:t>App</a:t>
+            </a:r>
+          </a:p>
+        </p:txBody>
+      </p:sp>
+      <p:sp>
+        <p:nvSpPr>
+          <p:cNvPr id="4" name="Content Placeholder 2">
+            <a:extLst>
+              <a:ext uri="{FF2B5EF4-FFF2-40B4-BE49-F238E27FC236}">
+                <a16:creationId xmlns:a16="http://schemas.microsoft.com/office/drawing/2014/main" id="{B2E04F5B-80B1-EB2C-C0BA-4CB8A8D4CE67}"/>
+              </a:ext>
+            </a:extLst>
+          </p:cNvPr>
+          <p:cNvSpPr txBox="1">
+            <a:spLocks/>
+          </p:cNvSpPr>
+          <p:nvPr/>
+        </p:nvSpPr>
+        <p:spPr>
+          <a:xfrm>
+            <a:off x="1584495" y="2445074"/>
+            <a:ext cx="2625700" cy="484805"/>
+          </a:xfrm>
+          <a:prstGeom prst="rect">
+            <a:avLst/>
+          </a:prstGeom>
+          <a:ln>
+            <a:solidFill>
+              <a:schemeClr val="tx1"/>
+            </a:solidFill>
+          </a:ln>
+        </p:spPr>
+        <p:txBody>
+          <a:bodyPr vert="horz" lIns="91440" tIns="45720" rIns="91440" bIns="45720" rtlCol="0" anchor="ctr">
+            <a:normAutofit/>
+          </a:bodyPr>
+          <a:lstStyle>
+            <a:lvl1pPr marL="228600" indent="-228600" algn="l" defTabSz="914400" rtl="0" eaLnBrk="1" latinLnBrk="0" hangingPunct="1">
+              <a:lnSpc>
+                <a:spcPct val="90000"/>
+              </a:lnSpc>
+              <a:spcBef>
+                <a:spcPts val="1000"/>
+              </a:spcBef>
+              <a:buFont typeface="Arial" panose="020B0604020202020204" pitchFamily="34" charset="0"/>
+              <a:buChar char="•"/>
+              <a:defRPr sz="2800" kern="1200">
+                <a:solidFill>
+                  <a:schemeClr val="tx1"/>
+                </a:solidFill>
+                <a:latin typeface="+mn-lt"/>
+                <a:ea typeface="+mn-ea"/>
+                <a:cs typeface="+mn-cs"/>
+              </a:defRPr>
+            </a:lvl1pPr>
+            <a:lvl2pPr marL="685800" indent="-228600" algn="l" defTabSz="914400" rtl="0" eaLnBrk="1" latinLnBrk="0" hangingPunct="1">
+              <a:lnSpc>
+                <a:spcPct val="90000"/>
+              </a:lnSpc>
+              <a:spcBef>
+                <a:spcPts val="500"/>
+              </a:spcBef>
+              <a:buFont typeface="Arial" panose="020B0604020202020204" pitchFamily="34" charset="0"/>
+              <a:buChar char="•"/>
+              <a:defRPr sz="2400" kern="1200">
+                <a:solidFill>
+                  <a:schemeClr val="tx1"/>
+                </a:solidFill>
+                <a:latin typeface="+mn-lt"/>
+                <a:ea typeface="+mn-ea"/>
+                <a:cs typeface="+mn-cs"/>
+              </a:defRPr>
+            </a:lvl2pPr>
+            <a:lvl3pPr marL="1143000" indent="-228600" algn="l" defTabSz="914400" rtl="0" eaLnBrk="1" latinLnBrk="0" hangingPunct="1">
+              <a:lnSpc>
+                <a:spcPct val="90000"/>
+              </a:lnSpc>
+              <a:spcBef>
+                <a:spcPts val="500"/>
+              </a:spcBef>
+              <a:buFont typeface="Arial" panose="020B0604020202020204" pitchFamily="34" charset="0"/>
+              <a:buChar char="•"/>
+              <a:defRPr sz="2000" kern="1200">
+                <a:solidFill>
+                  <a:schemeClr val="tx1"/>
+                </a:solidFill>
+                <a:latin typeface="+mn-lt"/>
+                <a:ea typeface="+mn-ea"/>
+                <a:cs typeface="+mn-cs"/>
+              </a:defRPr>
+            </a:lvl3pPr>
+            <a:lvl4pPr marL="1600200" indent="-228600" algn="l" defTabSz="914400" rtl="0" eaLnBrk="1" latinLnBrk="0" hangingPunct="1">
+              <a:lnSpc>
+                <a:spcPct val="90000"/>
+              </a:lnSpc>
+              <a:spcBef>
+                <a:spcPts val="500"/>
+              </a:spcBef>
+              <a:buFont typeface="Arial" panose="020B0604020202020204" pitchFamily="34" charset="0"/>
+              <a:buChar char="•"/>
+              <a:defRPr sz="1800" kern="1200">
+                <a:solidFill>
+                  <a:schemeClr val="tx1"/>
+                </a:solidFill>
+                <a:latin typeface="+mn-lt"/>
+                <a:ea typeface="+mn-ea"/>
+                <a:cs typeface="+mn-cs"/>
+              </a:defRPr>
+            </a:lvl4pPr>
+            <a:lvl5pPr marL="2057400" indent="-228600" algn="l" defTabSz="914400" rtl="0" eaLnBrk="1" latinLnBrk="0" hangingPunct="1">
+              <a:lnSpc>
+                <a:spcPct val="90000"/>
+              </a:lnSpc>
+              <a:spcBef>
+                <a:spcPts val="500"/>
+              </a:spcBef>
+              <a:buFont typeface="Arial" panose="020B0604020202020204" pitchFamily="34" charset="0"/>
+              <a:buChar char="•"/>
+              <a:defRPr sz="1800" kern="1200">
+                <a:solidFill>
+                  <a:schemeClr val="tx1"/>
+                </a:solidFill>
+                <a:latin typeface="+mn-lt"/>
+                <a:ea typeface="+mn-ea"/>
+                <a:cs typeface="+mn-cs"/>
+              </a:defRPr>
+            </a:lvl5pPr>
+            <a:lvl6pPr marL="2514600" indent="-228600" algn="l" defTabSz="914400" rtl="0" eaLnBrk="1" latinLnBrk="0" hangingPunct="1">
+              <a:lnSpc>
+                <a:spcPct val="90000"/>
+              </a:lnSpc>
+              <a:spcBef>
+                <a:spcPts val="500"/>
+              </a:spcBef>
+              <a:buFont typeface="Arial" panose="020B0604020202020204" pitchFamily="34" charset="0"/>
+              <a:buChar char="•"/>
+              <a:defRPr sz="1800" kern="1200">
+                <a:solidFill>
+                  <a:schemeClr val="tx1"/>
+                </a:solidFill>
+                <a:latin typeface="+mn-lt"/>
+                <a:ea typeface="+mn-ea"/>
+                <a:cs typeface="+mn-cs"/>
+              </a:defRPr>
+            </a:lvl6pPr>
+            <a:lvl7pPr marL="2971800" indent="-228600" algn="l" defTabSz="914400" rtl="0" eaLnBrk="1" latinLnBrk="0" hangingPunct="1">
+              <a:lnSpc>
+                <a:spcPct val="90000"/>
+              </a:lnSpc>
+              <a:spcBef>
+                <a:spcPts val="500"/>
+              </a:spcBef>
+              <a:buFont typeface="Arial" panose="020B0604020202020204" pitchFamily="34" charset="0"/>
+              <a:buChar char="•"/>
+              <a:defRPr sz="1800" kern="1200">
+                <a:solidFill>
+                  <a:schemeClr val="tx1"/>
+                </a:solidFill>
+                <a:latin typeface="+mn-lt"/>
+                <a:ea typeface="+mn-ea"/>
+                <a:cs typeface="+mn-cs"/>
+              </a:defRPr>
+            </a:lvl7pPr>
+            <a:lvl8pPr marL="3429000" indent="-228600" algn="l" defTabSz="914400" rtl="0" eaLnBrk="1" latinLnBrk="0" hangingPunct="1">
+              <a:lnSpc>
+                <a:spcPct val="90000"/>
+              </a:lnSpc>
+              <a:spcBef>
+                <a:spcPts val="500"/>
+              </a:spcBef>
+              <a:buFont typeface="Arial" panose="020B0604020202020204" pitchFamily="34" charset="0"/>
+              <a:buChar char="•"/>
+              <a:defRPr sz="1800" kern="1200">
+                <a:solidFill>
+                  <a:schemeClr val="tx1"/>
+                </a:solidFill>
+                <a:latin typeface="+mn-lt"/>
+                <a:ea typeface="+mn-ea"/>
+                <a:cs typeface="+mn-cs"/>
+              </a:defRPr>
+            </a:lvl8pPr>
+            <a:lvl9pPr marL="3886200" indent="-228600" algn="l" defTabSz="914400" rtl="0" eaLnBrk="1" latinLnBrk="0" hangingPunct="1">
+              <a:lnSpc>
+                <a:spcPct val="90000"/>
+              </a:lnSpc>
+              <a:spcBef>
+                <a:spcPts val="500"/>
+              </a:spcBef>
+              <a:buFont typeface="Arial" panose="020B0604020202020204" pitchFamily="34" charset="0"/>
+              <a:buChar char="•"/>
+              <a:defRPr sz="1800" kern="1200">
+                <a:solidFill>
+                  <a:schemeClr val="tx1"/>
+                </a:solidFill>
+                <a:latin typeface="+mn-lt"/>
+                <a:ea typeface="+mn-ea"/>
+                <a:cs typeface="+mn-cs"/>
+              </a:defRPr>
+            </a:lvl9pPr>
+          </a:lstStyle>
+          <a:p>
+            <a:pPr marL="0" indent="0" algn="ctr">
+              <a:buFont typeface="Arial" panose="020B0604020202020204" pitchFamily="34" charset="0"/>
+              <a:buNone/>
+            </a:pPr>
+            <a:r>
+              <a:rPr lang="en-SG" sz="1200" dirty="0">
+                <a:latin typeface="Arial" panose="020B0604020202020204" pitchFamily="34" charset="0"/>
+                <a:cs typeface="Arial" panose="020B0604020202020204" pitchFamily="34" charset="0"/>
+              </a:rPr>
+              <a:t>&lt;SearchByName /&gt; Page Route (default)</a:t>
+            </a:r>
+          </a:p>
+        </p:txBody>
+      </p:sp>
+      <p:sp>
+        <p:nvSpPr>
+          <p:cNvPr id="5" name="Content Placeholder 2">
+            <a:extLst>
+              <a:ext uri="{FF2B5EF4-FFF2-40B4-BE49-F238E27FC236}">
+                <a16:creationId xmlns:a16="http://schemas.microsoft.com/office/drawing/2014/main" id="{253ED45E-F260-8327-BC30-877D441070A3}"/>
+              </a:ext>
+            </a:extLst>
+          </p:cNvPr>
+          <p:cNvSpPr txBox="1">
+            <a:spLocks/>
+          </p:cNvSpPr>
+          <p:nvPr/>
+        </p:nvSpPr>
+        <p:spPr>
+          <a:xfrm>
+            <a:off x="7332649" y="2454533"/>
+            <a:ext cx="2472719" cy="484805"/>
+          </a:xfrm>
+          <a:prstGeom prst="rect">
+            <a:avLst/>
+          </a:prstGeom>
+          <a:ln>
+            <a:solidFill>
+              <a:schemeClr val="tx1"/>
+            </a:solidFill>
+          </a:ln>
+        </p:spPr>
+        <p:txBody>
+          <a:bodyPr vert="horz" lIns="91440" tIns="45720" rIns="91440" bIns="45720" rtlCol="0" anchor="ctr">
+            <a:normAutofit/>
+          </a:bodyPr>
+          <a:lstStyle>
+            <a:lvl1pPr marL="228600" indent="-228600" algn="l" defTabSz="914400" rtl="0" eaLnBrk="1" latinLnBrk="0" hangingPunct="1">
+              <a:lnSpc>
+                <a:spcPct val="90000"/>
+              </a:lnSpc>
+              <a:spcBef>
+                <a:spcPts val="1000"/>
+              </a:spcBef>
+              <a:buFont typeface="Arial" panose="020B0604020202020204" pitchFamily="34" charset="0"/>
+              <a:buChar char="•"/>
+              <a:defRPr sz="2800" kern="1200">
+                <a:solidFill>
+                  <a:schemeClr val="tx1"/>
+                </a:solidFill>
+                <a:latin typeface="+mn-lt"/>
+                <a:ea typeface="+mn-ea"/>
+                <a:cs typeface="+mn-cs"/>
+              </a:defRPr>
+            </a:lvl1pPr>
+            <a:lvl2pPr marL="685800" indent="-228600" algn="l" defTabSz="914400" rtl="0" eaLnBrk="1" latinLnBrk="0" hangingPunct="1">
+              <a:lnSpc>
+                <a:spcPct val="90000"/>
+              </a:lnSpc>
+              <a:spcBef>
+                <a:spcPts val="500"/>
+              </a:spcBef>
+              <a:buFont typeface="Arial" panose="020B0604020202020204" pitchFamily="34" charset="0"/>
+              <a:buChar char="•"/>
+              <a:defRPr sz="2400" kern="1200">
+                <a:solidFill>
+                  <a:schemeClr val="tx1"/>
+                </a:solidFill>
+                <a:latin typeface="+mn-lt"/>
+                <a:ea typeface="+mn-ea"/>
+                <a:cs typeface="+mn-cs"/>
+              </a:defRPr>
+            </a:lvl2pPr>
+            <a:lvl3pPr marL="1143000" indent="-228600" algn="l" defTabSz="914400" rtl="0" eaLnBrk="1" latinLnBrk="0" hangingPunct="1">
+              <a:lnSpc>
+                <a:spcPct val="90000"/>
+              </a:lnSpc>
+              <a:spcBef>
+                <a:spcPts val="500"/>
+              </a:spcBef>
+              <a:buFont typeface="Arial" panose="020B0604020202020204" pitchFamily="34" charset="0"/>
+              <a:buChar char="•"/>
+              <a:defRPr sz="2000" kern="1200">
+                <a:solidFill>
+                  <a:schemeClr val="tx1"/>
+                </a:solidFill>
+                <a:latin typeface="+mn-lt"/>
+                <a:ea typeface="+mn-ea"/>
+                <a:cs typeface="+mn-cs"/>
+              </a:defRPr>
+            </a:lvl3pPr>
+            <a:lvl4pPr marL="1600200" indent="-228600" algn="l" defTabSz="914400" rtl="0" eaLnBrk="1" latinLnBrk="0" hangingPunct="1">
+              <a:lnSpc>
+                <a:spcPct val="90000"/>
+              </a:lnSpc>
+              <a:spcBef>
+                <a:spcPts val="500"/>
+              </a:spcBef>
+              <a:buFont typeface="Arial" panose="020B0604020202020204" pitchFamily="34" charset="0"/>
+              <a:buChar char="•"/>
+              <a:defRPr sz="1800" kern="1200">
+                <a:solidFill>
+                  <a:schemeClr val="tx1"/>
+                </a:solidFill>
+                <a:latin typeface="+mn-lt"/>
+                <a:ea typeface="+mn-ea"/>
+                <a:cs typeface="+mn-cs"/>
+              </a:defRPr>
+            </a:lvl4pPr>
+            <a:lvl5pPr marL="2057400" indent="-228600" algn="l" defTabSz="914400" rtl="0" eaLnBrk="1" latinLnBrk="0" hangingPunct="1">
+              <a:lnSpc>
+                <a:spcPct val="90000"/>
+              </a:lnSpc>
+              <a:spcBef>
+                <a:spcPts val="500"/>
+              </a:spcBef>
+              <a:buFont typeface="Arial" panose="020B0604020202020204" pitchFamily="34" charset="0"/>
+              <a:buChar char="•"/>
+              <a:defRPr sz="1800" kern="1200">
+                <a:solidFill>
+                  <a:schemeClr val="tx1"/>
+                </a:solidFill>
+                <a:latin typeface="+mn-lt"/>
+                <a:ea typeface="+mn-ea"/>
+                <a:cs typeface="+mn-cs"/>
+              </a:defRPr>
+            </a:lvl5pPr>
+            <a:lvl6pPr marL="2514600" indent="-228600" algn="l" defTabSz="914400" rtl="0" eaLnBrk="1" latinLnBrk="0" hangingPunct="1">
+              <a:lnSpc>
+                <a:spcPct val="90000"/>
+              </a:lnSpc>
+              <a:spcBef>
+                <a:spcPts val="500"/>
+              </a:spcBef>
+              <a:buFont typeface="Arial" panose="020B0604020202020204" pitchFamily="34" charset="0"/>
+              <a:buChar char="•"/>
+              <a:defRPr sz="1800" kern="1200">
+                <a:solidFill>
+                  <a:schemeClr val="tx1"/>
+                </a:solidFill>
+                <a:latin typeface="+mn-lt"/>
+                <a:ea typeface="+mn-ea"/>
+                <a:cs typeface="+mn-cs"/>
+              </a:defRPr>
+            </a:lvl6pPr>
+            <a:lvl7pPr marL="2971800" indent="-228600" algn="l" defTabSz="914400" rtl="0" eaLnBrk="1" latinLnBrk="0" hangingPunct="1">
+              <a:lnSpc>
+                <a:spcPct val="90000"/>
+              </a:lnSpc>
+              <a:spcBef>
+                <a:spcPts val="500"/>
+              </a:spcBef>
+              <a:buFont typeface="Arial" panose="020B0604020202020204" pitchFamily="34" charset="0"/>
+              <a:buChar char="•"/>
+              <a:defRPr sz="1800" kern="1200">
+                <a:solidFill>
+                  <a:schemeClr val="tx1"/>
+                </a:solidFill>
+                <a:latin typeface="+mn-lt"/>
+                <a:ea typeface="+mn-ea"/>
+                <a:cs typeface="+mn-cs"/>
+              </a:defRPr>
+            </a:lvl7pPr>
+            <a:lvl8pPr marL="3429000" indent="-228600" algn="l" defTabSz="914400" rtl="0" eaLnBrk="1" latinLnBrk="0" hangingPunct="1">
+              <a:lnSpc>
+                <a:spcPct val="90000"/>
+              </a:lnSpc>
+              <a:spcBef>
+                <a:spcPts val="500"/>
+              </a:spcBef>
+              <a:buFont typeface="Arial" panose="020B0604020202020204" pitchFamily="34" charset="0"/>
+              <a:buChar char="•"/>
+              <a:defRPr sz="1800" kern="1200">
+                <a:solidFill>
+                  <a:schemeClr val="tx1"/>
+                </a:solidFill>
+                <a:latin typeface="+mn-lt"/>
+                <a:ea typeface="+mn-ea"/>
+                <a:cs typeface="+mn-cs"/>
+              </a:defRPr>
+            </a:lvl8pPr>
+            <a:lvl9pPr marL="3886200" indent="-228600" algn="l" defTabSz="914400" rtl="0" eaLnBrk="1" latinLnBrk="0" hangingPunct="1">
+              <a:lnSpc>
+                <a:spcPct val="90000"/>
+              </a:lnSpc>
+              <a:spcBef>
+                <a:spcPts val="500"/>
+              </a:spcBef>
+              <a:buFont typeface="Arial" panose="020B0604020202020204" pitchFamily="34" charset="0"/>
+              <a:buChar char="•"/>
+              <a:defRPr sz="1800" kern="1200">
+                <a:solidFill>
+                  <a:schemeClr val="tx1"/>
+                </a:solidFill>
+                <a:latin typeface="+mn-lt"/>
+                <a:ea typeface="+mn-ea"/>
+                <a:cs typeface="+mn-cs"/>
+              </a:defRPr>
+            </a:lvl9pPr>
+          </a:lstStyle>
+          <a:p>
+            <a:pPr marL="0" indent="0" algn="ctr">
+              <a:buFont typeface="Arial" panose="020B0604020202020204" pitchFamily="34" charset="0"/>
+              <a:buNone/>
+            </a:pPr>
+            <a:r>
+              <a:rPr lang="en-SG" sz="1200" dirty="0">
+                <a:latin typeface="Arial" panose="020B0604020202020204" pitchFamily="34" charset="0"/>
+                <a:cs typeface="Arial" panose="020B0604020202020204" pitchFamily="34" charset="0"/>
+              </a:rPr>
+              <a:t>&lt;SearchByIngredient /&gt; Page Route</a:t>
+            </a:r>
+          </a:p>
+        </p:txBody>
+      </p:sp>
+      <p:sp>
+        <p:nvSpPr>
+          <p:cNvPr id="10" name="Content Placeholder 2">
+            <a:extLst>
+              <a:ext uri="{FF2B5EF4-FFF2-40B4-BE49-F238E27FC236}">
+                <a16:creationId xmlns:a16="http://schemas.microsoft.com/office/drawing/2014/main" id="{3D68E82B-5DE4-ADB1-914C-05B54C1663A0}"/>
+              </a:ext>
+            </a:extLst>
+          </p:cNvPr>
+          <p:cNvSpPr txBox="1">
+            <a:spLocks/>
+          </p:cNvSpPr>
+          <p:nvPr/>
+        </p:nvSpPr>
+        <p:spPr>
+          <a:xfrm>
+            <a:off x="821909" y="3197664"/>
+            <a:ext cx="1720899" cy="304052"/>
+          </a:xfrm>
+          <a:prstGeom prst="rect">
+            <a:avLst/>
+          </a:prstGeom>
+          <a:ln>
+            <a:solidFill>
+              <a:schemeClr val="tx1"/>
+            </a:solidFill>
+          </a:ln>
+        </p:spPr>
+        <p:txBody>
+          <a:bodyPr vert="horz" lIns="91440" tIns="45720" rIns="91440" bIns="45720" rtlCol="0" anchor="ctr">
+            <a:normAutofit/>
+          </a:bodyPr>
+          <a:lstStyle>
+            <a:lvl1pPr marL="228600" indent="-228600" algn="l" defTabSz="914400" rtl="0" eaLnBrk="1" latinLnBrk="0" hangingPunct="1">
+              <a:lnSpc>
+                <a:spcPct val="90000"/>
+              </a:lnSpc>
+              <a:spcBef>
+                <a:spcPts val="1000"/>
+              </a:spcBef>
+              <a:buFont typeface="Arial" panose="020B0604020202020204" pitchFamily="34" charset="0"/>
+              <a:buChar char="•"/>
+              <a:defRPr sz="2800" kern="1200">
+                <a:solidFill>
+                  <a:schemeClr val="tx1"/>
+                </a:solidFill>
+                <a:latin typeface="+mn-lt"/>
+                <a:ea typeface="+mn-ea"/>
+                <a:cs typeface="+mn-cs"/>
+              </a:defRPr>
+            </a:lvl1pPr>
+            <a:lvl2pPr marL="685800" indent="-228600" algn="l" defTabSz="914400" rtl="0" eaLnBrk="1" latinLnBrk="0" hangingPunct="1">
+              <a:lnSpc>
+                <a:spcPct val="90000"/>
+              </a:lnSpc>
+              <a:spcBef>
+                <a:spcPts val="500"/>
+              </a:spcBef>
+              <a:buFont typeface="Arial" panose="020B0604020202020204" pitchFamily="34" charset="0"/>
+              <a:buChar char="•"/>
+              <a:defRPr sz="2400" kern="1200">
+                <a:solidFill>
+                  <a:schemeClr val="tx1"/>
+                </a:solidFill>
+                <a:latin typeface="+mn-lt"/>
+                <a:ea typeface="+mn-ea"/>
+                <a:cs typeface="+mn-cs"/>
+              </a:defRPr>
+            </a:lvl2pPr>
+            <a:lvl3pPr marL="1143000" indent="-228600" algn="l" defTabSz="914400" rtl="0" eaLnBrk="1" latinLnBrk="0" hangingPunct="1">
+              <a:lnSpc>
+                <a:spcPct val="90000"/>
+              </a:lnSpc>
+              <a:spcBef>
+                <a:spcPts val="500"/>
+              </a:spcBef>
+              <a:buFont typeface="Arial" panose="020B0604020202020204" pitchFamily="34" charset="0"/>
+              <a:buChar char="•"/>
+              <a:defRPr sz="2000" kern="1200">
+                <a:solidFill>
+                  <a:schemeClr val="tx1"/>
+                </a:solidFill>
+                <a:latin typeface="+mn-lt"/>
+                <a:ea typeface="+mn-ea"/>
+                <a:cs typeface="+mn-cs"/>
+              </a:defRPr>
+            </a:lvl3pPr>
+            <a:lvl4pPr marL="1600200" indent="-228600" algn="l" defTabSz="914400" rtl="0" eaLnBrk="1" latinLnBrk="0" hangingPunct="1">
+              <a:lnSpc>
+                <a:spcPct val="90000"/>
+              </a:lnSpc>
+              <a:spcBef>
+                <a:spcPts val="500"/>
+              </a:spcBef>
+              <a:buFont typeface="Arial" panose="020B0604020202020204" pitchFamily="34" charset="0"/>
+              <a:buChar char="•"/>
+              <a:defRPr sz="1800" kern="1200">
+                <a:solidFill>
+                  <a:schemeClr val="tx1"/>
+                </a:solidFill>
+                <a:latin typeface="+mn-lt"/>
+                <a:ea typeface="+mn-ea"/>
+                <a:cs typeface="+mn-cs"/>
+              </a:defRPr>
+            </a:lvl4pPr>
+            <a:lvl5pPr marL="2057400" indent="-228600" algn="l" defTabSz="914400" rtl="0" eaLnBrk="1" latinLnBrk="0" hangingPunct="1">
+              <a:lnSpc>
+                <a:spcPct val="90000"/>
+              </a:lnSpc>
+              <a:spcBef>
+                <a:spcPts val="500"/>
+              </a:spcBef>
+              <a:buFont typeface="Arial" panose="020B0604020202020204" pitchFamily="34" charset="0"/>
+              <a:buChar char="•"/>
+              <a:defRPr sz="1800" kern="1200">
+                <a:solidFill>
+                  <a:schemeClr val="tx1"/>
+                </a:solidFill>
+                <a:latin typeface="+mn-lt"/>
+                <a:ea typeface="+mn-ea"/>
+                <a:cs typeface="+mn-cs"/>
+              </a:defRPr>
+            </a:lvl5pPr>
+            <a:lvl6pPr marL="2514600" indent="-228600" algn="l" defTabSz="914400" rtl="0" eaLnBrk="1" latinLnBrk="0" hangingPunct="1">
+              <a:lnSpc>
+                <a:spcPct val="90000"/>
+              </a:lnSpc>
+              <a:spcBef>
+                <a:spcPts val="500"/>
+              </a:spcBef>
+              <a:buFont typeface="Arial" panose="020B0604020202020204" pitchFamily="34" charset="0"/>
+              <a:buChar char="•"/>
+              <a:defRPr sz="1800" kern="1200">
+                <a:solidFill>
+                  <a:schemeClr val="tx1"/>
+                </a:solidFill>
+                <a:latin typeface="+mn-lt"/>
+                <a:ea typeface="+mn-ea"/>
+                <a:cs typeface="+mn-cs"/>
+              </a:defRPr>
+            </a:lvl6pPr>
+            <a:lvl7pPr marL="2971800" indent="-228600" algn="l" defTabSz="914400" rtl="0" eaLnBrk="1" latinLnBrk="0" hangingPunct="1">
+              <a:lnSpc>
+                <a:spcPct val="90000"/>
+              </a:lnSpc>
+              <a:spcBef>
+                <a:spcPts val="500"/>
+              </a:spcBef>
+              <a:buFont typeface="Arial" panose="020B0604020202020204" pitchFamily="34" charset="0"/>
+              <a:buChar char="•"/>
+              <a:defRPr sz="1800" kern="1200">
+                <a:solidFill>
+                  <a:schemeClr val="tx1"/>
+                </a:solidFill>
+                <a:latin typeface="+mn-lt"/>
+                <a:ea typeface="+mn-ea"/>
+                <a:cs typeface="+mn-cs"/>
+              </a:defRPr>
+            </a:lvl7pPr>
+            <a:lvl8pPr marL="3429000" indent="-228600" algn="l" defTabSz="914400" rtl="0" eaLnBrk="1" latinLnBrk="0" hangingPunct="1">
+              <a:lnSpc>
+                <a:spcPct val="90000"/>
+              </a:lnSpc>
+              <a:spcBef>
+                <a:spcPts val="500"/>
+              </a:spcBef>
+              <a:buFont typeface="Arial" panose="020B0604020202020204" pitchFamily="34" charset="0"/>
+              <a:buChar char="•"/>
+              <a:defRPr sz="1800" kern="1200">
+                <a:solidFill>
+                  <a:schemeClr val="tx1"/>
+                </a:solidFill>
+                <a:latin typeface="+mn-lt"/>
+                <a:ea typeface="+mn-ea"/>
+                <a:cs typeface="+mn-cs"/>
+              </a:defRPr>
+            </a:lvl8pPr>
+            <a:lvl9pPr marL="3886200" indent="-228600" algn="l" defTabSz="914400" rtl="0" eaLnBrk="1" latinLnBrk="0" hangingPunct="1">
+              <a:lnSpc>
+                <a:spcPct val="90000"/>
+              </a:lnSpc>
+              <a:spcBef>
+                <a:spcPts val="500"/>
+              </a:spcBef>
+              <a:buFont typeface="Arial" panose="020B0604020202020204" pitchFamily="34" charset="0"/>
+              <a:buChar char="•"/>
+              <a:defRPr sz="1800" kern="1200">
+                <a:solidFill>
+                  <a:schemeClr val="tx1"/>
+                </a:solidFill>
+                <a:latin typeface="+mn-lt"/>
+                <a:ea typeface="+mn-ea"/>
+                <a:cs typeface="+mn-cs"/>
+              </a:defRPr>
+            </a:lvl9pPr>
+          </a:lstStyle>
+          <a:p>
+            <a:pPr marL="0" indent="0" algn="ctr">
+              <a:buFont typeface="Arial" panose="020B0604020202020204" pitchFamily="34" charset="0"/>
+              <a:buNone/>
+            </a:pPr>
+            <a:r>
+              <a:rPr lang="en-SG" sz="1200" dirty="0">
+                <a:latin typeface="Arial" panose="020B0604020202020204" pitchFamily="34" charset="0"/>
+                <a:cs typeface="Arial" panose="020B0604020202020204" pitchFamily="34" charset="0"/>
+              </a:rPr>
+              <a:t>&lt;SearchSection /&gt;</a:t>
+            </a:r>
+          </a:p>
+        </p:txBody>
+      </p:sp>
+      <p:sp>
+        <p:nvSpPr>
+          <p:cNvPr id="11" name="Content Placeholder 2">
+            <a:extLst>
+              <a:ext uri="{FF2B5EF4-FFF2-40B4-BE49-F238E27FC236}">
+                <a16:creationId xmlns:a16="http://schemas.microsoft.com/office/drawing/2014/main" id="{9E038DFE-CF85-750C-5AE1-37B8449CAF1C}"/>
+              </a:ext>
+            </a:extLst>
+          </p:cNvPr>
+          <p:cNvSpPr txBox="1">
+            <a:spLocks/>
+          </p:cNvSpPr>
+          <p:nvPr/>
+        </p:nvSpPr>
+        <p:spPr>
+          <a:xfrm>
+            <a:off x="3034114" y="3204645"/>
+            <a:ext cx="1761033" cy="290090"/>
+          </a:xfrm>
+          <a:prstGeom prst="rect">
+            <a:avLst/>
+          </a:prstGeom>
+          <a:ln>
+            <a:solidFill>
+              <a:schemeClr val="tx1"/>
+            </a:solidFill>
+          </a:ln>
+        </p:spPr>
+        <p:txBody>
+          <a:bodyPr vert="horz" lIns="91440" tIns="45720" rIns="91440" bIns="45720" rtlCol="0" anchor="ctr">
+            <a:normAutofit/>
+          </a:bodyPr>
+          <a:lstStyle>
+            <a:lvl1pPr marL="228600" indent="-228600" algn="l" defTabSz="914400" rtl="0" eaLnBrk="1" latinLnBrk="0" hangingPunct="1">
+              <a:lnSpc>
+                <a:spcPct val="90000"/>
+              </a:lnSpc>
+              <a:spcBef>
+                <a:spcPts val="1000"/>
+              </a:spcBef>
+              <a:buFont typeface="Arial" panose="020B0604020202020204" pitchFamily="34" charset="0"/>
+              <a:buChar char="•"/>
+              <a:defRPr sz="2800" kern="1200">
+                <a:solidFill>
+                  <a:schemeClr val="tx1"/>
+                </a:solidFill>
+                <a:latin typeface="+mn-lt"/>
+                <a:ea typeface="+mn-ea"/>
+                <a:cs typeface="+mn-cs"/>
+              </a:defRPr>
+            </a:lvl1pPr>
+            <a:lvl2pPr marL="685800" indent="-228600" algn="l" defTabSz="914400" rtl="0" eaLnBrk="1" latinLnBrk="0" hangingPunct="1">
+              <a:lnSpc>
+                <a:spcPct val="90000"/>
+              </a:lnSpc>
+              <a:spcBef>
+                <a:spcPts val="500"/>
+              </a:spcBef>
+              <a:buFont typeface="Arial" panose="020B0604020202020204" pitchFamily="34" charset="0"/>
+              <a:buChar char="•"/>
+              <a:defRPr sz="2400" kern="1200">
+                <a:solidFill>
+                  <a:schemeClr val="tx1"/>
+                </a:solidFill>
+                <a:latin typeface="+mn-lt"/>
+                <a:ea typeface="+mn-ea"/>
+                <a:cs typeface="+mn-cs"/>
+              </a:defRPr>
+            </a:lvl2pPr>
+            <a:lvl3pPr marL="1143000" indent="-228600" algn="l" defTabSz="914400" rtl="0" eaLnBrk="1" latinLnBrk="0" hangingPunct="1">
+              <a:lnSpc>
+                <a:spcPct val="90000"/>
+              </a:lnSpc>
+              <a:spcBef>
+                <a:spcPts val="500"/>
+              </a:spcBef>
+              <a:buFont typeface="Arial" panose="020B0604020202020204" pitchFamily="34" charset="0"/>
+              <a:buChar char="•"/>
+              <a:defRPr sz="2000" kern="1200">
+                <a:solidFill>
+                  <a:schemeClr val="tx1"/>
+                </a:solidFill>
+                <a:latin typeface="+mn-lt"/>
+                <a:ea typeface="+mn-ea"/>
+                <a:cs typeface="+mn-cs"/>
+              </a:defRPr>
+            </a:lvl3pPr>
+            <a:lvl4pPr marL="1600200" indent="-228600" algn="l" defTabSz="914400" rtl="0" eaLnBrk="1" latinLnBrk="0" hangingPunct="1">
+              <a:lnSpc>
+                <a:spcPct val="90000"/>
+              </a:lnSpc>
+              <a:spcBef>
+                <a:spcPts val="500"/>
+              </a:spcBef>
+              <a:buFont typeface="Arial" panose="020B0604020202020204" pitchFamily="34" charset="0"/>
+              <a:buChar char="•"/>
+              <a:defRPr sz="1800" kern="1200">
+                <a:solidFill>
+                  <a:schemeClr val="tx1"/>
+                </a:solidFill>
+                <a:latin typeface="+mn-lt"/>
+                <a:ea typeface="+mn-ea"/>
+                <a:cs typeface="+mn-cs"/>
+              </a:defRPr>
+            </a:lvl4pPr>
+            <a:lvl5pPr marL="2057400" indent="-228600" algn="l" defTabSz="914400" rtl="0" eaLnBrk="1" latinLnBrk="0" hangingPunct="1">
+              <a:lnSpc>
+                <a:spcPct val="90000"/>
+              </a:lnSpc>
+              <a:spcBef>
+                <a:spcPts val="500"/>
+              </a:spcBef>
+              <a:buFont typeface="Arial" panose="020B0604020202020204" pitchFamily="34" charset="0"/>
+              <a:buChar char="•"/>
+              <a:defRPr sz="1800" kern="1200">
+                <a:solidFill>
+                  <a:schemeClr val="tx1"/>
+                </a:solidFill>
+                <a:latin typeface="+mn-lt"/>
+                <a:ea typeface="+mn-ea"/>
+                <a:cs typeface="+mn-cs"/>
+              </a:defRPr>
+            </a:lvl5pPr>
+            <a:lvl6pPr marL="2514600" indent="-228600" algn="l" defTabSz="914400" rtl="0" eaLnBrk="1" latinLnBrk="0" hangingPunct="1">
+              <a:lnSpc>
+                <a:spcPct val="90000"/>
+              </a:lnSpc>
+              <a:spcBef>
+                <a:spcPts val="500"/>
+              </a:spcBef>
+              <a:buFont typeface="Arial" panose="020B0604020202020204" pitchFamily="34" charset="0"/>
+              <a:buChar char="•"/>
+              <a:defRPr sz="1800" kern="1200">
+                <a:solidFill>
+                  <a:schemeClr val="tx1"/>
+                </a:solidFill>
+                <a:latin typeface="+mn-lt"/>
+                <a:ea typeface="+mn-ea"/>
+                <a:cs typeface="+mn-cs"/>
+              </a:defRPr>
+            </a:lvl6pPr>
+            <a:lvl7pPr marL="2971800" indent="-228600" algn="l" defTabSz="914400" rtl="0" eaLnBrk="1" latinLnBrk="0" hangingPunct="1">
+              <a:lnSpc>
+                <a:spcPct val="90000"/>
+              </a:lnSpc>
+              <a:spcBef>
+                <a:spcPts val="500"/>
+              </a:spcBef>
+              <a:buFont typeface="Arial" panose="020B0604020202020204" pitchFamily="34" charset="0"/>
+              <a:buChar char="•"/>
+              <a:defRPr sz="1800" kern="1200">
+                <a:solidFill>
+                  <a:schemeClr val="tx1"/>
+                </a:solidFill>
+                <a:latin typeface="+mn-lt"/>
+                <a:ea typeface="+mn-ea"/>
+                <a:cs typeface="+mn-cs"/>
+              </a:defRPr>
+            </a:lvl7pPr>
+            <a:lvl8pPr marL="3429000" indent="-228600" algn="l" defTabSz="914400" rtl="0" eaLnBrk="1" latinLnBrk="0" hangingPunct="1">
+              <a:lnSpc>
+                <a:spcPct val="90000"/>
+              </a:lnSpc>
+              <a:spcBef>
+                <a:spcPts val="500"/>
+              </a:spcBef>
+              <a:buFont typeface="Arial" panose="020B0604020202020204" pitchFamily="34" charset="0"/>
+              <a:buChar char="•"/>
+              <a:defRPr sz="1800" kern="1200">
+                <a:solidFill>
+                  <a:schemeClr val="tx1"/>
+                </a:solidFill>
+                <a:latin typeface="+mn-lt"/>
+                <a:ea typeface="+mn-ea"/>
+                <a:cs typeface="+mn-cs"/>
+              </a:defRPr>
+            </a:lvl8pPr>
+            <a:lvl9pPr marL="3886200" indent="-228600" algn="l" defTabSz="914400" rtl="0" eaLnBrk="1" latinLnBrk="0" hangingPunct="1">
+              <a:lnSpc>
+                <a:spcPct val="90000"/>
+              </a:lnSpc>
+              <a:spcBef>
+                <a:spcPts val="500"/>
+              </a:spcBef>
+              <a:buFont typeface="Arial" panose="020B0604020202020204" pitchFamily="34" charset="0"/>
+              <a:buChar char="•"/>
+              <a:defRPr sz="1800" kern="1200">
+                <a:solidFill>
+                  <a:schemeClr val="tx1"/>
+                </a:solidFill>
+                <a:latin typeface="+mn-lt"/>
+                <a:ea typeface="+mn-ea"/>
+                <a:cs typeface="+mn-cs"/>
+              </a:defRPr>
+            </a:lvl9pPr>
+          </a:lstStyle>
+          <a:p>
+            <a:pPr marL="0" indent="0" algn="ctr">
+              <a:buFont typeface="Arial" panose="020B0604020202020204" pitchFamily="34" charset="0"/>
+              <a:buNone/>
+            </a:pPr>
+            <a:r>
+              <a:rPr lang="en-SG" sz="1200" dirty="0">
+                <a:latin typeface="Arial" panose="020B0604020202020204" pitchFamily="34" charset="0"/>
+                <a:cs typeface="Arial" panose="020B0604020202020204" pitchFamily="34" charset="0"/>
+              </a:rPr>
+              <a:t>&lt;Result /&gt;</a:t>
+            </a:r>
+          </a:p>
+        </p:txBody>
+      </p:sp>
+      <p:sp>
+        <p:nvSpPr>
+          <p:cNvPr id="13" name="Content Placeholder 2">
+            <a:extLst>
+              <a:ext uri="{FF2B5EF4-FFF2-40B4-BE49-F238E27FC236}">
+                <a16:creationId xmlns:a16="http://schemas.microsoft.com/office/drawing/2014/main" id="{AFD81309-24BC-2AB8-12CF-F3A164B1681C}"/>
+              </a:ext>
+            </a:extLst>
+          </p:cNvPr>
+          <p:cNvSpPr txBox="1">
+            <a:spLocks/>
+          </p:cNvSpPr>
+          <p:nvPr/>
+        </p:nvSpPr>
+        <p:spPr>
+          <a:xfrm>
+            <a:off x="3034114" y="3836069"/>
+            <a:ext cx="1761033" cy="290090"/>
+          </a:xfrm>
+          <a:prstGeom prst="rect">
+            <a:avLst/>
+          </a:prstGeom>
+          <a:ln>
+            <a:solidFill>
+              <a:schemeClr val="tx1"/>
+            </a:solidFill>
+          </a:ln>
+        </p:spPr>
+        <p:txBody>
+          <a:bodyPr vert="horz" lIns="91440" tIns="45720" rIns="91440" bIns="45720" rtlCol="0" anchor="ctr">
+            <a:normAutofit/>
+          </a:bodyPr>
+          <a:lstStyle>
+            <a:lvl1pPr marL="228600" indent="-228600" algn="l" defTabSz="914400" rtl="0" eaLnBrk="1" latinLnBrk="0" hangingPunct="1">
+              <a:lnSpc>
+                <a:spcPct val="90000"/>
+              </a:lnSpc>
+              <a:spcBef>
+                <a:spcPts val="1000"/>
+              </a:spcBef>
+              <a:buFont typeface="Arial" panose="020B0604020202020204" pitchFamily="34" charset="0"/>
+              <a:buChar char="•"/>
+              <a:defRPr sz="2800" kern="1200">
+                <a:solidFill>
+                  <a:schemeClr val="tx1"/>
+                </a:solidFill>
+                <a:latin typeface="+mn-lt"/>
+                <a:ea typeface="+mn-ea"/>
+                <a:cs typeface="+mn-cs"/>
+              </a:defRPr>
+            </a:lvl1pPr>
+            <a:lvl2pPr marL="685800" indent="-228600" algn="l" defTabSz="914400" rtl="0" eaLnBrk="1" latinLnBrk="0" hangingPunct="1">
+              <a:lnSpc>
+                <a:spcPct val="90000"/>
+              </a:lnSpc>
+              <a:spcBef>
+                <a:spcPts val="500"/>
+              </a:spcBef>
+              <a:buFont typeface="Arial" panose="020B0604020202020204" pitchFamily="34" charset="0"/>
+              <a:buChar char="•"/>
+              <a:defRPr sz="2400" kern="1200">
+                <a:solidFill>
+                  <a:schemeClr val="tx1"/>
+                </a:solidFill>
+                <a:latin typeface="+mn-lt"/>
+                <a:ea typeface="+mn-ea"/>
+                <a:cs typeface="+mn-cs"/>
+              </a:defRPr>
+            </a:lvl2pPr>
+            <a:lvl3pPr marL="1143000" indent="-228600" algn="l" defTabSz="914400" rtl="0" eaLnBrk="1" latinLnBrk="0" hangingPunct="1">
+              <a:lnSpc>
+                <a:spcPct val="90000"/>
+              </a:lnSpc>
+              <a:spcBef>
+                <a:spcPts val="500"/>
+              </a:spcBef>
+              <a:buFont typeface="Arial" panose="020B0604020202020204" pitchFamily="34" charset="0"/>
+              <a:buChar char="•"/>
+              <a:defRPr sz="2000" kern="1200">
+                <a:solidFill>
+                  <a:schemeClr val="tx1"/>
+                </a:solidFill>
+                <a:latin typeface="+mn-lt"/>
+                <a:ea typeface="+mn-ea"/>
+                <a:cs typeface="+mn-cs"/>
+              </a:defRPr>
+            </a:lvl3pPr>
+            <a:lvl4pPr marL="1600200" indent="-228600" algn="l" defTabSz="914400" rtl="0" eaLnBrk="1" latinLnBrk="0" hangingPunct="1">
+              <a:lnSpc>
+                <a:spcPct val="90000"/>
+              </a:lnSpc>
+              <a:spcBef>
+                <a:spcPts val="500"/>
+              </a:spcBef>
+              <a:buFont typeface="Arial" panose="020B0604020202020204" pitchFamily="34" charset="0"/>
+              <a:buChar char="•"/>
+              <a:defRPr sz="1800" kern="1200">
+                <a:solidFill>
+                  <a:schemeClr val="tx1"/>
+                </a:solidFill>
+                <a:latin typeface="+mn-lt"/>
+                <a:ea typeface="+mn-ea"/>
+                <a:cs typeface="+mn-cs"/>
+              </a:defRPr>
+            </a:lvl4pPr>
+            <a:lvl5pPr marL="2057400" indent="-228600" algn="l" defTabSz="914400" rtl="0" eaLnBrk="1" latinLnBrk="0" hangingPunct="1">
+              <a:lnSpc>
+                <a:spcPct val="90000"/>
+              </a:lnSpc>
+              <a:spcBef>
+                <a:spcPts val="500"/>
+              </a:spcBef>
+              <a:buFont typeface="Arial" panose="020B0604020202020204" pitchFamily="34" charset="0"/>
+              <a:buChar char="•"/>
+              <a:defRPr sz="1800" kern="1200">
+                <a:solidFill>
+                  <a:schemeClr val="tx1"/>
+                </a:solidFill>
+                <a:latin typeface="+mn-lt"/>
+                <a:ea typeface="+mn-ea"/>
+                <a:cs typeface="+mn-cs"/>
+              </a:defRPr>
+            </a:lvl5pPr>
+            <a:lvl6pPr marL="2514600" indent="-228600" algn="l" defTabSz="914400" rtl="0" eaLnBrk="1" latinLnBrk="0" hangingPunct="1">
+              <a:lnSpc>
+                <a:spcPct val="90000"/>
+              </a:lnSpc>
+              <a:spcBef>
+                <a:spcPts val="500"/>
+              </a:spcBef>
+              <a:buFont typeface="Arial" panose="020B0604020202020204" pitchFamily="34" charset="0"/>
+              <a:buChar char="•"/>
+              <a:defRPr sz="1800" kern="1200">
+                <a:solidFill>
+                  <a:schemeClr val="tx1"/>
+                </a:solidFill>
+                <a:latin typeface="+mn-lt"/>
+                <a:ea typeface="+mn-ea"/>
+                <a:cs typeface="+mn-cs"/>
+              </a:defRPr>
+            </a:lvl6pPr>
+            <a:lvl7pPr marL="2971800" indent="-228600" algn="l" defTabSz="914400" rtl="0" eaLnBrk="1" latinLnBrk="0" hangingPunct="1">
+              <a:lnSpc>
+                <a:spcPct val="90000"/>
+              </a:lnSpc>
+              <a:spcBef>
+                <a:spcPts val="500"/>
+              </a:spcBef>
+              <a:buFont typeface="Arial" panose="020B0604020202020204" pitchFamily="34" charset="0"/>
+              <a:buChar char="•"/>
+              <a:defRPr sz="1800" kern="1200">
+                <a:solidFill>
+                  <a:schemeClr val="tx1"/>
+                </a:solidFill>
+                <a:latin typeface="+mn-lt"/>
+                <a:ea typeface="+mn-ea"/>
+                <a:cs typeface="+mn-cs"/>
+              </a:defRPr>
+            </a:lvl7pPr>
+            <a:lvl8pPr marL="3429000" indent="-228600" algn="l" defTabSz="914400" rtl="0" eaLnBrk="1" latinLnBrk="0" hangingPunct="1">
+              <a:lnSpc>
+                <a:spcPct val="90000"/>
+              </a:lnSpc>
+              <a:spcBef>
+                <a:spcPts val="500"/>
+              </a:spcBef>
+              <a:buFont typeface="Arial" panose="020B0604020202020204" pitchFamily="34" charset="0"/>
+              <a:buChar char="•"/>
+              <a:defRPr sz="1800" kern="1200">
+                <a:solidFill>
+                  <a:schemeClr val="tx1"/>
+                </a:solidFill>
+                <a:latin typeface="+mn-lt"/>
+                <a:ea typeface="+mn-ea"/>
+                <a:cs typeface="+mn-cs"/>
+              </a:defRPr>
+            </a:lvl8pPr>
+            <a:lvl9pPr marL="3886200" indent="-228600" algn="l" defTabSz="914400" rtl="0" eaLnBrk="1" latinLnBrk="0" hangingPunct="1">
+              <a:lnSpc>
+                <a:spcPct val="90000"/>
+              </a:lnSpc>
+              <a:spcBef>
+                <a:spcPts val="500"/>
+              </a:spcBef>
+              <a:buFont typeface="Arial" panose="020B0604020202020204" pitchFamily="34" charset="0"/>
+              <a:buChar char="•"/>
+              <a:defRPr sz="1800" kern="1200">
+                <a:solidFill>
+                  <a:schemeClr val="tx1"/>
+                </a:solidFill>
+                <a:latin typeface="+mn-lt"/>
+                <a:ea typeface="+mn-ea"/>
+                <a:cs typeface="+mn-cs"/>
+              </a:defRPr>
+            </a:lvl9pPr>
+          </a:lstStyle>
+          <a:p>
+            <a:pPr marL="0" indent="0" algn="ctr">
+              <a:buFont typeface="Arial" panose="020B0604020202020204" pitchFamily="34" charset="0"/>
+              <a:buNone/>
+            </a:pPr>
+            <a:r>
+              <a:rPr lang="en-SG" sz="1200" dirty="0">
+                <a:latin typeface="Arial" panose="020B0604020202020204" pitchFamily="34" charset="0"/>
+                <a:cs typeface="Arial" panose="020B0604020202020204" pitchFamily="34" charset="0"/>
+              </a:rPr>
+              <a:t>&lt;Modal /&gt;</a:t>
+            </a:r>
+          </a:p>
+        </p:txBody>
+      </p:sp>
+      <p:sp>
+        <p:nvSpPr>
+          <p:cNvPr id="15" name="Content Placeholder 2">
+            <a:extLst>
+              <a:ext uri="{FF2B5EF4-FFF2-40B4-BE49-F238E27FC236}">
+                <a16:creationId xmlns:a16="http://schemas.microsoft.com/office/drawing/2014/main" id="{28E16F3C-136B-1FCC-CD74-F9B20A29CB15}"/>
+              </a:ext>
+            </a:extLst>
+          </p:cNvPr>
+          <p:cNvSpPr txBox="1">
+            <a:spLocks/>
+          </p:cNvSpPr>
+          <p:nvPr/>
+        </p:nvSpPr>
+        <p:spPr>
+          <a:xfrm>
+            <a:off x="6712646" y="3189901"/>
+            <a:ext cx="1720899" cy="304052"/>
+          </a:xfrm>
+          <a:prstGeom prst="rect">
+            <a:avLst/>
+          </a:prstGeom>
+          <a:ln>
+            <a:solidFill>
+              <a:schemeClr val="tx1"/>
+            </a:solidFill>
+          </a:ln>
+        </p:spPr>
+        <p:txBody>
+          <a:bodyPr vert="horz" lIns="91440" tIns="45720" rIns="91440" bIns="45720" rtlCol="0" anchor="ctr">
+            <a:normAutofit/>
+          </a:bodyPr>
+          <a:lstStyle>
+            <a:lvl1pPr marL="228600" indent="-228600" algn="l" defTabSz="914400" rtl="0" eaLnBrk="1" latinLnBrk="0" hangingPunct="1">
+              <a:lnSpc>
+                <a:spcPct val="90000"/>
+              </a:lnSpc>
+              <a:spcBef>
+                <a:spcPts val="1000"/>
+              </a:spcBef>
+              <a:buFont typeface="Arial" panose="020B0604020202020204" pitchFamily="34" charset="0"/>
+              <a:buChar char="•"/>
+              <a:defRPr sz="2800" kern="1200">
+                <a:solidFill>
+                  <a:schemeClr val="tx1"/>
+                </a:solidFill>
+                <a:latin typeface="+mn-lt"/>
+                <a:ea typeface="+mn-ea"/>
+                <a:cs typeface="+mn-cs"/>
+              </a:defRPr>
+            </a:lvl1pPr>
+            <a:lvl2pPr marL="685800" indent="-228600" algn="l" defTabSz="914400" rtl="0" eaLnBrk="1" latinLnBrk="0" hangingPunct="1">
+              <a:lnSpc>
+                <a:spcPct val="90000"/>
+              </a:lnSpc>
+              <a:spcBef>
+                <a:spcPts val="500"/>
+              </a:spcBef>
+              <a:buFont typeface="Arial" panose="020B0604020202020204" pitchFamily="34" charset="0"/>
+              <a:buChar char="•"/>
+              <a:defRPr sz="2400" kern="1200">
+                <a:solidFill>
+                  <a:schemeClr val="tx1"/>
+                </a:solidFill>
+                <a:latin typeface="+mn-lt"/>
+                <a:ea typeface="+mn-ea"/>
+                <a:cs typeface="+mn-cs"/>
+              </a:defRPr>
+            </a:lvl2pPr>
+            <a:lvl3pPr marL="1143000" indent="-228600" algn="l" defTabSz="914400" rtl="0" eaLnBrk="1" latinLnBrk="0" hangingPunct="1">
+              <a:lnSpc>
+                <a:spcPct val="90000"/>
+              </a:lnSpc>
+              <a:spcBef>
+                <a:spcPts val="500"/>
+              </a:spcBef>
+              <a:buFont typeface="Arial" panose="020B0604020202020204" pitchFamily="34" charset="0"/>
+              <a:buChar char="•"/>
+              <a:defRPr sz="2000" kern="1200">
+                <a:solidFill>
+                  <a:schemeClr val="tx1"/>
+                </a:solidFill>
+                <a:latin typeface="+mn-lt"/>
+                <a:ea typeface="+mn-ea"/>
+                <a:cs typeface="+mn-cs"/>
+              </a:defRPr>
+            </a:lvl3pPr>
+            <a:lvl4pPr marL="1600200" indent="-228600" algn="l" defTabSz="914400" rtl="0" eaLnBrk="1" latinLnBrk="0" hangingPunct="1">
+              <a:lnSpc>
+                <a:spcPct val="90000"/>
+              </a:lnSpc>
+              <a:spcBef>
+                <a:spcPts val="500"/>
+              </a:spcBef>
+              <a:buFont typeface="Arial" panose="020B0604020202020204" pitchFamily="34" charset="0"/>
+              <a:buChar char="•"/>
+              <a:defRPr sz="1800" kern="1200">
+                <a:solidFill>
+                  <a:schemeClr val="tx1"/>
+                </a:solidFill>
+                <a:latin typeface="+mn-lt"/>
+                <a:ea typeface="+mn-ea"/>
+                <a:cs typeface="+mn-cs"/>
+              </a:defRPr>
+            </a:lvl4pPr>
+            <a:lvl5pPr marL="2057400" indent="-228600" algn="l" defTabSz="914400" rtl="0" eaLnBrk="1" latinLnBrk="0" hangingPunct="1">
+              <a:lnSpc>
+                <a:spcPct val="90000"/>
+              </a:lnSpc>
+              <a:spcBef>
+                <a:spcPts val="500"/>
+              </a:spcBef>
+              <a:buFont typeface="Arial" panose="020B0604020202020204" pitchFamily="34" charset="0"/>
+              <a:buChar char="•"/>
+              <a:defRPr sz="1800" kern="1200">
+                <a:solidFill>
+                  <a:schemeClr val="tx1"/>
+                </a:solidFill>
+                <a:latin typeface="+mn-lt"/>
+                <a:ea typeface="+mn-ea"/>
+                <a:cs typeface="+mn-cs"/>
+              </a:defRPr>
+            </a:lvl5pPr>
+            <a:lvl6pPr marL="2514600" indent="-228600" algn="l" defTabSz="914400" rtl="0" eaLnBrk="1" latinLnBrk="0" hangingPunct="1">
+              <a:lnSpc>
+                <a:spcPct val="90000"/>
+              </a:lnSpc>
+              <a:spcBef>
+                <a:spcPts val="500"/>
+              </a:spcBef>
+              <a:buFont typeface="Arial" panose="020B0604020202020204" pitchFamily="34" charset="0"/>
+              <a:buChar char="•"/>
+              <a:defRPr sz="1800" kern="1200">
+                <a:solidFill>
+                  <a:schemeClr val="tx1"/>
+                </a:solidFill>
+                <a:latin typeface="+mn-lt"/>
+                <a:ea typeface="+mn-ea"/>
+                <a:cs typeface="+mn-cs"/>
+              </a:defRPr>
+            </a:lvl6pPr>
+            <a:lvl7pPr marL="2971800" indent="-228600" algn="l" defTabSz="914400" rtl="0" eaLnBrk="1" latinLnBrk="0" hangingPunct="1">
+              <a:lnSpc>
+                <a:spcPct val="90000"/>
+              </a:lnSpc>
+              <a:spcBef>
+                <a:spcPts val="500"/>
+              </a:spcBef>
+              <a:buFont typeface="Arial" panose="020B0604020202020204" pitchFamily="34" charset="0"/>
+              <a:buChar char="•"/>
+              <a:defRPr sz="1800" kern="1200">
+                <a:solidFill>
+                  <a:schemeClr val="tx1"/>
+                </a:solidFill>
+                <a:latin typeface="+mn-lt"/>
+                <a:ea typeface="+mn-ea"/>
+                <a:cs typeface="+mn-cs"/>
+              </a:defRPr>
+            </a:lvl7pPr>
+            <a:lvl8pPr marL="3429000" indent="-228600" algn="l" defTabSz="914400" rtl="0" eaLnBrk="1" latinLnBrk="0" hangingPunct="1">
+              <a:lnSpc>
+                <a:spcPct val="90000"/>
+              </a:lnSpc>
+              <a:spcBef>
+                <a:spcPts val="500"/>
+              </a:spcBef>
+              <a:buFont typeface="Arial" panose="020B0604020202020204" pitchFamily="34" charset="0"/>
+              <a:buChar char="•"/>
+              <a:defRPr sz="1800" kern="1200">
+                <a:solidFill>
+                  <a:schemeClr val="tx1"/>
+                </a:solidFill>
+                <a:latin typeface="+mn-lt"/>
+                <a:ea typeface="+mn-ea"/>
+                <a:cs typeface="+mn-cs"/>
+              </a:defRPr>
+            </a:lvl8pPr>
+            <a:lvl9pPr marL="3886200" indent="-228600" algn="l" defTabSz="914400" rtl="0" eaLnBrk="1" latinLnBrk="0" hangingPunct="1">
+              <a:lnSpc>
+                <a:spcPct val="90000"/>
+              </a:lnSpc>
+              <a:spcBef>
+                <a:spcPts val="500"/>
+              </a:spcBef>
+              <a:buFont typeface="Arial" panose="020B0604020202020204" pitchFamily="34" charset="0"/>
+              <a:buChar char="•"/>
+              <a:defRPr sz="1800" kern="1200">
+                <a:solidFill>
+                  <a:schemeClr val="tx1"/>
+                </a:solidFill>
+                <a:latin typeface="+mn-lt"/>
+                <a:ea typeface="+mn-ea"/>
+                <a:cs typeface="+mn-cs"/>
+              </a:defRPr>
+            </a:lvl9pPr>
+          </a:lstStyle>
+          <a:p>
+            <a:pPr marL="0" indent="0" algn="ctr">
+              <a:buFont typeface="Arial" panose="020B0604020202020204" pitchFamily="34" charset="0"/>
+              <a:buNone/>
+            </a:pPr>
+            <a:r>
+              <a:rPr lang="en-SG" sz="1200" dirty="0">
+                <a:latin typeface="Arial" panose="020B0604020202020204" pitchFamily="34" charset="0"/>
+                <a:cs typeface="Arial" panose="020B0604020202020204" pitchFamily="34" charset="0"/>
+              </a:rPr>
+              <a:t>&lt;SearchSection /&gt;</a:t>
+            </a:r>
+          </a:p>
+        </p:txBody>
+      </p:sp>
+      <p:sp>
+        <p:nvSpPr>
+          <p:cNvPr id="16" name="Content Placeholder 2">
+            <a:extLst>
+              <a:ext uri="{FF2B5EF4-FFF2-40B4-BE49-F238E27FC236}">
+                <a16:creationId xmlns:a16="http://schemas.microsoft.com/office/drawing/2014/main" id="{1FD5C028-5895-55F1-0D72-2CF8434B6832}"/>
+              </a:ext>
+            </a:extLst>
+          </p:cNvPr>
+          <p:cNvSpPr txBox="1">
+            <a:spLocks/>
+          </p:cNvSpPr>
+          <p:nvPr/>
+        </p:nvSpPr>
+        <p:spPr>
+          <a:xfrm>
+            <a:off x="8924851" y="3196882"/>
+            <a:ext cx="1761033" cy="290090"/>
+          </a:xfrm>
+          <a:prstGeom prst="rect">
+            <a:avLst/>
+          </a:prstGeom>
+          <a:ln>
+            <a:solidFill>
+              <a:schemeClr val="tx1"/>
+            </a:solidFill>
+          </a:ln>
+        </p:spPr>
+        <p:txBody>
+          <a:bodyPr vert="horz" lIns="91440" tIns="45720" rIns="91440" bIns="45720" rtlCol="0" anchor="ctr">
+            <a:normAutofit/>
+          </a:bodyPr>
+          <a:lstStyle>
+            <a:lvl1pPr marL="228600" indent="-228600" algn="l" defTabSz="914400" rtl="0" eaLnBrk="1" latinLnBrk="0" hangingPunct="1">
+              <a:lnSpc>
+                <a:spcPct val="90000"/>
+              </a:lnSpc>
+              <a:spcBef>
+                <a:spcPts val="1000"/>
+              </a:spcBef>
+              <a:buFont typeface="Arial" panose="020B0604020202020204" pitchFamily="34" charset="0"/>
+              <a:buChar char="•"/>
+              <a:defRPr sz="2800" kern="1200">
+                <a:solidFill>
+                  <a:schemeClr val="tx1"/>
+                </a:solidFill>
+                <a:latin typeface="+mn-lt"/>
+                <a:ea typeface="+mn-ea"/>
+                <a:cs typeface="+mn-cs"/>
+              </a:defRPr>
+            </a:lvl1pPr>
+            <a:lvl2pPr marL="685800" indent="-228600" algn="l" defTabSz="914400" rtl="0" eaLnBrk="1" latinLnBrk="0" hangingPunct="1">
+              <a:lnSpc>
+                <a:spcPct val="90000"/>
+              </a:lnSpc>
+              <a:spcBef>
+                <a:spcPts val="500"/>
+              </a:spcBef>
+              <a:buFont typeface="Arial" panose="020B0604020202020204" pitchFamily="34" charset="0"/>
+              <a:buChar char="•"/>
+              <a:defRPr sz="2400" kern="1200">
+                <a:solidFill>
+                  <a:schemeClr val="tx1"/>
+                </a:solidFill>
+                <a:latin typeface="+mn-lt"/>
+                <a:ea typeface="+mn-ea"/>
+                <a:cs typeface="+mn-cs"/>
+              </a:defRPr>
+            </a:lvl2pPr>
+            <a:lvl3pPr marL="1143000" indent="-228600" algn="l" defTabSz="914400" rtl="0" eaLnBrk="1" latinLnBrk="0" hangingPunct="1">
+              <a:lnSpc>
+                <a:spcPct val="90000"/>
+              </a:lnSpc>
+              <a:spcBef>
+                <a:spcPts val="500"/>
+              </a:spcBef>
+              <a:buFont typeface="Arial" panose="020B0604020202020204" pitchFamily="34" charset="0"/>
+              <a:buChar char="•"/>
+              <a:defRPr sz="2000" kern="1200">
+                <a:solidFill>
+                  <a:schemeClr val="tx1"/>
+                </a:solidFill>
+                <a:latin typeface="+mn-lt"/>
+                <a:ea typeface="+mn-ea"/>
+                <a:cs typeface="+mn-cs"/>
+              </a:defRPr>
+            </a:lvl3pPr>
+            <a:lvl4pPr marL="1600200" indent="-228600" algn="l" defTabSz="914400" rtl="0" eaLnBrk="1" latinLnBrk="0" hangingPunct="1">
+              <a:lnSpc>
+                <a:spcPct val="90000"/>
+              </a:lnSpc>
+              <a:spcBef>
+                <a:spcPts val="500"/>
+              </a:spcBef>
+              <a:buFont typeface="Arial" panose="020B0604020202020204" pitchFamily="34" charset="0"/>
+              <a:buChar char="•"/>
+              <a:defRPr sz="1800" kern="1200">
+                <a:solidFill>
+                  <a:schemeClr val="tx1"/>
+                </a:solidFill>
+                <a:latin typeface="+mn-lt"/>
+                <a:ea typeface="+mn-ea"/>
+                <a:cs typeface="+mn-cs"/>
+              </a:defRPr>
+            </a:lvl4pPr>
+            <a:lvl5pPr marL="2057400" indent="-228600" algn="l" defTabSz="914400" rtl="0" eaLnBrk="1" latinLnBrk="0" hangingPunct="1">
+              <a:lnSpc>
+                <a:spcPct val="90000"/>
+              </a:lnSpc>
+              <a:spcBef>
+                <a:spcPts val="500"/>
+              </a:spcBef>
+              <a:buFont typeface="Arial" panose="020B0604020202020204" pitchFamily="34" charset="0"/>
+              <a:buChar char="•"/>
+              <a:defRPr sz="1800" kern="1200">
+                <a:solidFill>
+                  <a:schemeClr val="tx1"/>
+                </a:solidFill>
+                <a:latin typeface="+mn-lt"/>
+                <a:ea typeface="+mn-ea"/>
+                <a:cs typeface="+mn-cs"/>
+              </a:defRPr>
+            </a:lvl5pPr>
+            <a:lvl6pPr marL="2514600" indent="-228600" algn="l" defTabSz="914400" rtl="0" eaLnBrk="1" latinLnBrk="0" hangingPunct="1">
+              <a:lnSpc>
+                <a:spcPct val="90000"/>
+              </a:lnSpc>
+              <a:spcBef>
+                <a:spcPts val="500"/>
+              </a:spcBef>
+              <a:buFont typeface="Arial" panose="020B0604020202020204" pitchFamily="34" charset="0"/>
+              <a:buChar char="•"/>
+              <a:defRPr sz="1800" kern="1200">
+                <a:solidFill>
+                  <a:schemeClr val="tx1"/>
+                </a:solidFill>
+                <a:latin typeface="+mn-lt"/>
+                <a:ea typeface="+mn-ea"/>
+                <a:cs typeface="+mn-cs"/>
+              </a:defRPr>
+            </a:lvl6pPr>
+            <a:lvl7pPr marL="2971800" indent="-228600" algn="l" defTabSz="914400" rtl="0" eaLnBrk="1" latinLnBrk="0" hangingPunct="1">
+              <a:lnSpc>
+                <a:spcPct val="90000"/>
+              </a:lnSpc>
+              <a:spcBef>
+                <a:spcPts val="500"/>
+              </a:spcBef>
+              <a:buFont typeface="Arial" panose="020B0604020202020204" pitchFamily="34" charset="0"/>
+              <a:buChar char="•"/>
+              <a:defRPr sz="1800" kern="1200">
+                <a:solidFill>
+                  <a:schemeClr val="tx1"/>
+                </a:solidFill>
+                <a:latin typeface="+mn-lt"/>
+                <a:ea typeface="+mn-ea"/>
+                <a:cs typeface="+mn-cs"/>
+              </a:defRPr>
+            </a:lvl7pPr>
+            <a:lvl8pPr marL="3429000" indent="-228600" algn="l" defTabSz="914400" rtl="0" eaLnBrk="1" latinLnBrk="0" hangingPunct="1">
+              <a:lnSpc>
+                <a:spcPct val="90000"/>
+              </a:lnSpc>
+              <a:spcBef>
+                <a:spcPts val="500"/>
+              </a:spcBef>
+              <a:buFont typeface="Arial" panose="020B0604020202020204" pitchFamily="34" charset="0"/>
+              <a:buChar char="•"/>
+              <a:defRPr sz="1800" kern="1200">
+                <a:solidFill>
+                  <a:schemeClr val="tx1"/>
+                </a:solidFill>
+                <a:latin typeface="+mn-lt"/>
+                <a:ea typeface="+mn-ea"/>
+                <a:cs typeface="+mn-cs"/>
+              </a:defRPr>
+            </a:lvl8pPr>
+            <a:lvl9pPr marL="3886200" indent="-228600" algn="l" defTabSz="914400" rtl="0" eaLnBrk="1" latinLnBrk="0" hangingPunct="1">
+              <a:lnSpc>
+                <a:spcPct val="90000"/>
+              </a:lnSpc>
+              <a:spcBef>
+                <a:spcPts val="500"/>
+              </a:spcBef>
+              <a:buFont typeface="Arial" panose="020B0604020202020204" pitchFamily="34" charset="0"/>
+              <a:buChar char="•"/>
+              <a:defRPr sz="1800" kern="1200">
+                <a:solidFill>
+                  <a:schemeClr val="tx1"/>
+                </a:solidFill>
+                <a:latin typeface="+mn-lt"/>
+                <a:ea typeface="+mn-ea"/>
+                <a:cs typeface="+mn-cs"/>
+              </a:defRPr>
+            </a:lvl9pPr>
+          </a:lstStyle>
+          <a:p>
+            <a:pPr marL="0" indent="0" algn="ctr">
+              <a:buFont typeface="Arial" panose="020B0604020202020204" pitchFamily="34" charset="0"/>
+              <a:buNone/>
+            </a:pPr>
+            <a:r>
+              <a:rPr lang="en-SG" sz="1200" dirty="0">
+                <a:latin typeface="Arial" panose="020B0604020202020204" pitchFamily="34" charset="0"/>
+                <a:cs typeface="Arial" panose="020B0604020202020204" pitchFamily="34" charset="0"/>
+              </a:rPr>
+              <a:t>&lt;ResultIngredient /&gt;</a:t>
+            </a:r>
+          </a:p>
+        </p:txBody>
+      </p:sp>
+      <p:sp>
+        <p:nvSpPr>
+          <p:cNvPr id="17" name="Content Placeholder 2">
+            <a:extLst>
+              <a:ext uri="{FF2B5EF4-FFF2-40B4-BE49-F238E27FC236}">
+                <a16:creationId xmlns:a16="http://schemas.microsoft.com/office/drawing/2014/main" id="{5613001F-0C7D-F095-B18E-4828299AA727}"/>
+              </a:ext>
+            </a:extLst>
+          </p:cNvPr>
+          <p:cNvSpPr txBox="1">
+            <a:spLocks/>
+          </p:cNvSpPr>
+          <p:nvPr/>
+        </p:nvSpPr>
+        <p:spPr>
+          <a:xfrm>
+            <a:off x="8924851" y="3806912"/>
+            <a:ext cx="1761033" cy="290090"/>
+          </a:xfrm>
+          <a:prstGeom prst="rect">
+            <a:avLst/>
+          </a:prstGeom>
+          <a:ln>
+            <a:solidFill>
+              <a:schemeClr val="tx1"/>
+            </a:solidFill>
+          </a:ln>
+        </p:spPr>
+        <p:txBody>
+          <a:bodyPr vert="horz" lIns="91440" tIns="45720" rIns="91440" bIns="45720" rtlCol="0" anchor="ctr">
+            <a:normAutofit/>
+          </a:bodyPr>
+          <a:lstStyle>
+            <a:lvl1pPr marL="228600" indent="-228600" algn="l" defTabSz="914400" rtl="0" eaLnBrk="1" latinLnBrk="0" hangingPunct="1">
+              <a:lnSpc>
+                <a:spcPct val="90000"/>
+              </a:lnSpc>
+              <a:spcBef>
+                <a:spcPts val="1000"/>
+              </a:spcBef>
+              <a:buFont typeface="Arial" panose="020B0604020202020204" pitchFamily="34" charset="0"/>
+              <a:buChar char="•"/>
+              <a:defRPr sz="2800" kern="1200">
+                <a:solidFill>
+                  <a:schemeClr val="tx1"/>
+                </a:solidFill>
+                <a:latin typeface="+mn-lt"/>
+                <a:ea typeface="+mn-ea"/>
+                <a:cs typeface="+mn-cs"/>
+              </a:defRPr>
+            </a:lvl1pPr>
+            <a:lvl2pPr marL="685800" indent="-228600" algn="l" defTabSz="914400" rtl="0" eaLnBrk="1" latinLnBrk="0" hangingPunct="1">
+              <a:lnSpc>
+                <a:spcPct val="90000"/>
+              </a:lnSpc>
+              <a:spcBef>
+                <a:spcPts val="500"/>
+              </a:spcBef>
+              <a:buFont typeface="Arial" panose="020B0604020202020204" pitchFamily="34" charset="0"/>
+              <a:buChar char="•"/>
+              <a:defRPr sz="2400" kern="1200">
+                <a:solidFill>
+                  <a:schemeClr val="tx1"/>
+                </a:solidFill>
+                <a:latin typeface="+mn-lt"/>
+                <a:ea typeface="+mn-ea"/>
+                <a:cs typeface="+mn-cs"/>
+              </a:defRPr>
+            </a:lvl2pPr>
+            <a:lvl3pPr marL="1143000" indent="-228600" algn="l" defTabSz="914400" rtl="0" eaLnBrk="1" latinLnBrk="0" hangingPunct="1">
+              <a:lnSpc>
+                <a:spcPct val="90000"/>
+              </a:lnSpc>
+              <a:spcBef>
+                <a:spcPts val="500"/>
+              </a:spcBef>
+              <a:buFont typeface="Arial" panose="020B0604020202020204" pitchFamily="34" charset="0"/>
+              <a:buChar char="•"/>
+              <a:defRPr sz="2000" kern="1200">
+                <a:solidFill>
+                  <a:schemeClr val="tx1"/>
+                </a:solidFill>
+                <a:latin typeface="+mn-lt"/>
+                <a:ea typeface="+mn-ea"/>
+                <a:cs typeface="+mn-cs"/>
+              </a:defRPr>
+            </a:lvl3pPr>
+            <a:lvl4pPr marL="1600200" indent="-228600" algn="l" defTabSz="914400" rtl="0" eaLnBrk="1" latinLnBrk="0" hangingPunct="1">
+              <a:lnSpc>
+                <a:spcPct val="90000"/>
+              </a:lnSpc>
+              <a:spcBef>
+                <a:spcPts val="500"/>
+              </a:spcBef>
+              <a:buFont typeface="Arial" panose="020B0604020202020204" pitchFamily="34" charset="0"/>
+              <a:buChar char="•"/>
+              <a:defRPr sz="1800" kern="1200">
+                <a:solidFill>
+                  <a:schemeClr val="tx1"/>
+                </a:solidFill>
+                <a:latin typeface="+mn-lt"/>
+                <a:ea typeface="+mn-ea"/>
+                <a:cs typeface="+mn-cs"/>
+              </a:defRPr>
+            </a:lvl4pPr>
+            <a:lvl5pPr marL="2057400" indent="-228600" algn="l" defTabSz="914400" rtl="0" eaLnBrk="1" latinLnBrk="0" hangingPunct="1">
+              <a:lnSpc>
+                <a:spcPct val="90000"/>
+              </a:lnSpc>
+              <a:spcBef>
+                <a:spcPts val="500"/>
+              </a:spcBef>
+              <a:buFont typeface="Arial" panose="020B0604020202020204" pitchFamily="34" charset="0"/>
+              <a:buChar char="•"/>
+              <a:defRPr sz="1800" kern="1200">
+                <a:solidFill>
+                  <a:schemeClr val="tx1"/>
+                </a:solidFill>
+                <a:latin typeface="+mn-lt"/>
+                <a:ea typeface="+mn-ea"/>
+                <a:cs typeface="+mn-cs"/>
+              </a:defRPr>
+            </a:lvl5pPr>
+            <a:lvl6pPr marL="2514600" indent="-228600" algn="l" defTabSz="914400" rtl="0" eaLnBrk="1" latinLnBrk="0" hangingPunct="1">
+              <a:lnSpc>
+                <a:spcPct val="90000"/>
+              </a:lnSpc>
+              <a:spcBef>
+                <a:spcPts val="500"/>
+              </a:spcBef>
+              <a:buFont typeface="Arial" panose="020B0604020202020204" pitchFamily="34" charset="0"/>
+              <a:buChar char="•"/>
+              <a:defRPr sz="1800" kern="1200">
+                <a:solidFill>
+                  <a:schemeClr val="tx1"/>
+                </a:solidFill>
+                <a:latin typeface="+mn-lt"/>
+                <a:ea typeface="+mn-ea"/>
+                <a:cs typeface="+mn-cs"/>
+              </a:defRPr>
+            </a:lvl6pPr>
+            <a:lvl7pPr marL="2971800" indent="-228600" algn="l" defTabSz="914400" rtl="0" eaLnBrk="1" latinLnBrk="0" hangingPunct="1">
+              <a:lnSpc>
+                <a:spcPct val="90000"/>
+              </a:lnSpc>
+              <a:spcBef>
+                <a:spcPts val="500"/>
+              </a:spcBef>
+              <a:buFont typeface="Arial" panose="020B0604020202020204" pitchFamily="34" charset="0"/>
+              <a:buChar char="•"/>
+              <a:defRPr sz="1800" kern="1200">
+                <a:solidFill>
+                  <a:schemeClr val="tx1"/>
+                </a:solidFill>
+                <a:latin typeface="+mn-lt"/>
+                <a:ea typeface="+mn-ea"/>
+                <a:cs typeface="+mn-cs"/>
+              </a:defRPr>
+            </a:lvl7pPr>
+            <a:lvl8pPr marL="3429000" indent="-228600" algn="l" defTabSz="914400" rtl="0" eaLnBrk="1" latinLnBrk="0" hangingPunct="1">
+              <a:lnSpc>
+                <a:spcPct val="90000"/>
+              </a:lnSpc>
+              <a:spcBef>
+                <a:spcPts val="500"/>
+              </a:spcBef>
+              <a:buFont typeface="Arial" panose="020B0604020202020204" pitchFamily="34" charset="0"/>
+              <a:buChar char="•"/>
+              <a:defRPr sz="1800" kern="1200">
+                <a:solidFill>
+                  <a:schemeClr val="tx1"/>
+                </a:solidFill>
+                <a:latin typeface="+mn-lt"/>
+                <a:ea typeface="+mn-ea"/>
+                <a:cs typeface="+mn-cs"/>
+              </a:defRPr>
+            </a:lvl8pPr>
+            <a:lvl9pPr marL="3886200" indent="-228600" algn="l" defTabSz="914400" rtl="0" eaLnBrk="1" latinLnBrk="0" hangingPunct="1">
+              <a:lnSpc>
+                <a:spcPct val="90000"/>
+              </a:lnSpc>
+              <a:spcBef>
+                <a:spcPts val="500"/>
+              </a:spcBef>
+              <a:buFont typeface="Arial" panose="020B0604020202020204" pitchFamily="34" charset="0"/>
+              <a:buChar char="•"/>
+              <a:defRPr sz="1800" kern="1200">
+                <a:solidFill>
+                  <a:schemeClr val="tx1"/>
+                </a:solidFill>
+                <a:latin typeface="+mn-lt"/>
+                <a:ea typeface="+mn-ea"/>
+                <a:cs typeface="+mn-cs"/>
+              </a:defRPr>
+            </a:lvl9pPr>
+          </a:lstStyle>
+          <a:p>
+            <a:pPr marL="0" indent="0" algn="ctr">
+              <a:buFont typeface="Arial" panose="020B0604020202020204" pitchFamily="34" charset="0"/>
+              <a:buNone/>
+            </a:pPr>
+            <a:r>
+              <a:rPr lang="en-SG" sz="1200" dirty="0">
+                <a:latin typeface="Arial" panose="020B0604020202020204" pitchFamily="34" charset="0"/>
+                <a:cs typeface="Arial" panose="020B0604020202020204" pitchFamily="34" charset="0"/>
+              </a:rPr>
+              <a:t>&lt;Modal /&gt;</a:t>
+            </a:r>
+          </a:p>
+        </p:txBody>
+      </p:sp>
+      <p:cxnSp>
+        <p:nvCxnSpPr>
+          <p:cNvPr id="33" name="Connector: Elbow 32">
+            <a:extLst>
+              <a:ext uri="{FF2B5EF4-FFF2-40B4-BE49-F238E27FC236}">
+                <a16:creationId xmlns:a16="http://schemas.microsoft.com/office/drawing/2014/main" id="{9DF96492-D8AE-BD74-7AF5-2DCDD8CFCBE9}"/>
+              </a:ext>
+            </a:extLst>
+          </p:cNvPr>
+          <p:cNvCxnSpPr>
+            <a:stCxn id="3" idx="2"/>
+            <a:endCxn id="4" idx="0"/>
+          </p:cNvCxnSpPr>
+          <p:nvPr/>
+        </p:nvCxnSpPr>
+        <p:spPr>
+          <a:xfrm rot="5400000">
+            <a:off x="3925682" y="988768"/>
+            <a:ext cx="427970" cy="2484643"/>
+          </a:xfrm>
+          <a:prstGeom prst="bentConnector3">
+            <a:avLst/>
+          </a:prstGeom>
+          <a:ln>
+            <a:solidFill>
+              <a:schemeClr val="tx1"/>
+            </a:solidFill>
+            <a:tailEnd type="triangle"/>
+          </a:ln>
+        </p:spPr>
+        <p:style>
+          <a:lnRef idx="1">
+            <a:schemeClr val="accent1"/>
+          </a:lnRef>
+          <a:fillRef idx="0">
+            <a:schemeClr val="accent1"/>
+          </a:fillRef>
+          <a:effectRef idx="0">
+            <a:schemeClr val="accent1"/>
+          </a:effectRef>
+          <a:fontRef idx="minor">
+            <a:schemeClr val="tx1"/>
+          </a:fontRef>
+        </p:style>
+      </p:cxnSp>
+      <p:cxnSp>
+        <p:nvCxnSpPr>
+          <p:cNvPr id="35" name="Connector: Elbow 34">
+            <a:extLst>
+              <a:ext uri="{FF2B5EF4-FFF2-40B4-BE49-F238E27FC236}">
+                <a16:creationId xmlns:a16="http://schemas.microsoft.com/office/drawing/2014/main" id="{758273D2-C019-82F4-0AC5-1D7C6C075081}"/>
+              </a:ext>
+            </a:extLst>
+          </p:cNvPr>
+          <p:cNvCxnSpPr>
+            <a:stCxn id="3" idx="2"/>
+            <a:endCxn id="5" idx="0"/>
+          </p:cNvCxnSpPr>
+          <p:nvPr/>
+        </p:nvCxnSpPr>
+        <p:spPr>
+          <a:xfrm rot="16200000" flipH="1">
+            <a:off x="6756784" y="642307"/>
+            <a:ext cx="437429" cy="3187021"/>
+          </a:xfrm>
+          <a:prstGeom prst="bentConnector3">
+            <a:avLst/>
+          </a:prstGeom>
+          <a:ln>
+            <a:solidFill>
+              <a:schemeClr val="tx1"/>
+            </a:solidFill>
+            <a:tailEnd type="triangle"/>
+          </a:ln>
+        </p:spPr>
+        <p:style>
+          <a:lnRef idx="1">
+            <a:schemeClr val="accent1"/>
+          </a:lnRef>
+          <a:fillRef idx="0">
+            <a:schemeClr val="accent1"/>
+          </a:fillRef>
+          <a:effectRef idx="0">
+            <a:schemeClr val="accent1"/>
+          </a:effectRef>
+          <a:fontRef idx="minor">
+            <a:schemeClr val="tx1"/>
+          </a:fontRef>
+        </p:style>
+      </p:cxnSp>
+      <p:cxnSp>
+        <p:nvCxnSpPr>
+          <p:cNvPr id="43" name="Connector: Elbow 42">
+            <a:extLst>
+              <a:ext uri="{FF2B5EF4-FFF2-40B4-BE49-F238E27FC236}">
+                <a16:creationId xmlns:a16="http://schemas.microsoft.com/office/drawing/2014/main" id="{8FA51BBD-BE0A-EF76-698E-D092E57D8C89}"/>
+              </a:ext>
+            </a:extLst>
+          </p:cNvPr>
+          <p:cNvCxnSpPr>
+            <a:stCxn id="4" idx="2"/>
+            <a:endCxn id="10" idx="0"/>
+          </p:cNvCxnSpPr>
+          <p:nvPr/>
+        </p:nvCxnSpPr>
+        <p:spPr>
+          <a:xfrm rot="5400000">
+            <a:off x="2155960" y="2456278"/>
+            <a:ext cx="267785" cy="1214986"/>
+          </a:xfrm>
+          <a:prstGeom prst="bentConnector3">
+            <a:avLst/>
+          </a:prstGeom>
+          <a:ln>
+            <a:headEnd type="triangle"/>
+            <a:tailEnd type="triangle"/>
+          </a:ln>
+        </p:spPr>
+        <p:style>
+          <a:lnRef idx="1">
+            <a:schemeClr val="dk1"/>
+          </a:lnRef>
+          <a:fillRef idx="0">
+            <a:schemeClr val="dk1"/>
+          </a:fillRef>
+          <a:effectRef idx="0">
+            <a:schemeClr val="dk1"/>
+          </a:effectRef>
+          <a:fontRef idx="minor">
+            <a:schemeClr val="tx1"/>
+          </a:fontRef>
+        </p:style>
+      </p:cxnSp>
+      <p:cxnSp>
+        <p:nvCxnSpPr>
+          <p:cNvPr id="49" name="Connector: Elbow 48">
+            <a:extLst>
+              <a:ext uri="{FF2B5EF4-FFF2-40B4-BE49-F238E27FC236}">
+                <a16:creationId xmlns:a16="http://schemas.microsoft.com/office/drawing/2014/main" id="{F890F603-B0E9-4A63-C21E-76D485661486}"/>
+              </a:ext>
+            </a:extLst>
+          </p:cNvPr>
+          <p:cNvCxnSpPr>
+            <a:cxnSpLocks/>
+          </p:cNvCxnSpPr>
+          <p:nvPr/>
+        </p:nvCxnSpPr>
+        <p:spPr>
+          <a:xfrm rot="16200000" flipH="1">
+            <a:off x="3340326" y="2568077"/>
+            <a:ext cx="274766" cy="1017286"/>
+          </a:xfrm>
+          <a:prstGeom prst="bentConnector3">
+            <a:avLst/>
+          </a:prstGeom>
+          <a:ln>
+            <a:solidFill>
+              <a:schemeClr val="tx1"/>
+            </a:solidFill>
+            <a:tailEnd type="triangle"/>
+          </a:ln>
+        </p:spPr>
+        <p:style>
+          <a:lnRef idx="1">
+            <a:schemeClr val="accent1"/>
+          </a:lnRef>
+          <a:fillRef idx="0">
+            <a:schemeClr val="accent1"/>
+          </a:fillRef>
+          <a:effectRef idx="0">
+            <a:schemeClr val="accent1"/>
+          </a:effectRef>
+          <a:fontRef idx="minor">
+            <a:schemeClr val="tx1"/>
+          </a:fontRef>
+        </p:style>
+      </p:cxnSp>
+      <p:cxnSp>
+        <p:nvCxnSpPr>
+          <p:cNvPr id="51" name="Straight Arrow Connector 50">
+            <a:extLst>
+              <a:ext uri="{FF2B5EF4-FFF2-40B4-BE49-F238E27FC236}">
+                <a16:creationId xmlns:a16="http://schemas.microsoft.com/office/drawing/2014/main" id="{E5B3C095-5FF4-C5C0-EC6E-4AE5D6A417B2}"/>
+              </a:ext>
+            </a:extLst>
+          </p:cNvPr>
+          <p:cNvCxnSpPr>
+            <a:stCxn id="11" idx="2"/>
+            <a:endCxn id="13" idx="0"/>
+          </p:cNvCxnSpPr>
+          <p:nvPr/>
+        </p:nvCxnSpPr>
+        <p:spPr>
+          <a:xfrm>
+            <a:off x="3914631" y="3494735"/>
+            <a:ext cx="0" cy="341334"/>
+          </a:xfrm>
+          <a:prstGeom prst="straightConnector1">
+            <a:avLst/>
+          </a:prstGeom>
+          <a:ln>
+            <a:tailEnd type="triangle"/>
+          </a:ln>
+        </p:spPr>
+        <p:style>
+          <a:lnRef idx="1">
+            <a:schemeClr val="dk1"/>
+          </a:lnRef>
+          <a:fillRef idx="0">
+            <a:schemeClr val="dk1"/>
+          </a:fillRef>
+          <a:effectRef idx="0">
+            <a:schemeClr val="dk1"/>
+          </a:effectRef>
+          <a:fontRef idx="minor">
+            <a:schemeClr val="tx1"/>
+          </a:fontRef>
+        </p:style>
+      </p:cxnSp>
+      <p:cxnSp>
+        <p:nvCxnSpPr>
+          <p:cNvPr id="56" name="Connector: Elbow 55">
+            <a:extLst>
+              <a:ext uri="{FF2B5EF4-FFF2-40B4-BE49-F238E27FC236}">
+                <a16:creationId xmlns:a16="http://schemas.microsoft.com/office/drawing/2014/main" id="{95765B15-1BEF-6705-81B9-4D2E1410C427}"/>
+              </a:ext>
+            </a:extLst>
+          </p:cNvPr>
+          <p:cNvCxnSpPr>
+            <a:stCxn id="5" idx="2"/>
+            <a:endCxn id="15" idx="0"/>
+          </p:cNvCxnSpPr>
+          <p:nvPr/>
+        </p:nvCxnSpPr>
+        <p:spPr>
+          <a:xfrm rot="5400000">
+            <a:off x="7945772" y="2566663"/>
+            <a:ext cx="250563" cy="995913"/>
+          </a:xfrm>
+          <a:prstGeom prst="bentConnector3">
+            <a:avLst/>
+          </a:prstGeom>
+          <a:ln>
+            <a:headEnd type="triangle"/>
+            <a:tailEnd type="triangle"/>
+          </a:ln>
+        </p:spPr>
+        <p:style>
+          <a:lnRef idx="1">
+            <a:schemeClr val="dk1"/>
+          </a:lnRef>
+          <a:fillRef idx="0">
+            <a:schemeClr val="dk1"/>
+          </a:fillRef>
+          <a:effectRef idx="0">
+            <a:schemeClr val="dk1"/>
+          </a:effectRef>
+          <a:fontRef idx="minor">
+            <a:schemeClr val="tx1"/>
+          </a:fontRef>
+        </p:style>
+      </p:cxnSp>
+      <p:cxnSp>
+        <p:nvCxnSpPr>
+          <p:cNvPr id="60" name="Connector: Elbow 59">
+            <a:extLst>
+              <a:ext uri="{FF2B5EF4-FFF2-40B4-BE49-F238E27FC236}">
+                <a16:creationId xmlns:a16="http://schemas.microsoft.com/office/drawing/2014/main" id="{40F44FC4-67B7-78CB-4888-D3B4E3C94C89}"/>
+              </a:ext>
+            </a:extLst>
+          </p:cNvPr>
+          <p:cNvCxnSpPr>
+            <a:cxnSpLocks/>
+          </p:cNvCxnSpPr>
+          <p:nvPr/>
+        </p:nvCxnSpPr>
+        <p:spPr>
+          <a:xfrm rot="16200000" flipH="1">
+            <a:off x="9191036" y="2449930"/>
+            <a:ext cx="257544" cy="1236359"/>
+          </a:xfrm>
+          <a:prstGeom prst="bentConnector3">
+            <a:avLst/>
+          </a:prstGeom>
+          <a:ln>
+            <a:tailEnd type="triangle"/>
+          </a:ln>
+        </p:spPr>
+        <p:style>
+          <a:lnRef idx="1">
+            <a:schemeClr val="dk1"/>
+          </a:lnRef>
+          <a:fillRef idx="0">
+            <a:schemeClr val="dk1"/>
+          </a:fillRef>
+          <a:effectRef idx="0">
+            <a:schemeClr val="dk1"/>
+          </a:effectRef>
+          <a:fontRef idx="minor">
+            <a:schemeClr val="tx1"/>
+          </a:fontRef>
+        </p:style>
+      </p:cxnSp>
+      <p:cxnSp>
+        <p:nvCxnSpPr>
+          <p:cNvPr id="65" name="Straight Arrow Connector 64">
+            <a:extLst>
+              <a:ext uri="{FF2B5EF4-FFF2-40B4-BE49-F238E27FC236}">
+                <a16:creationId xmlns:a16="http://schemas.microsoft.com/office/drawing/2014/main" id="{F9BA2225-F6C8-1B0D-EF59-57EB7FCDAFA4}"/>
+              </a:ext>
+            </a:extLst>
+          </p:cNvPr>
+          <p:cNvCxnSpPr>
+            <a:cxnSpLocks/>
+            <a:stCxn id="16" idx="2"/>
+            <a:endCxn id="17" idx="0"/>
+          </p:cNvCxnSpPr>
+          <p:nvPr/>
+        </p:nvCxnSpPr>
+        <p:spPr>
+          <a:xfrm>
+            <a:off x="9805368" y="3486972"/>
+            <a:ext cx="0" cy="319940"/>
+          </a:xfrm>
+          <a:prstGeom prst="straightConnector1">
+            <a:avLst/>
+          </a:prstGeom>
+          <a:ln>
+            <a:tailEnd type="triangle"/>
+          </a:ln>
+        </p:spPr>
+        <p:style>
+          <a:lnRef idx="1">
+            <a:schemeClr val="dk1"/>
+          </a:lnRef>
+          <a:fillRef idx="0">
+            <a:schemeClr val="dk1"/>
+          </a:fillRef>
+          <a:effectRef idx="0">
+            <a:schemeClr val="dk1"/>
+          </a:effectRef>
+          <a:fontRef idx="minor">
+            <a:schemeClr val="tx1"/>
+          </a:fontRef>
+        </p:style>
+      </p:cxnSp>
+      <p:sp>
+        <p:nvSpPr>
+          <p:cNvPr id="67" name="Content Placeholder 2">
+            <a:extLst>
+              <a:ext uri="{FF2B5EF4-FFF2-40B4-BE49-F238E27FC236}">
+                <a16:creationId xmlns:a16="http://schemas.microsoft.com/office/drawing/2014/main" id="{1B6C7E67-8197-F18F-8C28-1F9B917A0EAE}"/>
+              </a:ext>
+            </a:extLst>
+          </p:cNvPr>
+          <p:cNvSpPr txBox="1">
+            <a:spLocks/>
+          </p:cNvSpPr>
+          <p:nvPr/>
+        </p:nvSpPr>
+        <p:spPr>
+          <a:xfrm>
+            <a:off x="3937469" y="2925150"/>
+            <a:ext cx="1362869" cy="290090"/>
+          </a:xfrm>
+          <a:prstGeom prst="rect">
+            <a:avLst/>
+          </a:prstGeom>
+          <a:ln>
+            <a:noFill/>
+          </a:ln>
+        </p:spPr>
+        <p:txBody>
+          <a:bodyPr vert="horz" lIns="91440" tIns="45720" rIns="91440" bIns="45720" rtlCol="0" anchor="ctr">
+            <a:normAutofit/>
+          </a:bodyPr>
+          <a:lstStyle>
+            <a:lvl1pPr marL="228600" indent="-228600" algn="l" defTabSz="914400" rtl="0" eaLnBrk="1" latinLnBrk="0" hangingPunct="1">
+              <a:lnSpc>
+                <a:spcPct val="90000"/>
+              </a:lnSpc>
+              <a:spcBef>
+                <a:spcPts val="1000"/>
+              </a:spcBef>
+              <a:buFont typeface="Arial" panose="020B0604020202020204" pitchFamily="34" charset="0"/>
+              <a:buChar char="•"/>
+              <a:defRPr sz="2800" kern="1200">
+                <a:solidFill>
+                  <a:schemeClr val="tx1"/>
+                </a:solidFill>
+                <a:latin typeface="+mn-lt"/>
+                <a:ea typeface="+mn-ea"/>
+                <a:cs typeface="+mn-cs"/>
+              </a:defRPr>
+            </a:lvl1pPr>
+            <a:lvl2pPr marL="685800" indent="-228600" algn="l" defTabSz="914400" rtl="0" eaLnBrk="1" latinLnBrk="0" hangingPunct="1">
+              <a:lnSpc>
+                <a:spcPct val="90000"/>
+              </a:lnSpc>
+              <a:spcBef>
+                <a:spcPts val="500"/>
+              </a:spcBef>
+              <a:buFont typeface="Arial" panose="020B0604020202020204" pitchFamily="34" charset="0"/>
+              <a:buChar char="•"/>
+              <a:defRPr sz="2400" kern="1200">
+                <a:solidFill>
+                  <a:schemeClr val="tx1"/>
+                </a:solidFill>
+                <a:latin typeface="+mn-lt"/>
+                <a:ea typeface="+mn-ea"/>
+                <a:cs typeface="+mn-cs"/>
+              </a:defRPr>
+            </a:lvl2pPr>
+            <a:lvl3pPr marL="1143000" indent="-228600" algn="l" defTabSz="914400" rtl="0" eaLnBrk="1" latinLnBrk="0" hangingPunct="1">
+              <a:lnSpc>
+                <a:spcPct val="90000"/>
+              </a:lnSpc>
+              <a:spcBef>
+                <a:spcPts val="500"/>
+              </a:spcBef>
+              <a:buFont typeface="Arial" panose="020B0604020202020204" pitchFamily="34" charset="0"/>
+              <a:buChar char="•"/>
+              <a:defRPr sz="2000" kern="1200">
+                <a:solidFill>
+                  <a:schemeClr val="tx1"/>
+                </a:solidFill>
+                <a:latin typeface="+mn-lt"/>
+                <a:ea typeface="+mn-ea"/>
+                <a:cs typeface="+mn-cs"/>
+              </a:defRPr>
+            </a:lvl3pPr>
+            <a:lvl4pPr marL="1600200" indent="-228600" algn="l" defTabSz="914400" rtl="0" eaLnBrk="1" latinLnBrk="0" hangingPunct="1">
+              <a:lnSpc>
+                <a:spcPct val="90000"/>
+              </a:lnSpc>
+              <a:spcBef>
+                <a:spcPts val="500"/>
+              </a:spcBef>
+              <a:buFont typeface="Arial" panose="020B0604020202020204" pitchFamily="34" charset="0"/>
+              <a:buChar char="•"/>
+              <a:defRPr sz="1800" kern="1200">
+                <a:solidFill>
+                  <a:schemeClr val="tx1"/>
+                </a:solidFill>
+                <a:latin typeface="+mn-lt"/>
+                <a:ea typeface="+mn-ea"/>
+                <a:cs typeface="+mn-cs"/>
+              </a:defRPr>
+            </a:lvl4pPr>
+            <a:lvl5pPr marL="2057400" indent="-228600" algn="l" defTabSz="914400" rtl="0" eaLnBrk="1" latinLnBrk="0" hangingPunct="1">
+              <a:lnSpc>
+                <a:spcPct val="90000"/>
+              </a:lnSpc>
+              <a:spcBef>
+                <a:spcPts val="500"/>
+              </a:spcBef>
+              <a:buFont typeface="Arial" panose="020B0604020202020204" pitchFamily="34" charset="0"/>
+              <a:buChar char="•"/>
+              <a:defRPr sz="1800" kern="1200">
+                <a:solidFill>
+                  <a:schemeClr val="tx1"/>
+                </a:solidFill>
+                <a:latin typeface="+mn-lt"/>
+                <a:ea typeface="+mn-ea"/>
+                <a:cs typeface="+mn-cs"/>
+              </a:defRPr>
+            </a:lvl5pPr>
+            <a:lvl6pPr marL="2514600" indent="-228600" algn="l" defTabSz="914400" rtl="0" eaLnBrk="1" latinLnBrk="0" hangingPunct="1">
+              <a:lnSpc>
+                <a:spcPct val="90000"/>
+              </a:lnSpc>
+              <a:spcBef>
+                <a:spcPts val="500"/>
+              </a:spcBef>
+              <a:buFont typeface="Arial" panose="020B0604020202020204" pitchFamily="34" charset="0"/>
+              <a:buChar char="•"/>
+              <a:defRPr sz="1800" kern="1200">
+                <a:solidFill>
+                  <a:schemeClr val="tx1"/>
+                </a:solidFill>
+                <a:latin typeface="+mn-lt"/>
+                <a:ea typeface="+mn-ea"/>
+                <a:cs typeface="+mn-cs"/>
+              </a:defRPr>
+            </a:lvl6pPr>
+            <a:lvl7pPr marL="2971800" indent="-228600" algn="l" defTabSz="914400" rtl="0" eaLnBrk="1" latinLnBrk="0" hangingPunct="1">
+              <a:lnSpc>
+                <a:spcPct val="90000"/>
+              </a:lnSpc>
+              <a:spcBef>
+                <a:spcPts val="500"/>
+              </a:spcBef>
+              <a:buFont typeface="Arial" panose="020B0604020202020204" pitchFamily="34" charset="0"/>
+              <a:buChar char="•"/>
+              <a:defRPr sz="1800" kern="1200">
+                <a:solidFill>
+                  <a:schemeClr val="tx1"/>
+                </a:solidFill>
+                <a:latin typeface="+mn-lt"/>
+                <a:ea typeface="+mn-ea"/>
+                <a:cs typeface="+mn-cs"/>
+              </a:defRPr>
+            </a:lvl7pPr>
+            <a:lvl8pPr marL="3429000" indent="-228600" algn="l" defTabSz="914400" rtl="0" eaLnBrk="1" latinLnBrk="0" hangingPunct="1">
+              <a:lnSpc>
+                <a:spcPct val="90000"/>
+              </a:lnSpc>
+              <a:spcBef>
+                <a:spcPts val="500"/>
+              </a:spcBef>
+              <a:buFont typeface="Arial" panose="020B0604020202020204" pitchFamily="34" charset="0"/>
+              <a:buChar char="•"/>
+              <a:defRPr sz="1800" kern="1200">
+                <a:solidFill>
+                  <a:schemeClr val="tx1"/>
+                </a:solidFill>
+                <a:latin typeface="+mn-lt"/>
+                <a:ea typeface="+mn-ea"/>
+                <a:cs typeface="+mn-cs"/>
+              </a:defRPr>
+            </a:lvl8pPr>
+            <a:lvl9pPr marL="3886200" indent="-228600" algn="l" defTabSz="914400" rtl="0" eaLnBrk="1" latinLnBrk="0" hangingPunct="1">
+              <a:lnSpc>
+                <a:spcPct val="90000"/>
+              </a:lnSpc>
+              <a:spcBef>
+                <a:spcPts val="500"/>
+              </a:spcBef>
+              <a:buFont typeface="Arial" panose="020B0604020202020204" pitchFamily="34" charset="0"/>
+              <a:buChar char="•"/>
+              <a:defRPr sz="1800" kern="1200">
+                <a:solidFill>
+                  <a:schemeClr val="tx1"/>
+                </a:solidFill>
+                <a:latin typeface="+mn-lt"/>
+                <a:ea typeface="+mn-ea"/>
+                <a:cs typeface="+mn-cs"/>
+              </a:defRPr>
+            </a:lvl9pPr>
+          </a:lstStyle>
+          <a:p>
+            <a:pPr marL="0" indent="0" algn="ctr">
+              <a:buFont typeface="Arial" panose="020B0604020202020204" pitchFamily="34" charset="0"/>
+              <a:buNone/>
+            </a:pPr>
+            <a:r>
+              <a:rPr lang="en-SG" sz="1200" dirty="0">
+                <a:solidFill>
+                  <a:srgbClr val="0070C0"/>
+                </a:solidFill>
+                <a:latin typeface="Arial" panose="020B0604020202020204" pitchFamily="34" charset="0"/>
+                <a:cs typeface="Arial" panose="020B0604020202020204" pitchFamily="34" charset="0"/>
+              </a:rPr>
+              <a:t>API name query</a:t>
+            </a:r>
+          </a:p>
+        </p:txBody>
+      </p:sp>
+      <p:sp>
+        <p:nvSpPr>
+          <p:cNvPr id="68" name="Content Placeholder 2">
+            <a:extLst>
+              <a:ext uri="{FF2B5EF4-FFF2-40B4-BE49-F238E27FC236}">
+                <a16:creationId xmlns:a16="http://schemas.microsoft.com/office/drawing/2014/main" id="{DDB3380A-7AD8-4930-69B4-796D0449B2D0}"/>
+              </a:ext>
+            </a:extLst>
+          </p:cNvPr>
+          <p:cNvSpPr txBox="1">
+            <a:spLocks/>
+          </p:cNvSpPr>
+          <p:nvPr/>
+        </p:nvSpPr>
+        <p:spPr>
+          <a:xfrm>
+            <a:off x="9973838" y="2900112"/>
+            <a:ext cx="1464931" cy="290090"/>
+          </a:xfrm>
+          <a:prstGeom prst="rect">
+            <a:avLst/>
+          </a:prstGeom>
+          <a:ln>
+            <a:noFill/>
+          </a:ln>
+        </p:spPr>
+        <p:txBody>
+          <a:bodyPr vert="horz" lIns="91440" tIns="45720" rIns="91440" bIns="45720" rtlCol="0" anchor="ctr">
+            <a:normAutofit fontScale="92500"/>
+          </a:bodyPr>
+          <a:lstStyle>
+            <a:lvl1pPr marL="228600" indent="-228600" algn="l" defTabSz="914400" rtl="0" eaLnBrk="1" latinLnBrk="0" hangingPunct="1">
+              <a:lnSpc>
+                <a:spcPct val="90000"/>
+              </a:lnSpc>
+              <a:spcBef>
+                <a:spcPts val="1000"/>
+              </a:spcBef>
+              <a:buFont typeface="Arial" panose="020B0604020202020204" pitchFamily="34" charset="0"/>
+              <a:buChar char="•"/>
+              <a:defRPr sz="2800" kern="1200">
+                <a:solidFill>
+                  <a:schemeClr val="tx1"/>
+                </a:solidFill>
+                <a:latin typeface="+mn-lt"/>
+                <a:ea typeface="+mn-ea"/>
+                <a:cs typeface="+mn-cs"/>
+              </a:defRPr>
+            </a:lvl1pPr>
+            <a:lvl2pPr marL="685800" indent="-228600" algn="l" defTabSz="914400" rtl="0" eaLnBrk="1" latinLnBrk="0" hangingPunct="1">
+              <a:lnSpc>
+                <a:spcPct val="90000"/>
+              </a:lnSpc>
+              <a:spcBef>
+                <a:spcPts val="500"/>
+              </a:spcBef>
+              <a:buFont typeface="Arial" panose="020B0604020202020204" pitchFamily="34" charset="0"/>
+              <a:buChar char="•"/>
+              <a:defRPr sz="2400" kern="1200">
+                <a:solidFill>
+                  <a:schemeClr val="tx1"/>
+                </a:solidFill>
+                <a:latin typeface="+mn-lt"/>
+                <a:ea typeface="+mn-ea"/>
+                <a:cs typeface="+mn-cs"/>
+              </a:defRPr>
+            </a:lvl2pPr>
+            <a:lvl3pPr marL="1143000" indent="-228600" algn="l" defTabSz="914400" rtl="0" eaLnBrk="1" latinLnBrk="0" hangingPunct="1">
+              <a:lnSpc>
+                <a:spcPct val="90000"/>
+              </a:lnSpc>
+              <a:spcBef>
+                <a:spcPts val="500"/>
+              </a:spcBef>
+              <a:buFont typeface="Arial" panose="020B0604020202020204" pitchFamily="34" charset="0"/>
+              <a:buChar char="•"/>
+              <a:defRPr sz="2000" kern="1200">
+                <a:solidFill>
+                  <a:schemeClr val="tx1"/>
+                </a:solidFill>
+                <a:latin typeface="+mn-lt"/>
+                <a:ea typeface="+mn-ea"/>
+                <a:cs typeface="+mn-cs"/>
+              </a:defRPr>
+            </a:lvl3pPr>
+            <a:lvl4pPr marL="1600200" indent="-228600" algn="l" defTabSz="914400" rtl="0" eaLnBrk="1" latinLnBrk="0" hangingPunct="1">
+              <a:lnSpc>
+                <a:spcPct val="90000"/>
+              </a:lnSpc>
+              <a:spcBef>
+                <a:spcPts val="500"/>
+              </a:spcBef>
+              <a:buFont typeface="Arial" panose="020B0604020202020204" pitchFamily="34" charset="0"/>
+              <a:buChar char="•"/>
+              <a:defRPr sz="1800" kern="1200">
+                <a:solidFill>
+                  <a:schemeClr val="tx1"/>
+                </a:solidFill>
+                <a:latin typeface="+mn-lt"/>
+                <a:ea typeface="+mn-ea"/>
+                <a:cs typeface="+mn-cs"/>
+              </a:defRPr>
+            </a:lvl4pPr>
+            <a:lvl5pPr marL="2057400" indent="-228600" algn="l" defTabSz="914400" rtl="0" eaLnBrk="1" latinLnBrk="0" hangingPunct="1">
+              <a:lnSpc>
+                <a:spcPct val="90000"/>
+              </a:lnSpc>
+              <a:spcBef>
+                <a:spcPts val="500"/>
+              </a:spcBef>
+              <a:buFont typeface="Arial" panose="020B0604020202020204" pitchFamily="34" charset="0"/>
+              <a:buChar char="•"/>
+              <a:defRPr sz="1800" kern="1200">
+                <a:solidFill>
+                  <a:schemeClr val="tx1"/>
+                </a:solidFill>
+                <a:latin typeface="+mn-lt"/>
+                <a:ea typeface="+mn-ea"/>
+                <a:cs typeface="+mn-cs"/>
+              </a:defRPr>
+            </a:lvl5pPr>
+            <a:lvl6pPr marL="2514600" indent="-228600" algn="l" defTabSz="914400" rtl="0" eaLnBrk="1" latinLnBrk="0" hangingPunct="1">
+              <a:lnSpc>
+                <a:spcPct val="90000"/>
+              </a:lnSpc>
+              <a:spcBef>
+                <a:spcPts val="500"/>
+              </a:spcBef>
+              <a:buFont typeface="Arial" panose="020B0604020202020204" pitchFamily="34" charset="0"/>
+              <a:buChar char="•"/>
+              <a:defRPr sz="1800" kern="1200">
+                <a:solidFill>
+                  <a:schemeClr val="tx1"/>
+                </a:solidFill>
+                <a:latin typeface="+mn-lt"/>
+                <a:ea typeface="+mn-ea"/>
+                <a:cs typeface="+mn-cs"/>
+              </a:defRPr>
+            </a:lvl6pPr>
+            <a:lvl7pPr marL="2971800" indent="-228600" algn="l" defTabSz="914400" rtl="0" eaLnBrk="1" latinLnBrk="0" hangingPunct="1">
+              <a:lnSpc>
+                <a:spcPct val="90000"/>
+              </a:lnSpc>
+              <a:spcBef>
+                <a:spcPts val="500"/>
+              </a:spcBef>
+              <a:buFont typeface="Arial" panose="020B0604020202020204" pitchFamily="34" charset="0"/>
+              <a:buChar char="•"/>
+              <a:defRPr sz="1800" kern="1200">
+                <a:solidFill>
+                  <a:schemeClr val="tx1"/>
+                </a:solidFill>
+                <a:latin typeface="+mn-lt"/>
+                <a:ea typeface="+mn-ea"/>
+                <a:cs typeface="+mn-cs"/>
+              </a:defRPr>
+            </a:lvl7pPr>
+            <a:lvl8pPr marL="3429000" indent="-228600" algn="l" defTabSz="914400" rtl="0" eaLnBrk="1" latinLnBrk="0" hangingPunct="1">
+              <a:lnSpc>
+                <a:spcPct val="90000"/>
+              </a:lnSpc>
+              <a:spcBef>
+                <a:spcPts val="500"/>
+              </a:spcBef>
+              <a:buFont typeface="Arial" panose="020B0604020202020204" pitchFamily="34" charset="0"/>
+              <a:buChar char="•"/>
+              <a:defRPr sz="1800" kern="1200">
+                <a:solidFill>
+                  <a:schemeClr val="tx1"/>
+                </a:solidFill>
+                <a:latin typeface="+mn-lt"/>
+                <a:ea typeface="+mn-ea"/>
+                <a:cs typeface="+mn-cs"/>
+              </a:defRPr>
+            </a:lvl8pPr>
+            <a:lvl9pPr marL="3886200" indent="-228600" algn="l" defTabSz="914400" rtl="0" eaLnBrk="1" latinLnBrk="0" hangingPunct="1">
+              <a:lnSpc>
+                <a:spcPct val="90000"/>
+              </a:lnSpc>
+              <a:spcBef>
+                <a:spcPts val="500"/>
+              </a:spcBef>
+              <a:buFont typeface="Arial" panose="020B0604020202020204" pitchFamily="34" charset="0"/>
+              <a:buChar char="•"/>
+              <a:defRPr sz="1800" kern="1200">
+                <a:solidFill>
+                  <a:schemeClr val="tx1"/>
+                </a:solidFill>
+                <a:latin typeface="+mn-lt"/>
+                <a:ea typeface="+mn-ea"/>
+                <a:cs typeface="+mn-cs"/>
+              </a:defRPr>
+            </a:lvl9pPr>
+          </a:lstStyle>
+          <a:p>
+            <a:pPr marL="0" indent="0" algn="ctr">
+              <a:buFont typeface="Arial" panose="020B0604020202020204" pitchFamily="34" charset="0"/>
+              <a:buNone/>
+            </a:pPr>
+            <a:r>
+              <a:rPr lang="en-SG" sz="1200" dirty="0">
+                <a:solidFill>
+                  <a:srgbClr val="0070C0"/>
+                </a:solidFill>
+                <a:latin typeface="Arial" panose="020B0604020202020204" pitchFamily="34" charset="0"/>
+                <a:cs typeface="Arial" panose="020B0604020202020204" pitchFamily="34" charset="0"/>
+              </a:rPr>
+              <a:t>API ingredient query</a:t>
+            </a:r>
+          </a:p>
+        </p:txBody>
+      </p:sp>
+      <p:sp>
+        <p:nvSpPr>
+          <p:cNvPr id="69" name="Content Placeholder 2">
+            <a:extLst>
+              <a:ext uri="{FF2B5EF4-FFF2-40B4-BE49-F238E27FC236}">
+                <a16:creationId xmlns:a16="http://schemas.microsoft.com/office/drawing/2014/main" id="{A1807FBA-F8A6-6DE1-A19E-7399BAF1DE27}"/>
+              </a:ext>
+            </a:extLst>
+          </p:cNvPr>
+          <p:cNvSpPr txBox="1">
+            <a:spLocks/>
+          </p:cNvSpPr>
+          <p:nvPr/>
+        </p:nvSpPr>
+        <p:spPr>
+          <a:xfrm>
+            <a:off x="9805366" y="3545979"/>
+            <a:ext cx="1236359" cy="290090"/>
+          </a:xfrm>
+          <a:prstGeom prst="rect">
+            <a:avLst/>
+          </a:prstGeom>
+          <a:ln>
+            <a:noFill/>
+          </a:ln>
+        </p:spPr>
+        <p:txBody>
+          <a:bodyPr vert="horz" lIns="91440" tIns="45720" rIns="91440" bIns="45720" rtlCol="0" anchor="ctr">
+            <a:normAutofit fontScale="85000" lnSpcReduction="10000"/>
+          </a:bodyPr>
+          <a:lstStyle>
+            <a:lvl1pPr marL="228600" indent="-228600" algn="l" defTabSz="914400" rtl="0" eaLnBrk="1" latinLnBrk="0" hangingPunct="1">
+              <a:lnSpc>
+                <a:spcPct val="90000"/>
+              </a:lnSpc>
+              <a:spcBef>
+                <a:spcPts val="1000"/>
+              </a:spcBef>
+              <a:buFont typeface="Arial" panose="020B0604020202020204" pitchFamily="34" charset="0"/>
+              <a:buChar char="•"/>
+              <a:defRPr sz="2800" kern="1200">
+                <a:solidFill>
+                  <a:schemeClr val="tx1"/>
+                </a:solidFill>
+                <a:latin typeface="+mn-lt"/>
+                <a:ea typeface="+mn-ea"/>
+                <a:cs typeface="+mn-cs"/>
+              </a:defRPr>
+            </a:lvl1pPr>
+            <a:lvl2pPr marL="685800" indent="-228600" algn="l" defTabSz="914400" rtl="0" eaLnBrk="1" latinLnBrk="0" hangingPunct="1">
+              <a:lnSpc>
+                <a:spcPct val="90000"/>
+              </a:lnSpc>
+              <a:spcBef>
+                <a:spcPts val="500"/>
+              </a:spcBef>
+              <a:buFont typeface="Arial" panose="020B0604020202020204" pitchFamily="34" charset="0"/>
+              <a:buChar char="•"/>
+              <a:defRPr sz="2400" kern="1200">
+                <a:solidFill>
+                  <a:schemeClr val="tx1"/>
+                </a:solidFill>
+                <a:latin typeface="+mn-lt"/>
+                <a:ea typeface="+mn-ea"/>
+                <a:cs typeface="+mn-cs"/>
+              </a:defRPr>
+            </a:lvl2pPr>
+            <a:lvl3pPr marL="1143000" indent="-228600" algn="l" defTabSz="914400" rtl="0" eaLnBrk="1" latinLnBrk="0" hangingPunct="1">
+              <a:lnSpc>
+                <a:spcPct val="90000"/>
+              </a:lnSpc>
+              <a:spcBef>
+                <a:spcPts val="500"/>
+              </a:spcBef>
+              <a:buFont typeface="Arial" panose="020B0604020202020204" pitchFamily="34" charset="0"/>
+              <a:buChar char="•"/>
+              <a:defRPr sz="2000" kern="1200">
+                <a:solidFill>
+                  <a:schemeClr val="tx1"/>
+                </a:solidFill>
+                <a:latin typeface="+mn-lt"/>
+                <a:ea typeface="+mn-ea"/>
+                <a:cs typeface="+mn-cs"/>
+              </a:defRPr>
+            </a:lvl3pPr>
+            <a:lvl4pPr marL="1600200" indent="-228600" algn="l" defTabSz="914400" rtl="0" eaLnBrk="1" latinLnBrk="0" hangingPunct="1">
+              <a:lnSpc>
+                <a:spcPct val="90000"/>
+              </a:lnSpc>
+              <a:spcBef>
+                <a:spcPts val="500"/>
+              </a:spcBef>
+              <a:buFont typeface="Arial" panose="020B0604020202020204" pitchFamily="34" charset="0"/>
+              <a:buChar char="•"/>
+              <a:defRPr sz="1800" kern="1200">
+                <a:solidFill>
+                  <a:schemeClr val="tx1"/>
+                </a:solidFill>
+                <a:latin typeface="+mn-lt"/>
+                <a:ea typeface="+mn-ea"/>
+                <a:cs typeface="+mn-cs"/>
+              </a:defRPr>
+            </a:lvl4pPr>
+            <a:lvl5pPr marL="2057400" indent="-228600" algn="l" defTabSz="914400" rtl="0" eaLnBrk="1" latinLnBrk="0" hangingPunct="1">
+              <a:lnSpc>
+                <a:spcPct val="90000"/>
+              </a:lnSpc>
+              <a:spcBef>
+                <a:spcPts val="500"/>
+              </a:spcBef>
+              <a:buFont typeface="Arial" panose="020B0604020202020204" pitchFamily="34" charset="0"/>
+              <a:buChar char="•"/>
+              <a:defRPr sz="1800" kern="1200">
+                <a:solidFill>
+                  <a:schemeClr val="tx1"/>
+                </a:solidFill>
+                <a:latin typeface="+mn-lt"/>
+                <a:ea typeface="+mn-ea"/>
+                <a:cs typeface="+mn-cs"/>
+              </a:defRPr>
+            </a:lvl5pPr>
+            <a:lvl6pPr marL="2514600" indent="-228600" algn="l" defTabSz="914400" rtl="0" eaLnBrk="1" latinLnBrk="0" hangingPunct="1">
+              <a:lnSpc>
+                <a:spcPct val="90000"/>
+              </a:lnSpc>
+              <a:spcBef>
+                <a:spcPts val="500"/>
+              </a:spcBef>
+              <a:buFont typeface="Arial" panose="020B0604020202020204" pitchFamily="34" charset="0"/>
+              <a:buChar char="•"/>
+              <a:defRPr sz="1800" kern="1200">
+                <a:solidFill>
+                  <a:schemeClr val="tx1"/>
+                </a:solidFill>
+                <a:latin typeface="+mn-lt"/>
+                <a:ea typeface="+mn-ea"/>
+                <a:cs typeface="+mn-cs"/>
+              </a:defRPr>
+            </a:lvl6pPr>
+            <a:lvl7pPr marL="2971800" indent="-228600" algn="l" defTabSz="914400" rtl="0" eaLnBrk="1" latinLnBrk="0" hangingPunct="1">
+              <a:lnSpc>
+                <a:spcPct val="90000"/>
+              </a:lnSpc>
+              <a:spcBef>
+                <a:spcPts val="500"/>
+              </a:spcBef>
+              <a:buFont typeface="Arial" panose="020B0604020202020204" pitchFamily="34" charset="0"/>
+              <a:buChar char="•"/>
+              <a:defRPr sz="1800" kern="1200">
+                <a:solidFill>
+                  <a:schemeClr val="tx1"/>
+                </a:solidFill>
+                <a:latin typeface="+mn-lt"/>
+                <a:ea typeface="+mn-ea"/>
+                <a:cs typeface="+mn-cs"/>
+              </a:defRPr>
+            </a:lvl7pPr>
+            <a:lvl8pPr marL="3429000" indent="-228600" algn="l" defTabSz="914400" rtl="0" eaLnBrk="1" latinLnBrk="0" hangingPunct="1">
+              <a:lnSpc>
+                <a:spcPct val="90000"/>
+              </a:lnSpc>
+              <a:spcBef>
+                <a:spcPts val="500"/>
+              </a:spcBef>
+              <a:buFont typeface="Arial" panose="020B0604020202020204" pitchFamily="34" charset="0"/>
+              <a:buChar char="•"/>
+              <a:defRPr sz="1800" kern="1200">
+                <a:solidFill>
+                  <a:schemeClr val="tx1"/>
+                </a:solidFill>
+                <a:latin typeface="+mn-lt"/>
+                <a:ea typeface="+mn-ea"/>
+                <a:cs typeface="+mn-cs"/>
+              </a:defRPr>
+            </a:lvl8pPr>
+            <a:lvl9pPr marL="3886200" indent="-228600" algn="l" defTabSz="914400" rtl="0" eaLnBrk="1" latinLnBrk="0" hangingPunct="1">
+              <a:lnSpc>
+                <a:spcPct val="90000"/>
+              </a:lnSpc>
+              <a:spcBef>
+                <a:spcPts val="500"/>
+              </a:spcBef>
+              <a:buFont typeface="Arial" panose="020B0604020202020204" pitchFamily="34" charset="0"/>
+              <a:buChar char="•"/>
+              <a:defRPr sz="1800" kern="1200">
+                <a:solidFill>
+                  <a:schemeClr val="tx1"/>
+                </a:solidFill>
+                <a:latin typeface="+mn-lt"/>
+                <a:ea typeface="+mn-ea"/>
+                <a:cs typeface="+mn-cs"/>
+              </a:defRPr>
+            </a:lvl9pPr>
+          </a:lstStyle>
+          <a:p>
+            <a:pPr marL="0" indent="0" algn="ctr">
+              <a:buFont typeface="Arial" panose="020B0604020202020204" pitchFamily="34" charset="0"/>
+              <a:buNone/>
+            </a:pPr>
+            <a:r>
+              <a:rPr lang="en-SG" sz="1200" dirty="0">
+                <a:solidFill>
+                  <a:srgbClr val="0070C0"/>
+                </a:solidFill>
+                <a:latin typeface="Arial" panose="020B0604020202020204" pitchFamily="34" charset="0"/>
+                <a:cs typeface="Arial" panose="020B0604020202020204" pitchFamily="34" charset="0"/>
+              </a:rPr>
+              <a:t>API </a:t>
+            </a:r>
+            <a:r>
+              <a:rPr lang="en-SG" sz="1200" dirty="0" err="1">
+                <a:solidFill>
+                  <a:srgbClr val="0070C0"/>
+                </a:solidFill>
+                <a:latin typeface="Arial" panose="020B0604020202020204" pitchFamily="34" charset="0"/>
+                <a:cs typeface="Arial" panose="020B0604020202020204" pitchFamily="34" charset="0"/>
+              </a:rPr>
+              <a:t>drinkID</a:t>
+            </a:r>
+            <a:r>
+              <a:rPr lang="en-SG" sz="1200" dirty="0">
+                <a:solidFill>
+                  <a:srgbClr val="0070C0"/>
+                </a:solidFill>
+                <a:latin typeface="Arial" panose="020B0604020202020204" pitchFamily="34" charset="0"/>
+                <a:cs typeface="Arial" panose="020B0604020202020204" pitchFamily="34" charset="0"/>
+              </a:rPr>
+              <a:t> query</a:t>
+            </a:r>
+          </a:p>
+        </p:txBody>
+      </p:sp>
+    </p:spTree>
+    <p:extLst>
+      <p:ext uri="{BB962C8B-B14F-4D97-AF65-F5344CB8AC3E}">
+        <p14:creationId xmlns:p14="http://schemas.microsoft.com/office/powerpoint/2010/main" val="1763387078"/>
+      </p:ext>
+    </p:extLst>
+  </p:cSld>
+  <p:clrMapOvr>
+    <a:masterClrMapping/>
+  </p:clrMapOvr>
+</p:sld>
+</file>
+
 <file path=ppt/theme/theme1.xml><?xml version="1.0" encoding="utf-8"?>
 <a:theme xmlns:a="http://schemas.openxmlformats.org/drawingml/2006/main" name="Office Theme">
   <a:themeElements>

</xml_diff>